<commit_message>
Update SB_Milestone 3 Presentation.pptx
</commit_message>
<xml_diff>
--- a/SB_Milestone 3 Presentation.pptx
+++ b/SB_Milestone 3 Presentation.pptx
@@ -1,29 +1,124 @@
 
 <file path=ppt/presentation.xml><?xml version="1.0" encoding="utf-8"?>
-<p:presentation xmlns:a="http://schemas.openxmlformats.org/drawingml/2006/main" xmlns:p="http://schemas.openxmlformats.org/presentationml/2006/main" xmlns:r="http://schemas.openxmlformats.org/officeDocument/2006/relationships" xmlns:p14="http://schemas.microsoft.com/office/powerpoint/2010/main" xmlns:p15="http://schemas.microsoft.com/office/powerpoint/2012/main" xmlns:mc="http://schemas.openxmlformats.org/markup-compatibility/2006">
+<p:presentation xmlns:a="http://schemas.openxmlformats.org/drawingml/2006/main" xmlns:r="http://schemas.openxmlformats.org/officeDocument/2006/relationships" xmlns:p="http://schemas.openxmlformats.org/presentationml/2006/main">
   <p:sldMasterIdLst>
-    <p:sldMasterId id="2147483648" r:id="rId2"/>
-    <p:sldMasterId id="2147483661" r:id="rId3"/>
+    <p:sldMasterId id="2147483648" r:id="rId1"/>
+    <p:sldMasterId id="2147483661" r:id="rId2"/>
   </p:sldMasterIdLst>
   <p:sldIdLst>
-    <p:sldId id="256" r:id="rId4"/>
-    <p:sldId id="257" r:id="rId5"/>
-    <p:sldId id="258" r:id="rId6"/>
-    <p:sldId id="259" r:id="rId7"/>
-    <p:sldId id="260" r:id="rId8"/>
-    <p:sldId id="261" r:id="rId9"/>
-    <p:sldId id="262" r:id="rId10"/>
-    <p:sldId id="263" r:id="rId11"/>
-    <p:sldId id="264" r:id="rId12"/>
-    <p:sldId id="265" r:id="rId13"/>
+    <p:sldId id="256" r:id="rId3"/>
+    <p:sldId id="257" r:id="rId4"/>
+    <p:sldId id="258" r:id="rId5"/>
+    <p:sldId id="259" r:id="rId6"/>
+    <p:sldId id="260" r:id="rId7"/>
+    <p:sldId id="261" r:id="rId8"/>
+    <p:sldId id="262" r:id="rId9"/>
+    <p:sldId id="263" r:id="rId10"/>
+    <p:sldId id="264" r:id="rId11"/>
+    <p:sldId id="265" r:id="rId12"/>
   </p:sldIdLst>
   <p:sldSz cx="12192000" cy="6858000"/>
   <p:notesSz cx="7772400" cy="10058400"/>
+  <p:defaultTextStyle>
+    <a:defPPr>
+      <a:defRPr lang="en-US"/>
+    </a:defPPr>
+    <a:lvl1pPr marL="0" algn="l" defTabSz="914400" rtl="0" eaLnBrk="1" latinLnBrk="0" hangingPunct="1">
+      <a:defRPr sz="1800" kern="1200">
+        <a:solidFill>
+          <a:schemeClr val="tx1"/>
+        </a:solidFill>
+        <a:latin typeface="+mn-lt"/>
+        <a:ea typeface="+mn-ea"/>
+        <a:cs typeface="+mn-cs"/>
+      </a:defRPr>
+    </a:lvl1pPr>
+    <a:lvl2pPr marL="457200" algn="l" defTabSz="914400" rtl="0" eaLnBrk="1" latinLnBrk="0" hangingPunct="1">
+      <a:defRPr sz="1800" kern="1200">
+        <a:solidFill>
+          <a:schemeClr val="tx1"/>
+        </a:solidFill>
+        <a:latin typeface="+mn-lt"/>
+        <a:ea typeface="+mn-ea"/>
+        <a:cs typeface="+mn-cs"/>
+      </a:defRPr>
+    </a:lvl2pPr>
+    <a:lvl3pPr marL="914400" algn="l" defTabSz="914400" rtl="0" eaLnBrk="1" latinLnBrk="0" hangingPunct="1">
+      <a:defRPr sz="1800" kern="1200">
+        <a:solidFill>
+          <a:schemeClr val="tx1"/>
+        </a:solidFill>
+        <a:latin typeface="+mn-lt"/>
+        <a:ea typeface="+mn-ea"/>
+        <a:cs typeface="+mn-cs"/>
+      </a:defRPr>
+    </a:lvl3pPr>
+    <a:lvl4pPr marL="1371600" algn="l" defTabSz="914400" rtl="0" eaLnBrk="1" latinLnBrk="0" hangingPunct="1">
+      <a:defRPr sz="1800" kern="1200">
+        <a:solidFill>
+          <a:schemeClr val="tx1"/>
+        </a:solidFill>
+        <a:latin typeface="+mn-lt"/>
+        <a:ea typeface="+mn-ea"/>
+        <a:cs typeface="+mn-cs"/>
+      </a:defRPr>
+    </a:lvl4pPr>
+    <a:lvl5pPr marL="1828800" algn="l" defTabSz="914400" rtl="0" eaLnBrk="1" latinLnBrk="0" hangingPunct="1">
+      <a:defRPr sz="1800" kern="1200">
+        <a:solidFill>
+          <a:schemeClr val="tx1"/>
+        </a:solidFill>
+        <a:latin typeface="+mn-lt"/>
+        <a:ea typeface="+mn-ea"/>
+        <a:cs typeface="+mn-cs"/>
+      </a:defRPr>
+    </a:lvl5pPr>
+    <a:lvl6pPr marL="2286000" algn="l" defTabSz="914400" rtl="0" eaLnBrk="1" latinLnBrk="0" hangingPunct="1">
+      <a:defRPr sz="1800" kern="1200">
+        <a:solidFill>
+          <a:schemeClr val="tx1"/>
+        </a:solidFill>
+        <a:latin typeface="+mn-lt"/>
+        <a:ea typeface="+mn-ea"/>
+        <a:cs typeface="+mn-cs"/>
+      </a:defRPr>
+    </a:lvl6pPr>
+    <a:lvl7pPr marL="2743200" algn="l" defTabSz="914400" rtl="0" eaLnBrk="1" latinLnBrk="0" hangingPunct="1">
+      <a:defRPr sz="1800" kern="1200">
+        <a:solidFill>
+          <a:schemeClr val="tx1"/>
+        </a:solidFill>
+        <a:latin typeface="+mn-lt"/>
+        <a:ea typeface="+mn-ea"/>
+        <a:cs typeface="+mn-cs"/>
+      </a:defRPr>
+    </a:lvl7pPr>
+    <a:lvl8pPr marL="3200400" algn="l" defTabSz="914400" rtl="0" eaLnBrk="1" latinLnBrk="0" hangingPunct="1">
+      <a:defRPr sz="1800" kern="1200">
+        <a:solidFill>
+          <a:schemeClr val="tx1"/>
+        </a:solidFill>
+        <a:latin typeface="+mn-lt"/>
+        <a:ea typeface="+mn-ea"/>
+        <a:cs typeface="+mn-cs"/>
+      </a:defRPr>
+    </a:lvl8pPr>
+    <a:lvl9pPr marL="3657600" algn="l" defTabSz="914400" rtl="0" eaLnBrk="1" latinLnBrk="0" hangingPunct="1">
+      <a:defRPr sz="1800" kern="1200">
+        <a:solidFill>
+          <a:schemeClr val="tx1"/>
+        </a:solidFill>
+        <a:latin typeface="+mn-lt"/>
+        <a:ea typeface="+mn-ea"/>
+        <a:cs typeface="+mn-cs"/>
+      </a:defRPr>
+    </a:lvl9pPr>
+  </p:defaultTextStyle>
 </p:presentation>
 </file>
 
 <file path=ppt/slideLayouts/slideLayout1.xml><?xml version="1.0" encoding="utf-8"?>
-<p:sldLayout xmlns:a="http://schemas.openxmlformats.org/drawingml/2006/main" xmlns:p="http://schemas.openxmlformats.org/presentationml/2006/main" xmlns:r="http://schemas.openxmlformats.org/officeDocument/2006/relationships" xmlns:p14="http://schemas.microsoft.com/office/powerpoint/2010/main" xmlns:p15="http://schemas.microsoft.com/office/powerpoint/2012/main" xmlns:mc="http://schemas.openxmlformats.org/markup-compatibility/2006" type="blank" preserve="1">
+<p:sldLayout xmlns:a="http://schemas.openxmlformats.org/drawingml/2006/main" xmlns:r="http://schemas.openxmlformats.org/officeDocument/2006/relationships" xmlns:p="http://schemas.openxmlformats.org/presentationml/2006/main" type="blank" preserve="1">
   <p:cSld name="Blank Slide">
     <p:spTree>
       <p:nvGrpSpPr>
@@ -41,11 +136,14 @@
       </p:grpSpPr>
     </p:spTree>
   </p:cSld>
+  <p:clrMapOvr>
+    <a:masterClrMapping/>
+  </p:clrMapOvr>
 </p:sldLayout>
 </file>
 
 <file path=ppt/slideLayouts/slideLayout10.xml><?xml version="1.0" encoding="utf-8"?>
-<p:sldLayout xmlns:a="http://schemas.openxmlformats.org/drawingml/2006/main" xmlns:p="http://schemas.openxmlformats.org/presentationml/2006/main" xmlns:r="http://schemas.openxmlformats.org/officeDocument/2006/relationships" xmlns:p14="http://schemas.microsoft.com/office/powerpoint/2010/main" xmlns:p15="http://schemas.microsoft.com/office/powerpoint/2012/main" xmlns:mc="http://schemas.openxmlformats.org/markup-compatibility/2006" type="objOverTx" preserve="1">
+<p:sldLayout xmlns:a="http://schemas.openxmlformats.org/drawingml/2006/main" xmlns:r="http://schemas.openxmlformats.org/officeDocument/2006/relationships" xmlns:p="http://schemas.openxmlformats.org/presentationml/2006/main" type="objOverTx" preserve="1">
   <p:cSld name="Title, Content over Content">
     <p:spTree>
       <p:nvGrpSpPr>
@@ -81,13 +179,14 @@
           </a:prstGeom>
         </p:spPr>
         <p:txBody>
-          <a:bodyPr lIns="0" rIns="0" tIns="0" bIns="0" anchor="ctr">
+          <a:bodyPr lIns="0" tIns="0" rIns="0" bIns="0" anchor="ctr">
             <a:noAutofit/>
           </a:bodyPr>
-          <a:p>
-            <a:endParaRPr b="0" lang="en-US" sz="1800" spc="-1" strike="noStrike">
-              <a:solidFill>
-                <a:srgbClr val="ffffff"/>
+          <a:lstStyle/>
+          <a:p>
+            <a:endParaRPr lang="en-US" sz="1800" b="0" strike="noStrike" spc="-1">
+              <a:solidFill>
+                <a:srgbClr val="FFFFFF"/>
               </a:solidFill>
               <a:latin typeface="Century Gothic"/>
             </a:endParaRPr>
@@ -114,13 +213,14 @@
           </a:prstGeom>
         </p:spPr>
         <p:txBody>
-          <a:bodyPr lIns="0" rIns="0" tIns="0" bIns="0">
+          <a:bodyPr lIns="0" tIns="0" rIns="0" bIns="0">
             <a:normAutofit/>
           </a:bodyPr>
-          <a:p>
-            <a:endParaRPr b="0" lang="en-US" sz="2000" spc="-1" strike="noStrike">
-              <a:solidFill>
-                <a:srgbClr val="0f496f"/>
+          <a:lstStyle/>
+          <a:p>
+            <a:endParaRPr lang="en-US" sz="2000" b="0" strike="noStrike" spc="-1">
+              <a:solidFill>
+                <a:srgbClr val="0F496F"/>
               </a:solidFill>
               <a:latin typeface="Century Gothic"/>
             </a:endParaRPr>
@@ -147,13 +247,14 @@
           </a:prstGeom>
         </p:spPr>
         <p:txBody>
-          <a:bodyPr lIns="0" rIns="0" tIns="0" bIns="0">
+          <a:bodyPr lIns="0" tIns="0" rIns="0" bIns="0">
             <a:normAutofit/>
           </a:bodyPr>
-          <a:p>
-            <a:endParaRPr b="0" lang="en-US" sz="2000" spc="-1" strike="noStrike">
-              <a:solidFill>
-                <a:srgbClr val="0f496f"/>
+          <a:lstStyle/>
+          <a:p>
+            <a:endParaRPr lang="en-US" sz="2000" b="0" strike="noStrike" spc="-1">
+              <a:solidFill>
+                <a:srgbClr val="0F496F"/>
               </a:solidFill>
               <a:latin typeface="Century Gothic"/>
             </a:endParaRPr>
@@ -162,11 +263,14 @@
       </p:sp>
     </p:spTree>
   </p:cSld>
+  <p:clrMapOvr>
+    <a:masterClrMapping/>
+  </p:clrMapOvr>
 </p:sldLayout>
 </file>
 
 <file path=ppt/slideLayouts/slideLayout11.xml><?xml version="1.0" encoding="utf-8"?>
-<p:sldLayout xmlns:a="http://schemas.openxmlformats.org/drawingml/2006/main" xmlns:p="http://schemas.openxmlformats.org/presentationml/2006/main" xmlns:r="http://schemas.openxmlformats.org/officeDocument/2006/relationships" xmlns:p14="http://schemas.microsoft.com/office/powerpoint/2010/main" xmlns:p15="http://schemas.microsoft.com/office/powerpoint/2012/main" xmlns:mc="http://schemas.openxmlformats.org/markup-compatibility/2006" type="fourObj" preserve="1">
+<p:sldLayout xmlns:a="http://schemas.openxmlformats.org/drawingml/2006/main" xmlns:r="http://schemas.openxmlformats.org/officeDocument/2006/relationships" xmlns:p="http://schemas.openxmlformats.org/presentationml/2006/main" type="fourObj" preserve="1">
   <p:cSld name="Title, 4 Content">
     <p:spTree>
       <p:nvGrpSpPr>
@@ -202,13 +306,14 @@
           </a:prstGeom>
         </p:spPr>
         <p:txBody>
-          <a:bodyPr lIns="0" rIns="0" tIns="0" bIns="0" anchor="ctr">
+          <a:bodyPr lIns="0" tIns="0" rIns="0" bIns="0" anchor="ctr">
             <a:noAutofit/>
           </a:bodyPr>
-          <a:p>
-            <a:endParaRPr b="0" lang="en-US" sz="1800" spc="-1" strike="noStrike">
-              <a:solidFill>
-                <a:srgbClr val="ffffff"/>
+          <a:lstStyle/>
+          <a:p>
+            <a:endParaRPr lang="en-US" sz="1800" b="0" strike="noStrike" spc="-1">
+              <a:solidFill>
+                <a:srgbClr val="FFFFFF"/>
               </a:solidFill>
               <a:latin typeface="Century Gothic"/>
             </a:endParaRPr>
@@ -235,13 +340,14 @@
           </a:prstGeom>
         </p:spPr>
         <p:txBody>
-          <a:bodyPr lIns="0" rIns="0" tIns="0" bIns="0">
+          <a:bodyPr lIns="0" tIns="0" rIns="0" bIns="0">
             <a:normAutofit/>
           </a:bodyPr>
-          <a:p>
-            <a:endParaRPr b="0" lang="en-US" sz="2000" spc="-1" strike="noStrike">
-              <a:solidFill>
-                <a:srgbClr val="0f496f"/>
+          <a:lstStyle/>
+          <a:p>
+            <a:endParaRPr lang="en-US" sz="2000" b="0" strike="noStrike" spc="-1">
+              <a:solidFill>
+                <a:srgbClr val="0F496F"/>
               </a:solidFill>
               <a:latin typeface="Century Gothic"/>
             </a:endParaRPr>
@@ -268,13 +374,14 @@
           </a:prstGeom>
         </p:spPr>
         <p:txBody>
-          <a:bodyPr lIns="0" rIns="0" tIns="0" bIns="0">
+          <a:bodyPr lIns="0" tIns="0" rIns="0" bIns="0">
             <a:normAutofit/>
           </a:bodyPr>
-          <a:p>
-            <a:endParaRPr b="0" lang="en-US" sz="2000" spc="-1" strike="noStrike">
-              <a:solidFill>
-                <a:srgbClr val="0f496f"/>
+          <a:lstStyle/>
+          <a:p>
+            <a:endParaRPr lang="en-US" sz="2000" b="0" strike="noStrike" spc="-1">
+              <a:solidFill>
+                <a:srgbClr val="0F496F"/>
               </a:solidFill>
               <a:latin typeface="Century Gothic"/>
             </a:endParaRPr>
@@ -301,13 +408,14 @@
           </a:prstGeom>
         </p:spPr>
         <p:txBody>
-          <a:bodyPr lIns="0" rIns="0" tIns="0" bIns="0">
+          <a:bodyPr lIns="0" tIns="0" rIns="0" bIns="0">
             <a:normAutofit/>
           </a:bodyPr>
-          <a:p>
-            <a:endParaRPr b="0" lang="en-US" sz="2000" spc="-1" strike="noStrike">
-              <a:solidFill>
-                <a:srgbClr val="0f496f"/>
+          <a:lstStyle/>
+          <a:p>
+            <a:endParaRPr lang="en-US" sz="2000" b="0" strike="noStrike" spc="-1">
+              <a:solidFill>
+                <a:srgbClr val="0F496F"/>
               </a:solidFill>
               <a:latin typeface="Century Gothic"/>
             </a:endParaRPr>
@@ -334,13 +442,14 @@
           </a:prstGeom>
         </p:spPr>
         <p:txBody>
-          <a:bodyPr lIns="0" rIns="0" tIns="0" bIns="0">
+          <a:bodyPr lIns="0" tIns="0" rIns="0" bIns="0">
             <a:normAutofit/>
           </a:bodyPr>
-          <a:p>
-            <a:endParaRPr b="0" lang="en-US" sz="2000" spc="-1" strike="noStrike">
-              <a:solidFill>
-                <a:srgbClr val="0f496f"/>
+          <a:lstStyle/>
+          <a:p>
+            <a:endParaRPr lang="en-US" sz="2000" b="0" strike="noStrike" spc="-1">
+              <a:solidFill>
+                <a:srgbClr val="0F496F"/>
               </a:solidFill>
               <a:latin typeface="Century Gothic"/>
             </a:endParaRPr>
@@ -349,11 +458,14 @@
       </p:sp>
     </p:spTree>
   </p:cSld>
+  <p:clrMapOvr>
+    <a:masterClrMapping/>
+  </p:clrMapOvr>
 </p:sldLayout>
 </file>
 
 <file path=ppt/slideLayouts/slideLayout12.xml><?xml version="1.0" encoding="utf-8"?>
-<p:sldLayout xmlns:a="http://schemas.openxmlformats.org/drawingml/2006/main" xmlns:p="http://schemas.openxmlformats.org/presentationml/2006/main" xmlns:r="http://schemas.openxmlformats.org/officeDocument/2006/relationships" xmlns:p14="http://schemas.microsoft.com/office/powerpoint/2010/main" xmlns:p15="http://schemas.microsoft.com/office/powerpoint/2012/main" xmlns:mc="http://schemas.openxmlformats.org/markup-compatibility/2006" type="blank" preserve="1">
+<p:sldLayout xmlns:a="http://schemas.openxmlformats.org/drawingml/2006/main" xmlns:r="http://schemas.openxmlformats.org/officeDocument/2006/relationships" xmlns:p="http://schemas.openxmlformats.org/presentationml/2006/main" type="blank" preserve="1">
   <p:cSld name="Title, 6 Content">
     <p:spTree>
       <p:nvGrpSpPr>
@@ -389,13 +501,14 @@
           </a:prstGeom>
         </p:spPr>
         <p:txBody>
-          <a:bodyPr lIns="0" rIns="0" tIns="0" bIns="0" anchor="ctr">
+          <a:bodyPr lIns="0" tIns="0" rIns="0" bIns="0" anchor="ctr">
             <a:noAutofit/>
           </a:bodyPr>
-          <a:p>
-            <a:endParaRPr b="0" lang="en-US" sz="1800" spc="-1" strike="noStrike">
-              <a:solidFill>
-                <a:srgbClr val="ffffff"/>
+          <a:lstStyle/>
+          <a:p>
+            <a:endParaRPr lang="en-US" sz="1800" b="0" strike="noStrike" spc="-1">
+              <a:solidFill>
+                <a:srgbClr val="FFFFFF"/>
               </a:solidFill>
               <a:latin typeface="Century Gothic"/>
             </a:endParaRPr>
@@ -422,13 +535,14 @@
           </a:prstGeom>
         </p:spPr>
         <p:txBody>
-          <a:bodyPr lIns="0" rIns="0" tIns="0" bIns="0">
+          <a:bodyPr lIns="0" tIns="0" rIns="0" bIns="0">
             <a:normAutofit/>
           </a:bodyPr>
-          <a:p>
-            <a:endParaRPr b="0" lang="en-US" sz="2000" spc="-1" strike="noStrike">
-              <a:solidFill>
-                <a:srgbClr val="0f496f"/>
+          <a:lstStyle/>
+          <a:p>
+            <a:endParaRPr lang="en-US" sz="2000" b="0" strike="noStrike" spc="-1">
+              <a:solidFill>
+                <a:srgbClr val="0F496F"/>
               </a:solidFill>
               <a:latin typeface="Century Gothic"/>
             </a:endParaRPr>
@@ -455,13 +569,14 @@
           </a:prstGeom>
         </p:spPr>
         <p:txBody>
-          <a:bodyPr lIns="0" rIns="0" tIns="0" bIns="0">
+          <a:bodyPr lIns="0" tIns="0" rIns="0" bIns="0">
             <a:normAutofit/>
           </a:bodyPr>
-          <a:p>
-            <a:endParaRPr b="0" lang="en-US" sz="2000" spc="-1" strike="noStrike">
-              <a:solidFill>
-                <a:srgbClr val="0f496f"/>
+          <a:lstStyle/>
+          <a:p>
+            <a:endParaRPr lang="en-US" sz="2000" b="0" strike="noStrike" spc="-1">
+              <a:solidFill>
+                <a:srgbClr val="0F496F"/>
               </a:solidFill>
               <a:latin typeface="Century Gothic"/>
             </a:endParaRPr>
@@ -488,13 +603,14 @@
           </a:prstGeom>
         </p:spPr>
         <p:txBody>
-          <a:bodyPr lIns="0" rIns="0" tIns="0" bIns="0">
+          <a:bodyPr lIns="0" tIns="0" rIns="0" bIns="0">
             <a:normAutofit/>
           </a:bodyPr>
-          <a:p>
-            <a:endParaRPr b="0" lang="en-US" sz="2000" spc="-1" strike="noStrike">
-              <a:solidFill>
-                <a:srgbClr val="0f496f"/>
+          <a:lstStyle/>
+          <a:p>
+            <a:endParaRPr lang="en-US" sz="2000" b="0" strike="noStrike" spc="-1">
+              <a:solidFill>
+                <a:srgbClr val="0F496F"/>
               </a:solidFill>
               <a:latin typeface="Century Gothic"/>
             </a:endParaRPr>
@@ -521,13 +637,14 @@
           </a:prstGeom>
         </p:spPr>
         <p:txBody>
-          <a:bodyPr lIns="0" rIns="0" tIns="0" bIns="0">
+          <a:bodyPr lIns="0" tIns="0" rIns="0" bIns="0">
             <a:normAutofit/>
           </a:bodyPr>
-          <a:p>
-            <a:endParaRPr b="0" lang="en-US" sz="2000" spc="-1" strike="noStrike">
-              <a:solidFill>
-                <a:srgbClr val="0f496f"/>
+          <a:lstStyle/>
+          <a:p>
+            <a:endParaRPr lang="en-US" sz="2000" b="0" strike="noStrike" spc="-1">
+              <a:solidFill>
+                <a:srgbClr val="0F496F"/>
               </a:solidFill>
               <a:latin typeface="Century Gothic"/>
             </a:endParaRPr>
@@ -554,13 +671,14 @@
           </a:prstGeom>
         </p:spPr>
         <p:txBody>
-          <a:bodyPr lIns="0" rIns="0" tIns="0" bIns="0">
+          <a:bodyPr lIns="0" tIns="0" rIns="0" bIns="0">
             <a:normAutofit/>
           </a:bodyPr>
-          <a:p>
-            <a:endParaRPr b="0" lang="en-US" sz="2000" spc="-1" strike="noStrike">
-              <a:solidFill>
-                <a:srgbClr val="0f496f"/>
+          <a:lstStyle/>
+          <a:p>
+            <a:endParaRPr lang="en-US" sz="2000" b="0" strike="noStrike" spc="-1">
+              <a:solidFill>
+                <a:srgbClr val="0F496F"/>
               </a:solidFill>
               <a:latin typeface="Century Gothic"/>
             </a:endParaRPr>
@@ -587,13 +705,14 @@
           </a:prstGeom>
         </p:spPr>
         <p:txBody>
-          <a:bodyPr lIns="0" rIns="0" tIns="0" bIns="0">
+          <a:bodyPr lIns="0" tIns="0" rIns="0" bIns="0">
             <a:normAutofit/>
           </a:bodyPr>
-          <a:p>
-            <a:endParaRPr b="0" lang="en-US" sz="2000" spc="-1" strike="noStrike">
-              <a:solidFill>
-                <a:srgbClr val="0f496f"/>
+          <a:lstStyle/>
+          <a:p>
+            <a:endParaRPr lang="en-US" sz="2000" b="0" strike="noStrike" spc="-1">
+              <a:solidFill>
+                <a:srgbClr val="0F496F"/>
               </a:solidFill>
               <a:latin typeface="Century Gothic"/>
             </a:endParaRPr>
@@ -602,11 +721,14 @@
       </p:sp>
     </p:spTree>
   </p:cSld>
+  <p:clrMapOvr>
+    <a:masterClrMapping/>
+  </p:clrMapOvr>
 </p:sldLayout>
 </file>
 
 <file path=ppt/slideLayouts/slideLayout13.xml><?xml version="1.0" encoding="utf-8"?>
-<p:sldLayout xmlns:a="http://schemas.openxmlformats.org/drawingml/2006/main" xmlns:p="http://schemas.openxmlformats.org/presentationml/2006/main" xmlns:r="http://schemas.openxmlformats.org/officeDocument/2006/relationships" xmlns:p14="http://schemas.microsoft.com/office/powerpoint/2010/main" xmlns:p15="http://schemas.microsoft.com/office/powerpoint/2012/main" xmlns:mc="http://schemas.openxmlformats.org/markup-compatibility/2006" type="blank" preserve="1">
+<p:sldLayout xmlns:a="http://schemas.openxmlformats.org/drawingml/2006/main" xmlns:r="http://schemas.openxmlformats.org/officeDocument/2006/relationships" xmlns:p="http://schemas.openxmlformats.org/presentationml/2006/main" type="blank" preserve="1">
   <p:cSld name="Blank Slide">
     <p:spTree>
       <p:nvGrpSpPr>
@@ -624,11 +746,14 @@
       </p:grpSpPr>
     </p:spTree>
   </p:cSld>
+  <p:clrMapOvr>
+    <a:masterClrMapping/>
+  </p:clrMapOvr>
 </p:sldLayout>
 </file>
 
 <file path=ppt/slideLayouts/slideLayout14.xml><?xml version="1.0" encoding="utf-8"?>
-<p:sldLayout xmlns:a="http://schemas.openxmlformats.org/drawingml/2006/main" xmlns:p="http://schemas.openxmlformats.org/presentationml/2006/main" xmlns:r="http://schemas.openxmlformats.org/officeDocument/2006/relationships" xmlns:p14="http://schemas.microsoft.com/office/powerpoint/2010/main" xmlns:p15="http://schemas.microsoft.com/office/powerpoint/2012/main" xmlns:mc="http://schemas.openxmlformats.org/markup-compatibility/2006" type="tx" preserve="1">
+<p:sldLayout xmlns:a="http://schemas.openxmlformats.org/drawingml/2006/main" xmlns:r="http://schemas.openxmlformats.org/officeDocument/2006/relationships" xmlns:p="http://schemas.openxmlformats.org/presentationml/2006/main" type="tx" preserve="1">
   <p:cSld name="Title Slide">
     <p:spTree>
       <p:nvGrpSpPr>
@@ -664,13 +789,14 @@
           </a:prstGeom>
         </p:spPr>
         <p:txBody>
-          <a:bodyPr lIns="0" rIns="0" tIns="0" bIns="0" anchor="ctr">
+          <a:bodyPr lIns="0" tIns="0" rIns="0" bIns="0" anchor="ctr">
             <a:noAutofit/>
           </a:bodyPr>
-          <a:p>
-            <a:endParaRPr b="0" lang="en-US" sz="1800" spc="-1" strike="noStrike">
-              <a:solidFill>
-                <a:srgbClr val="ffffff"/>
+          <a:lstStyle/>
+          <a:p>
+            <a:endParaRPr lang="en-US" sz="1800" b="0" strike="noStrike" spc="-1">
+              <a:solidFill>
+                <a:srgbClr val="FFFFFF"/>
               </a:solidFill>
               <a:latin typeface="Century Gothic"/>
             </a:endParaRPr>
@@ -697,12 +823,13 @@
           </a:prstGeom>
         </p:spPr>
         <p:txBody>
-          <a:bodyPr lIns="0" rIns="0" tIns="0" bIns="0" anchor="ctr">
+          <a:bodyPr lIns="0" tIns="0" rIns="0" bIns="0" anchor="ctr">
             <a:noAutofit/>
           </a:bodyPr>
+          <a:lstStyle/>
           <a:p>
             <a:pPr algn="ctr"/>
-            <a:endParaRPr b="0" lang="en-CA" sz="3200" spc="-1" strike="noStrike">
+            <a:endParaRPr lang="en-CA" sz="3200" b="0" strike="noStrike" spc="-1">
               <a:latin typeface="arial"/>
             </a:endParaRPr>
           </a:p>
@@ -710,11 +837,14 @@
       </p:sp>
     </p:spTree>
   </p:cSld>
+  <p:clrMapOvr>
+    <a:masterClrMapping/>
+  </p:clrMapOvr>
 </p:sldLayout>
 </file>
 
 <file path=ppt/slideLayouts/slideLayout15.xml><?xml version="1.0" encoding="utf-8"?>
-<p:sldLayout xmlns:a="http://schemas.openxmlformats.org/drawingml/2006/main" xmlns:p="http://schemas.openxmlformats.org/presentationml/2006/main" xmlns:r="http://schemas.openxmlformats.org/officeDocument/2006/relationships" xmlns:p14="http://schemas.microsoft.com/office/powerpoint/2010/main" xmlns:p15="http://schemas.microsoft.com/office/powerpoint/2012/main" xmlns:mc="http://schemas.openxmlformats.org/markup-compatibility/2006" type="obj" preserve="1">
+<p:sldLayout xmlns:a="http://schemas.openxmlformats.org/drawingml/2006/main" xmlns:r="http://schemas.openxmlformats.org/officeDocument/2006/relationships" xmlns:p="http://schemas.openxmlformats.org/presentationml/2006/main" type="obj" preserve="1">
   <p:cSld name="Title, Content">
     <p:spTree>
       <p:nvGrpSpPr>
@@ -750,13 +880,14 @@
           </a:prstGeom>
         </p:spPr>
         <p:txBody>
-          <a:bodyPr lIns="0" rIns="0" tIns="0" bIns="0" anchor="ctr">
+          <a:bodyPr lIns="0" tIns="0" rIns="0" bIns="0" anchor="ctr">
             <a:noAutofit/>
           </a:bodyPr>
-          <a:p>
-            <a:endParaRPr b="0" lang="en-US" sz="1800" spc="-1" strike="noStrike">
-              <a:solidFill>
-                <a:srgbClr val="ffffff"/>
+          <a:lstStyle/>
+          <a:p>
+            <a:endParaRPr lang="en-US" sz="1800" b="0" strike="noStrike" spc="-1">
+              <a:solidFill>
+                <a:srgbClr val="FFFFFF"/>
               </a:solidFill>
               <a:latin typeface="Century Gothic"/>
             </a:endParaRPr>
@@ -783,13 +914,14 @@
           </a:prstGeom>
         </p:spPr>
         <p:txBody>
-          <a:bodyPr lIns="0" rIns="0" tIns="0" bIns="0">
+          <a:bodyPr lIns="0" tIns="0" rIns="0" bIns="0">
             <a:normAutofit/>
           </a:bodyPr>
-          <a:p>
-            <a:endParaRPr b="0" lang="en-US" sz="2000" spc="-1" strike="noStrike">
-              <a:solidFill>
-                <a:srgbClr val="0f496f"/>
+          <a:lstStyle/>
+          <a:p>
+            <a:endParaRPr lang="en-US" sz="2000" b="0" strike="noStrike" spc="-1">
+              <a:solidFill>
+                <a:srgbClr val="0F496F"/>
               </a:solidFill>
               <a:latin typeface="Century Gothic"/>
             </a:endParaRPr>
@@ -798,11 +930,14 @@
       </p:sp>
     </p:spTree>
   </p:cSld>
+  <p:clrMapOvr>
+    <a:masterClrMapping/>
+  </p:clrMapOvr>
 </p:sldLayout>
 </file>
 
 <file path=ppt/slideLayouts/slideLayout16.xml><?xml version="1.0" encoding="utf-8"?>
-<p:sldLayout xmlns:a="http://schemas.openxmlformats.org/drawingml/2006/main" xmlns:p="http://schemas.openxmlformats.org/presentationml/2006/main" xmlns:r="http://schemas.openxmlformats.org/officeDocument/2006/relationships" xmlns:p14="http://schemas.microsoft.com/office/powerpoint/2010/main" xmlns:p15="http://schemas.microsoft.com/office/powerpoint/2012/main" xmlns:mc="http://schemas.openxmlformats.org/markup-compatibility/2006" type="twoObj" preserve="1">
+<p:sldLayout xmlns:a="http://schemas.openxmlformats.org/drawingml/2006/main" xmlns:r="http://schemas.openxmlformats.org/officeDocument/2006/relationships" xmlns:p="http://schemas.openxmlformats.org/presentationml/2006/main" type="twoObj" preserve="1">
   <p:cSld name="Title, 2 Content">
     <p:spTree>
       <p:nvGrpSpPr>
@@ -838,13 +973,14 @@
           </a:prstGeom>
         </p:spPr>
         <p:txBody>
-          <a:bodyPr lIns="0" rIns="0" tIns="0" bIns="0" anchor="ctr">
+          <a:bodyPr lIns="0" tIns="0" rIns="0" bIns="0" anchor="ctr">
             <a:noAutofit/>
           </a:bodyPr>
-          <a:p>
-            <a:endParaRPr b="0" lang="en-US" sz="1800" spc="-1" strike="noStrike">
-              <a:solidFill>
-                <a:srgbClr val="ffffff"/>
+          <a:lstStyle/>
+          <a:p>
+            <a:endParaRPr lang="en-US" sz="1800" b="0" strike="noStrike" spc="-1">
+              <a:solidFill>
+                <a:srgbClr val="FFFFFF"/>
               </a:solidFill>
               <a:latin typeface="Century Gothic"/>
             </a:endParaRPr>
@@ -871,13 +1007,14 @@
           </a:prstGeom>
         </p:spPr>
         <p:txBody>
-          <a:bodyPr lIns="0" rIns="0" tIns="0" bIns="0">
+          <a:bodyPr lIns="0" tIns="0" rIns="0" bIns="0">
             <a:normAutofit/>
           </a:bodyPr>
-          <a:p>
-            <a:endParaRPr b="0" lang="en-US" sz="2000" spc="-1" strike="noStrike">
-              <a:solidFill>
-                <a:srgbClr val="0f496f"/>
+          <a:lstStyle/>
+          <a:p>
+            <a:endParaRPr lang="en-US" sz="2000" b="0" strike="noStrike" spc="-1">
+              <a:solidFill>
+                <a:srgbClr val="0F496F"/>
               </a:solidFill>
               <a:latin typeface="Century Gothic"/>
             </a:endParaRPr>
@@ -904,13 +1041,14 @@
           </a:prstGeom>
         </p:spPr>
         <p:txBody>
-          <a:bodyPr lIns="0" rIns="0" tIns="0" bIns="0">
+          <a:bodyPr lIns="0" tIns="0" rIns="0" bIns="0">
             <a:normAutofit/>
           </a:bodyPr>
-          <a:p>
-            <a:endParaRPr b="0" lang="en-US" sz="2000" spc="-1" strike="noStrike">
-              <a:solidFill>
-                <a:srgbClr val="0f496f"/>
+          <a:lstStyle/>
+          <a:p>
+            <a:endParaRPr lang="en-US" sz="2000" b="0" strike="noStrike" spc="-1">
+              <a:solidFill>
+                <a:srgbClr val="0F496F"/>
               </a:solidFill>
               <a:latin typeface="Century Gothic"/>
             </a:endParaRPr>
@@ -919,11 +1057,14 @@
       </p:sp>
     </p:spTree>
   </p:cSld>
+  <p:clrMapOvr>
+    <a:masterClrMapping/>
+  </p:clrMapOvr>
 </p:sldLayout>
 </file>
 
 <file path=ppt/slideLayouts/slideLayout17.xml><?xml version="1.0" encoding="utf-8"?>
-<p:sldLayout xmlns:a="http://schemas.openxmlformats.org/drawingml/2006/main" xmlns:p="http://schemas.openxmlformats.org/presentationml/2006/main" xmlns:r="http://schemas.openxmlformats.org/officeDocument/2006/relationships" xmlns:p14="http://schemas.microsoft.com/office/powerpoint/2010/main" xmlns:p15="http://schemas.microsoft.com/office/powerpoint/2012/main" xmlns:mc="http://schemas.openxmlformats.org/markup-compatibility/2006" type="titleOnly" preserve="1">
+<p:sldLayout xmlns:a="http://schemas.openxmlformats.org/drawingml/2006/main" xmlns:r="http://schemas.openxmlformats.org/officeDocument/2006/relationships" xmlns:p="http://schemas.openxmlformats.org/presentationml/2006/main" type="titleOnly" preserve="1">
   <p:cSld name="Title Only">
     <p:spTree>
       <p:nvGrpSpPr>
@@ -959,13 +1100,14 @@
           </a:prstGeom>
         </p:spPr>
         <p:txBody>
-          <a:bodyPr lIns="0" rIns="0" tIns="0" bIns="0" anchor="ctr">
+          <a:bodyPr lIns="0" tIns="0" rIns="0" bIns="0" anchor="ctr">
             <a:noAutofit/>
           </a:bodyPr>
-          <a:p>
-            <a:endParaRPr b="0" lang="en-US" sz="1800" spc="-1" strike="noStrike">
-              <a:solidFill>
-                <a:srgbClr val="ffffff"/>
+          <a:lstStyle/>
+          <a:p>
+            <a:endParaRPr lang="en-US" sz="1800" b="0" strike="noStrike" spc="-1">
+              <a:solidFill>
+                <a:srgbClr val="FFFFFF"/>
               </a:solidFill>
               <a:latin typeface="Century Gothic"/>
             </a:endParaRPr>
@@ -974,11 +1116,14 @@
       </p:sp>
     </p:spTree>
   </p:cSld>
+  <p:clrMapOvr>
+    <a:masterClrMapping/>
+  </p:clrMapOvr>
 </p:sldLayout>
 </file>
 
 <file path=ppt/slideLayouts/slideLayout18.xml><?xml version="1.0" encoding="utf-8"?>
-<p:sldLayout xmlns:a="http://schemas.openxmlformats.org/drawingml/2006/main" xmlns:p="http://schemas.openxmlformats.org/presentationml/2006/main" xmlns:r="http://schemas.openxmlformats.org/officeDocument/2006/relationships" xmlns:p14="http://schemas.microsoft.com/office/powerpoint/2010/main" xmlns:p15="http://schemas.microsoft.com/office/powerpoint/2012/main" xmlns:mc="http://schemas.openxmlformats.org/markup-compatibility/2006" type="objOnly" preserve="1">
+<p:sldLayout xmlns:a="http://schemas.openxmlformats.org/drawingml/2006/main" xmlns:r="http://schemas.openxmlformats.org/officeDocument/2006/relationships" xmlns:p="http://schemas.openxmlformats.org/presentationml/2006/main" type="objOnly" preserve="1">
   <p:cSld name="Centered Text">
     <p:spTree>
       <p:nvGrpSpPr>
@@ -1014,12 +1159,13 @@
           </a:prstGeom>
         </p:spPr>
         <p:txBody>
-          <a:bodyPr lIns="0" rIns="0" tIns="0" bIns="0" anchor="ctr">
+          <a:bodyPr lIns="0" tIns="0" rIns="0" bIns="0" anchor="ctr">
             <a:noAutofit/>
           </a:bodyPr>
+          <a:lstStyle/>
           <a:p>
             <a:pPr algn="ctr"/>
-            <a:endParaRPr b="0" lang="en-CA" sz="3200" spc="-1" strike="noStrike">
+            <a:endParaRPr lang="en-CA" sz="3200" b="0" strike="noStrike" spc="-1">
               <a:latin typeface="arial"/>
             </a:endParaRPr>
           </a:p>
@@ -1027,11 +1173,14 @@
       </p:sp>
     </p:spTree>
   </p:cSld>
+  <p:clrMapOvr>
+    <a:masterClrMapping/>
+  </p:clrMapOvr>
 </p:sldLayout>
 </file>
 
 <file path=ppt/slideLayouts/slideLayout19.xml><?xml version="1.0" encoding="utf-8"?>
-<p:sldLayout xmlns:a="http://schemas.openxmlformats.org/drawingml/2006/main" xmlns:p="http://schemas.openxmlformats.org/presentationml/2006/main" xmlns:r="http://schemas.openxmlformats.org/officeDocument/2006/relationships" xmlns:p14="http://schemas.microsoft.com/office/powerpoint/2010/main" xmlns:p15="http://schemas.microsoft.com/office/powerpoint/2012/main" xmlns:mc="http://schemas.openxmlformats.org/markup-compatibility/2006" type="twoObjAndObj" preserve="1">
+<p:sldLayout xmlns:a="http://schemas.openxmlformats.org/drawingml/2006/main" xmlns:r="http://schemas.openxmlformats.org/officeDocument/2006/relationships" xmlns:p="http://schemas.openxmlformats.org/presentationml/2006/main" type="twoObjAndObj" preserve="1">
   <p:cSld name="Title, 2 Content and Content">
     <p:spTree>
       <p:nvGrpSpPr>
@@ -1067,13 +1216,14 @@
           </a:prstGeom>
         </p:spPr>
         <p:txBody>
-          <a:bodyPr lIns="0" rIns="0" tIns="0" bIns="0" anchor="ctr">
+          <a:bodyPr lIns="0" tIns="0" rIns="0" bIns="0" anchor="ctr">
             <a:noAutofit/>
           </a:bodyPr>
-          <a:p>
-            <a:endParaRPr b="0" lang="en-US" sz="1800" spc="-1" strike="noStrike">
-              <a:solidFill>
-                <a:srgbClr val="ffffff"/>
+          <a:lstStyle/>
+          <a:p>
+            <a:endParaRPr lang="en-US" sz="1800" b="0" strike="noStrike" spc="-1">
+              <a:solidFill>
+                <a:srgbClr val="FFFFFF"/>
               </a:solidFill>
               <a:latin typeface="Century Gothic"/>
             </a:endParaRPr>
@@ -1100,13 +1250,14 @@
           </a:prstGeom>
         </p:spPr>
         <p:txBody>
-          <a:bodyPr lIns="0" rIns="0" tIns="0" bIns="0">
+          <a:bodyPr lIns="0" tIns="0" rIns="0" bIns="0">
             <a:normAutofit/>
           </a:bodyPr>
-          <a:p>
-            <a:endParaRPr b="0" lang="en-US" sz="2000" spc="-1" strike="noStrike">
-              <a:solidFill>
-                <a:srgbClr val="0f496f"/>
+          <a:lstStyle/>
+          <a:p>
+            <a:endParaRPr lang="en-US" sz="2000" b="0" strike="noStrike" spc="-1">
+              <a:solidFill>
+                <a:srgbClr val="0F496F"/>
               </a:solidFill>
               <a:latin typeface="Century Gothic"/>
             </a:endParaRPr>
@@ -1133,13 +1284,14 @@
           </a:prstGeom>
         </p:spPr>
         <p:txBody>
-          <a:bodyPr lIns="0" rIns="0" tIns="0" bIns="0">
+          <a:bodyPr lIns="0" tIns="0" rIns="0" bIns="0">
             <a:normAutofit/>
           </a:bodyPr>
-          <a:p>
-            <a:endParaRPr b="0" lang="en-US" sz="2000" spc="-1" strike="noStrike">
-              <a:solidFill>
-                <a:srgbClr val="0f496f"/>
+          <a:lstStyle/>
+          <a:p>
+            <a:endParaRPr lang="en-US" sz="2000" b="0" strike="noStrike" spc="-1">
+              <a:solidFill>
+                <a:srgbClr val="0F496F"/>
               </a:solidFill>
               <a:latin typeface="Century Gothic"/>
             </a:endParaRPr>
@@ -1166,13 +1318,14 @@
           </a:prstGeom>
         </p:spPr>
         <p:txBody>
-          <a:bodyPr lIns="0" rIns="0" tIns="0" bIns="0">
+          <a:bodyPr lIns="0" tIns="0" rIns="0" bIns="0">
             <a:normAutofit/>
           </a:bodyPr>
-          <a:p>
-            <a:endParaRPr b="0" lang="en-US" sz="2000" spc="-1" strike="noStrike">
-              <a:solidFill>
-                <a:srgbClr val="0f496f"/>
+          <a:lstStyle/>
+          <a:p>
+            <a:endParaRPr lang="en-US" sz="2000" b="0" strike="noStrike" spc="-1">
+              <a:solidFill>
+                <a:srgbClr val="0F496F"/>
               </a:solidFill>
               <a:latin typeface="Century Gothic"/>
             </a:endParaRPr>
@@ -1181,11 +1334,14 @@
       </p:sp>
     </p:spTree>
   </p:cSld>
+  <p:clrMapOvr>
+    <a:masterClrMapping/>
+  </p:clrMapOvr>
 </p:sldLayout>
 </file>
 
 <file path=ppt/slideLayouts/slideLayout2.xml><?xml version="1.0" encoding="utf-8"?>
-<p:sldLayout xmlns:a="http://schemas.openxmlformats.org/drawingml/2006/main" xmlns:p="http://schemas.openxmlformats.org/presentationml/2006/main" xmlns:r="http://schemas.openxmlformats.org/officeDocument/2006/relationships" xmlns:p14="http://schemas.microsoft.com/office/powerpoint/2010/main" xmlns:p15="http://schemas.microsoft.com/office/powerpoint/2012/main" xmlns:mc="http://schemas.openxmlformats.org/markup-compatibility/2006" type="tx" preserve="1">
+<p:sldLayout xmlns:a="http://schemas.openxmlformats.org/drawingml/2006/main" xmlns:r="http://schemas.openxmlformats.org/officeDocument/2006/relationships" xmlns:p="http://schemas.openxmlformats.org/presentationml/2006/main" type="tx" preserve="1">
   <p:cSld name="Title Slide">
     <p:spTree>
       <p:nvGrpSpPr>
@@ -1221,13 +1377,14 @@
           </a:prstGeom>
         </p:spPr>
         <p:txBody>
-          <a:bodyPr lIns="0" rIns="0" tIns="0" bIns="0" anchor="ctr">
+          <a:bodyPr lIns="0" tIns="0" rIns="0" bIns="0" anchor="ctr">
             <a:noAutofit/>
           </a:bodyPr>
-          <a:p>
-            <a:endParaRPr b="0" lang="en-US" sz="1800" spc="-1" strike="noStrike">
-              <a:solidFill>
-                <a:srgbClr val="ffffff"/>
+          <a:lstStyle/>
+          <a:p>
+            <a:endParaRPr lang="en-US" sz="1800" b="0" strike="noStrike" spc="-1">
+              <a:solidFill>
+                <a:srgbClr val="FFFFFF"/>
               </a:solidFill>
               <a:latin typeface="Century Gothic"/>
             </a:endParaRPr>
@@ -1254,12 +1411,13 @@
           </a:prstGeom>
         </p:spPr>
         <p:txBody>
-          <a:bodyPr lIns="0" rIns="0" tIns="0" bIns="0" anchor="ctr">
+          <a:bodyPr lIns="0" tIns="0" rIns="0" bIns="0" anchor="ctr">
             <a:noAutofit/>
           </a:bodyPr>
+          <a:lstStyle/>
           <a:p>
             <a:pPr algn="ctr"/>
-            <a:endParaRPr b="0" lang="en-CA" sz="3200" spc="-1" strike="noStrike">
+            <a:endParaRPr lang="en-CA" sz="3200" b="0" strike="noStrike" spc="-1">
               <a:latin typeface="arial"/>
             </a:endParaRPr>
           </a:p>
@@ -1267,11 +1425,14 @@
       </p:sp>
     </p:spTree>
   </p:cSld>
+  <p:clrMapOvr>
+    <a:masterClrMapping/>
+  </p:clrMapOvr>
 </p:sldLayout>
 </file>
 
 <file path=ppt/slideLayouts/slideLayout20.xml><?xml version="1.0" encoding="utf-8"?>
-<p:sldLayout xmlns:a="http://schemas.openxmlformats.org/drawingml/2006/main" xmlns:p="http://schemas.openxmlformats.org/presentationml/2006/main" xmlns:r="http://schemas.openxmlformats.org/officeDocument/2006/relationships" xmlns:p14="http://schemas.microsoft.com/office/powerpoint/2010/main" xmlns:p15="http://schemas.microsoft.com/office/powerpoint/2012/main" xmlns:mc="http://schemas.openxmlformats.org/markup-compatibility/2006" type="objAndTwoObj" preserve="1">
+<p:sldLayout xmlns:a="http://schemas.openxmlformats.org/drawingml/2006/main" xmlns:r="http://schemas.openxmlformats.org/officeDocument/2006/relationships" xmlns:p="http://schemas.openxmlformats.org/presentationml/2006/main" type="objAndTwoObj" preserve="1">
   <p:cSld name="Title Content and 2 Content">
     <p:spTree>
       <p:nvGrpSpPr>
@@ -1307,13 +1468,14 @@
           </a:prstGeom>
         </p:spPr>
         <p:txBody>
-          <a:bodyPr lIns="0" rIns="0" tIns="0" bIns="0" anchor="ctr">
+          <a:bodyPr lIns="0" tIns="0" rIns="0" bIns="0" anchor="ctr">
             <a:noAutofit/>
           </a:bodyPr>
-          <a:p>
-            <a:endParaRPr b="0" lang="en-US" sz="1800" spc="-1" strike="noStrike">
-              <a:solidFill>
-                <a:srgbClr val="ffffff"/>
+          <a:lstStyle/>
+          <a:p>
+            <a:endParaRPr lang="en-US" sz="1800" b="0" strike="noStrike" spc="-1">
+              <a:solidFill>
+                <a:srgbClr val="FFFFFF"/>
               </a:solidFill>
               <a:latin typeface="Century Gothic"/>
             </a:endParaRPr>
@@ -1340,13 +1502,14 @@
           </a:prstGeom>
         </p:spPr>
         <p:txBody>
-          <a:bodyPr lIns="0" rIns="0" tIns="0" bIns="0">
+          <a:bodyPr lIns="0" tIns="0" rIns="0" bIns="0">
             <a:normAutofit/>
           </a:bodyPr>
-          <a:p>
-            <a:endParaRPr b="0" lang="en-US" sz="2000" spc="-1" strike="noStrike">
-              <a:solidFill>
-                <a:srgbClr val="0f496f"/>
+          <a:lstStyle/>
+          <a:p>
+            <a:endParaRPr lang="en-US" sz="2000" b="0" strike="noStrike" spc="-1">
+              <a:solidFill>
+                <a:srgbClr val="0F496F"/>
               </a:solidFill>
               <a:latin typeface="Century Gothic"/>
             </a:endParaRPr>
@@ -1373,13 +1536,14 @@
           </a:prstGeom>
         </p:spPr>
         <p:txBody>
-          <a:bodyPr lIns="0" rIns="0" tIns="0" bIns="0">
+          <a:bodyPr lIns="0" tIns="0" rIns="0" bIns="0">
             <a:normAutofit/>
           </a:bodyPr>
-          <a:p>
-            <a:endParaRPr b="0" lang="en-US" sz="2000" spc="-1" strike="noStrike">
-              <a:solidFill>
-                <a:srgbClr val="0f496f"/>
+          <a:lstStyle/>
+          <a:p>
+            <a:endParaRPr lang="en-US" sz="2000" b="0" strike="noStrike" spc="-1">
+              <a:solidFill>
+                <a:srgbClr val="0F496F"/>
               </a:solidFill>
               <a:latin typeface="Century Gothic"/>
             </a:endParaRPr>
@@ -1406,13 +1570,14 @@
           </a:prstGeom>
         </p:spPr>
         <p:txBody>
-          <a:bodyPr lIns="0" rIns="0" tIns="0" bIns="0">
+          <a:bodyPr lIns="0" tIns="0" rIns="0" bIns="0">
             <a:normAutofit/>
           </a:bodyPr>
-          <a:p>
-            <a:endParaRPr b="0" lang="en-US" sz="2000" spc="-1" strike="noStrike">
-              <a:solidFill>
-                <a:srgbClr val="0f496f"/>
+          <a:lstStyle/>
+          <a:p>
+            <a:endParaRPr lang="en-US" sz="2000" b="0" strike="noStrike" spc="-1">
+              <a:solidFill>
+                <a:srgbClr val="0F496F"/>
               </a:solidFill>
               <a:latin typeface="Century Gothic"/>
             </a:endParaRPr>
@@ -1421,11 +1586,14 @@
       </p:sp>
     </p:spTree>
   </p:cSld>
+  <p:clrMapOvr>
+    <a:masterClrMapping/>
+  </p:clrMapOvr>
 </p:sldLayout>
 </file>
 
 <file path=ppt/slideLayouts/slideLayout21.xml><?xml version="1.0" encoding="utf-8"?>
-<p:sldLayout xmlns:a="http://schemas.openxmlformats.org/drawingml/2006/main" xmlns:p="http://schemas.openxmlformats.org/presentationml/2006/main" xmlns:r="http://schemas.openxmlformats.org/officeDocument/2006/relationships" xmlns:p14="http://schemas.microsoft.com/office/powerpoint/2010/main" xmlns:p15="http://schemas.microsoft.com/office/powerpoint/2012/main" xmlns:mc="http://schemas.openxmlformats.org/markup-compatibility/2006" type="twoObjOverTx" preserve="1">
+<p:sldLayout xmlns:a="http://schemas.openxmlformats.org/drawingml/2006/main" xmlns:r="http://schemas.openxmlformats.org/officeDocument/2006/relationships" xmlns:p="http://schemas.openxmlformats.org/presentationml/2006/main" type="twoObjOverTx" preserve="1">
   <p:cSld name="Title, 2 Content over Content">
     <p:spTree>
       <p:nvGrpSpPr>
@@ -1461,13 +1629,14 @@
           </a:prstGeom>
         </p:spPr>
         <p:txBody>
-          <a:bodyPr lIns="0" rIns="0" tIns="0" bIns="0" anchor="ctr">
+          <a:bodyPr lIns="0" tIns="0" rIns="0" bIns="0" anchor="ctr">
             <a:noAutofit/>
           </a:bodyPr>
-          <a:p>
-            <a:endParaRPr b="0" lang="en-US" sz="1800" spc="-1" strike="noStrike">
-              <a:solidFill>
-                <a:srgbClr val="ffffff"/>
+          <a:lstStyle/>
+          <a:p>
+            <a:endParaRPr lang="en-US" sz="1800" b="0" strike="noStrike" spc="-1">
+              <a:solidFill>
+                <a:srgbClr val="FFFFFF"/>
               </a:solidFill>
               <a:latin typeface="Century Gothic"/>
             </a:endParaRPr>
@@ -1494,13 +1663,14 @@
           </a:prstGeom>
         </p:spPr>
         <p:txBody>
-          <a:bodyPr lIns="0" rIns="0" tIns="0" bIns="0">
+          <a:bodyPr lIns="0" tIns="0" rIns="0" bIns="0">
             <a:normAutofit/>
           </a:bodyPr>
-          <a:p>
-            <a:endParaRPr b="0" lang="en-US" sz="2000" spc="-1" strike="noStrike">
-              <a:solidFill>
-                <a:srgbClr val="0f496f"/>
+          <a:lstStyle/>
+          <a:p>
+            <a:endParaRPr lang="en-US" sz="2000" b="0" strike="noStrike" spc="-1">
+              <a:solidFill>
+                <a:srgbClr val="0F496F"/>
               </a:solidFill>
               <a:latin typeface="Century Gothic"/>
             </a:endParaRPr>
@@ -1527,13 +1697,14 @@
           </a:prstGeom>
         </p:spPr>
         <p:txBody>
-          <a:bodyPr lIns="0" rIns="0" tIns="0" bIns="0">
+          <a:bodyPr lIns="0" tIns="0" rIns="0" bIns="0">
             <a:normAutofit/>
           </a:bodyPr>
-          <a:p>
-            <a:endParaRPr b="0" lang="en-US" sz="2000" spc="-1" strike="noStrike">
-              <a:solidFill>
-                <a:srgbClr val="0f496f"/>
+          <a:lstStyle/>
+          <a:p>
+            <a:endParaRPr lang="en-US" sz="2000" b="0" strike="noStrike" spc="-1">
+              <a:solidFill>
+                <a:srgbClr val="0F496F"/>
               </a:solidFill>
               <a:latin typeface="Century Gothic"/>
             </a:endParaRPr>
@@ -1560,13 +1731,14 @@
           </a:prstGeom>
         </p:spPr>
         <p:txBody>
-          <a:bodyPr lIns="0" rIns="0" tIns="0" bIns="0">
+          <a:bodyPr lIns="0" tIns="0" rIns="0" bIns="0">
             <a:normAutofit/>
           </a:bodyPr>
-          <a:p>
-            <a:endParaRPr b="0" lang="en-US" sz="2000" spc="-1" strike="noStrike">
-              <a:solidFill>
-                <a:srgbClr val="0f496f"/>
+          <a:lstStyle/>
+          <a:p>
+            <a:endParaRPr lang="en-US" sz="2000" b="0" strike="noStrike" spc="-1">
+              <a:solidFill>
+                <a:srgbClr val="0F496F"/>
               </a:solidFill>
               <a:latin typeface="Century Gothic"/>
             </a:endParaRPr>
@@ -1575,11 +1747,14 @@
       </p:sp>
     </p:spTree>
   </p:cSld>
+  <p:clrMapOvr>
+    <a:masterClrMapping/>
+  </p:clrMapOvr>
 </p:sldLayout>
 </file>
 
 <file path=ppt/slideLayouts/slideLayout22.xml><?xml version="1.0" encoding="utf-8"?>
-<p:sldLayout xmlns:a="http://schemas.openxmlformats.org/drawingml/2006/main" xmlns:p="http://schemas.openxmlformats.org/presentationml/2006/main" xmlns:r="http://schemas.openxmlformats.org/officeDocument/2006/relationships" xmlns:p14="http://schemas.microsoft.com/office/powerpoint/2010/main" xmlns:p15="http://schemas.microsoft.com/office/powerpoint/2012/main" xmlns:mc="http://schemas.openxmlformats.org/markup-compatibility/2006" type="objOverTx" preserve="1">
+<p:sldLayout xmlns:a="http://schemas.openxmlformats.org/drawingml/2006/main" xmlns:r="http://schemas.openxmlformats.org/officeDocument/2006/relationships" xmlns:p="http://schemas.openxmlformats.org/presentationml/2006/main" type="objOverTx" preserve="1">
   <p:cSld name="Title, Content over Content">
     <p:spTree>
       <p:nvGrpSpPr>
@@ -1615,13 +1790,14 @@
           </a:prstGeom>
         </p:spPr>
         <p:txBody>
-          <a:bodyPr lIns="0" rIns="0" tIns="0" bIns="0" anchor="ctr">
+          <a:bodyPr lIns="0" tIns="0" rIns="0" bIns="0" anchor="ctr">
             <a:noAutofit/>
           </a:bodyPr>
-          <a:p>
-            <a:endParaRPr b="0" lang="en-US" sz="1800" spc="-1" strike="noStrike">
-              <a:solidFill>
-                <a:srgbClr val="ffffff"/>
+          <a:lstStyle/>
+          <a:p>
+            <a:endParaRPr lang="en-US" sz="1800" b="0" strike="noStrike" spc="-1">
+              <a:solidFill>
+                <a:srgbClr val="FFFFFF"/>
               </a:solidFill>
               <a:latin typeface="Century Gothic"/>
             </a:endParaRPr>
@@ -1648,13 +1824,14 @@
           </a:prstGeom>
         </p:spPr>
         <p:txBody>
-          <a:bodyPr lIns="0" rIns="0" tIns="0" bIns="0">
+          <a:bodyPr lIns="0" tIns="0" rIns="0" bIns="0">
             <a:normAutofit/>
           </a:bodyPr>
-          <a:p>
-            <a:endParaRPr b="0" lang="en-US" sz="2000" spc="-1" strike="noStrike">
-              <a:solidFill>
-                <a:srgbClr val="0f496f"/>
+          <a:lstStyle/>
+          <a:p>
+            <a:endParaRPr lang="en-US" sz="2000" b="0" strike="noStrike" spc="-1">
+              <a:solidFill>
+                <a:srgbClr val="0F496F"/>
               </a:solidFill>
               <a:latin typeface="Century Gothic"/>
             </a:endParaRPr>
@@ -1681,13 +1858,14 @@
           </a:prstGeom>
         </p:spPr>
         <p:txBody>
-          <a:bodyPr lIns="0" rIns="0" tIns="0" bIns="0">
+          <a:bodyPr lIns="0" tIns="0" rIns="0" bIns="0">
             <a:normAutofit/>
           </a:bodyPr>
-          <a:p>
-            <a:endParaRPr b="0" lang="en-US" sz="2000" spc="-1" strike="noStrike">
-              <a:solidFill>
-                <a:srgbClr val="0f496f"/>
+          <a:lstStyle/>
+          <a:p>
+            <a:endParaRPr lang="en-US" sz="2000" b="0" strike="noStrike" spc="-1">
+              <a:solidFill>
+                <a:srgbClr val="0F496F"/>
               </a:solidFill>
               <a:latin typeface="Century Gothic"/>
             </a:endParaRPr>
@@ -1696,11 +1874,14 @@
       </p:sp>
     </p:spTree>
   </p:cSld>
+  <p:clrMapOvr>
+    <a:masterClrMapping/>
+  </p:clrMapOvr>
 </p:sldLayout>
 </file>
 
 <file path=ppt/slideLayouts/slideLayout23.xml><?xml version="1.0" encoding="utf-8"?>
-<p:sldLayout xmlns:a="http://schemas.openxmlformats.org/drawingml/2006/main" xmlns:p="http://schemas.openxmlformats.org/presentationml/2006/main" xmlns:r="http://schemas.openxmlformats.org/officeDocument/2006/relationships" xmlns:p14="http://schemas.microsoft.com/office/powerpoint/2010/main" xmlns:p15="http://schemas.microsoft.com/office/powerpoint/2012/main" xmlns:mc="http://schemas.openxmlformats.org/markup-compatibility/2006" type="fourObj" preserve="1">
+<p:sldLayout xmlns:a="http://schemas.openxmlformats.org/drawingml/2006/main" xmlns:r="http://schemas.openxmlformats.org/officeDocument/2006/relationships" xmlns:p="http://schemas.openxmlformats.org/presentationml/2006/main" type="fourObj" preserve="1">
   <p:cSld name="Title, 4 Content">
     <p:spTree>
       <p:nvGrpSpPr>
@@ -1736,13 +1917,14 @@
           </a:prstGeom>
         </p:spPr>
         <p:txBody>
-          <a:bodyPr lIns="0" rIns="0" tIns="0" bIns="0" anchor="ctr">
+          <a:bodyPr lIns="0" tIns="0" rIns="0" bIns="0" anchor="ctr">
             <a:noAutofit/>
           </a:bodyPr>
-          <a:p>
-            <a:endParaRPr b="0" lang="en-US" sz="1800" spc="-1" strike="noStrike">
-              <a:solidFill>
-                <a:srgbClr val="ffffff"/>
+          <a:lstStyle/>
+          <a:p>
+            <a:endParaRPr lang="en-US" sz="1800" b="0" strike="noStrike" spc="-1">
+              <a:solidFill>
+                <a:srgbClr val="FFFFFF"/>
               </a:solidFill>
               <a:latin typeface="Century Gothic"/>
             </a:endParaRPr>
@@ -1769,13 +1951,14 @@
           </a:prstGeom>
         </p:spPr>
         <p:txBody>
-          <a:bodyPr lIns="0" rIns="0" tIns="0" bIns="0">
+          <a:bodyPr lIns="0" tIns="0" rIns="0" bIns="0">
             <a:normAutofit/>
           </a:bodyPr>
-          <a:p>
-            <a:endParaRPr b="0" lang="en-US" sz="2000" spc="-1" strike="noStrike">
-              <a:solidFill>
-                <a:srgbClr val="0f496f"/>
+          <a:lstStyle/>
+          <a:p>
+            <a:endParaRPr lang="en-US" sz="2000" b="0" strike="noStrike" spc="-1">
+              <a:solidFill>
+                <a:srgbClr val="0F496F"/>
               </a:solidFill>
               <a:latin typeface="Century Gothic"/>
             </a:endParaRPr>
@@ -1802,13 +1985,14 @@
           </a:prstGeom>
         </p:spPr>
         <p:txBody>
-          <a:bodyPr lIns="0" rIns="0" tIns="0" bIns="0">
+          <a:bodyPr lIns="0" tIns="0" rIns="0" bIns="0">
             <a:normAutofit/>
           </a:bodyPr>
-          <a:p>
-            <a:endParaRPr b="0" lang="en-US" sz="2000" spc="-1" strike="noStrike">
-              <a:solidFill>
-                <a:srgbClr val="0f496f"/>
+          <a:lstStyle/>
+          <a:p>
+            <a:endParaRPr lang="en-US" sz="2000" b="0" strike="noStrike" spc="-1">
+              <a:solidFill>
+                <a:srgbClr val="0F496F"/>
               </a:solidFill>
               <a:latin typeface="Century Gothic"/>
             </a:endParaRPr>
@@ -1835,13 +2019,14 @@
           </a:prstGeom>
         </p:spPr>
         <p:txBody>
-          <a:bodyPr lIns="0" rIns="0" tIns="0" bIns="0">
+          <a:bodyPr lIns="0" tIns="0" rIns="0" bIns="0">
             <a:normAutofit/>
           </a:bodyPr>
-          <a:p>
-            <a:endParaRPr b="0" lang="en-US" sz="2000" spc="-1" strike="noStrike">
-              <a:solidFill>
-                <a:srgbClr val="0f496f"/>
+          <a:lstStyle/>
+          <a:p>
+            <a:endParaRPr lang="en-US" sz="2000" b="0" strike="noStrike" spc="-1">
+              <a:solidFill>
+                <a:srgbClr val="0F496F"/>
               </a:solidFill>
               <a:latin typeface="Century Gothic"/>
             </a:endParaRPr>
@@ -1868,13 +2053,14 @@
           </a:prstGeom>
         </p:spPr>
         <p:txBody>
-          <a:bodyPr lIns="0" rIns="0" tIns="0" bIns="0">
+          <a:bodyPr lIns="0" tIns="0" rIns="0" bIns="0">
             <a:normAutofit/>
           </a:bodyPr>
-          <a:p>
-            <a:endParaRPr b="0" lang="en-US" sz="2000" spc="-1" strike="noStrike">
-              <a:solidFill>
-                <a:srgbClr val="0f496f"/>
+          <a:lstStyle/>
+          <a:p>
+            <a:endParaRPr lang="en-US" sz="2000" b="0" strike="noStrike" spc="-1">
+              <a:solidFill>
+                <a:srgbClr val="0F496F"/>
               </a:solidFill>
               <a:latin typeface="Century Gothic"/>
             </a:endParaRPr>
@@ -1883,11 +2069,14 @@
       </p:sp>
     </p:spTree>
   </p:cSld>
+  <p:clrMapOvr>
+    <a:masterClrMapping/>
+  </p:clrMapOvr>
 </p:sldLayout>
 </file>
 
 <file path=ppt/slideLayouts/slideLayout24.xml><?xml version="1.0" encoding="utf-8"?>
-<p:sldLayout xmlns:a="http://schemas.openxmlformats.org/drawingml/2006/main" xmlns:p="http://schemas.openxmlformats.org/presentationml/2006/main" xmlns:r="http://schemas.openxmlformats.org/officeDocument/2006/relationships" xmlns:p14="http://schemas.microsoft.com/office/powerpoint/2010/main" xmlns:p15="http://schemas.microsoft.com/office/powerpoint/2012/main" xmlns:mc="http://schemas.openxmlformats.org/markup-compatibility/2006" type="blank" preserve="1">
+<p:sldLayout xmlns:a="http://schemas.openxmlformats.org/drawingml/2006/main" xmlns:r="http://schemas.openxmlformats.org/officeDocument/2006/relationships" xmlns:p="http://schemas.openxmlformats.org/presentationml/2006/main" type="blank" preserve="1">
   <p:cSld name="Title, 6 Content">
     <p:spTree>
       <p:nvGrpSpPr>
@@ -1923,13 +2112,14 @@
           </a:prstGeom>
         </p:spPr>
         <p:txBody>
-          <a:bodyPr lIns="0" rIns="0" tIns="0" bIns="0" anchor="ctr">
+          <a:bodyPr lIns="0" tIns="0" rIns="0" bIns="0" anchor="ctr">
             <a:noAutofit/>
           </a:bodyPr>
-          <a:p>
-            <a:endParaRPr b="0" lang="en-US" sz="1800" spc="-1" strike="noStrike">
-              <a:solidFill>
-                <a:srgbClr val="ffffff"/>
+          <a:lstStyle/>
+          <a:p>
+            <a:endParaRPr lang="en-US" sz="1800" b="0" strike="noStrike" spc="-1">
+              <a:solidFill>
+                <a:srgbClr val="FFFFFF"/>
               </a:solidFill>
               <a:latin typeface="Century Gothic"/>
             </a:endParaRPr>
@@ -1956,13 +2146,14 @@
           </a:prstGeom>
         </p:spPr>
         <p:txBody>
-          <a:bodyPr lIns="0" rIns="0" tIns="0" bIns="0">
+          <a:bodyPr lIns="0" tIns="0" rIns="0" bIns="0">
             <a:normAutofit/>
           </a:bodyPr>
-          <a:p>
-            <a:endParaRPr b="0" lang="en-US" sz="2000" spc="-1" strike="noStrike">
-              <a:solidFill>
-                <a:srgbClr val="0f496f"/>
+          <a:lstStyle/>
+          <a:p>
+            <a:endParaRPr lang="en-US" sz="2000" b="0" strike="noStrike" spc="-1">
+              <a:solidFill>
+                <a:srgbClr val="0F496F"/>
               </a:solidFill>
               <a:latin typeface="Century Gothic"/>
             </a:endParaRPr>
@@ -1989,13 +2180,14 @@
           </a:prstGeom>
         </p:spPr>
         <p:txBody>
-          <a:bodyPr lIns="0" rIns="0" tIns="0" bIns="0">
+          <a:bodyPr lIns="0" tIns="0" rIns="0" bIns="0">
             <a:normAutofit/>
           </a:bodyPr>
-          <a:p>
-            <a:endParaRPr b="0" lang="en-US" sz="2000" spc="-1" strike="noStrike">
-              <a:solidFill>
-                <a:srgbClr val="0f496f"/>
+          <a:lstStyle/>
+          <a:p>
+            <a:endParaRPr lang="en-US" sz="2000" b="0" strike="noStrike" spc="-1">
+              <a:solidFill>
+                <a:srgbClr val="0F496F"/>
               </a:solidFill>
               <a:latin typeface="Century Gothic"/>
             </a:endParaRPr>
@@ -2022,13 +2214,14 @@
           </a:prstGeom>
         </p:spPr>
         <p:txBody>
-          <a:bodyPr lIns="0" rIns="0" tIns="0" bIns="0">
+          <a:bodyPr lIns="0" tIns="0" rIns="0" bIns="0">
             <a:normAutofit/>
           </a:bodyPr>
-          <a:p>
-            <a:endParaRPr b="0" lang="en-US" sz="2000" spc="-1" strike="noStrike">
-              <a:solidFill>
-                <a:srgbClr val="0f496f"/>
+          <a:lstStyle/>
+          <a:p>
+            <a:endParaRPr lang="en-US" sz="2000" b="0" strike="noStrike" spc="-1">
+              <a:solidFill>
+                <a:srgbClr val="0F496F"/>
               </a:solidFill>
               <a:latin typeface="Century Gothic"/>
             </a:endParaRPr>
@@ -2055,13 +2248,14 @@
           </a:prstGeom>
         </p:spPr>
         <p:txBody>
-          <a:bodyPr lIns="0" rIns="0" tIns="0" bIns="0">
+          <a:bodyPr lIns="0" tIns="0" rIns="0" bIns="0">
             <a:normAutofit/>
           </a:bodyPr>
-          <a:p>
-            <a:endParaRPr b="0" lang="en-US" sz="2000" spc="-1" strike="noStrike">
-              <a:solidFill>
-                <a:srgbClr val="0f496f"/>
+          <a:lstStyle/>
+          <a:p>
+            <a:endParaRPr lang="en-US" sz="2000" b="0" strike="noStrike" spc="-1">
+              <a:solidFill>
+                <a:srgbClr val="0F496F"/>
               </a:solidFill>
               <a:latin typeface="Century Gothic"/>
             </a:endParaRPr>
@@ -2088,13 +2282,14 @@
           </a:prstGeom>
         </p:spPr>
         <p:txBody>
-          <a:bodyPr lIns="0" rIns="0" tIns="0" bIns="0">
+          <a:bodyPr lIns="0" tIns="0" rIns="0" bIns="0">
             <a:normAutofit/>
           </a:bodyPr>
-          <a:p>
-            <a:endParaRPr b="0" lang="en-US" sz="2000" spc="-1" strike="noStrike">
-              <a:solidFill>
-                <a:srgbClr val="0f496f"/>
+          <a:lstStyle/>
+          <a:p>
+            <a:endParaRPr lang="en-US" sz="2000" b="0" strike="noStrike" spc="-1">
+              <a:solidFill>
+                <a:srgbClr val="0F496F"/>
               </a:solidFill>
               <a:latin typeface="Century Gothic"/>
             </a:endParaRPr>
@@ -2121,13 +2316,14 @@
           </a:prstGeom>
         </p:spPr>
         <p:txBody>
-          <a:bodyPr lIns="0" rIns="0" tIns="0" bIns="0">
+          <a:bodyPr lIns="0" tIns="0" rIns="0" bIns="0">
             <a:normAutofit/>
           </a:bodyPr>
-          <a:p>
-            <a:endParaRPr b="0" lang="en-US" sz="2000" spc="-1" strike="noStrike">
-              <a:solidFill>
-                <a:srgbClr val="0f496f"/>
+          <a:lstStyle/>
+          <a:p>
+            <a:endParaRPr lang="en-US" sz="2000" b="0" strike="noStrike" spc="-1">
+              <a:solidFill>
+                <a:srgbClr val="0F496F"/>
               </a:solidFill>
               <a:latin typeface="Century Gothic"/>
             </a:endParaRPr>
@@ -2136,11 +2332,14 @@
       </p:sp>
     </p:spTree>
   </p:cSld>
+  <p:clrMapOvr>
+    <a:masterClrMapping/>
+  </p:clrMapOvr>
 </p:sldLayout>
 </file>
 
 <file path=ppt/slideLayouts/slideLayout3.xml><?xml version="1.0" encoding="utf-8"?>
-<p:sldLayout xmlns:a="http://schemas.openxmlformats.org/drawingml/2006/main" xmlns:p="http://schemas.openxmlformats.org/presentationml/2006/main" xmlns:r="http://schemas.openxmlformats.org/officeDocument/2006/relationships" xmlns:p14="http://schemas.microsoft.com/office/powerpoint/2010/main" xmlns:p15="http://schemas.microsoft.com/office/powerpoint/2012/main" xmlns:mc="http://schemas.openxmlformats.org/markup-compatibility/2006" type="obj" preserve="1">
+<p:sldLayout xmlns:a="http://schemas.openxmlformats.org/drawingml/2006/main" xmlns:r="http://schemas.openxmlformats.org/officeDocument/2006/relationships" xmlns:p="http://schemas.openxmlformats.org/presentationml/2006/main" type="obj" preserve="1">
   <p:cSld name="Title, Content">
     <p:spTree>
       <p:nvGrpSpPr>
@@ -2176,13 +2375,14 @@
           </a:prstGeom>
         </p:spPr>
         <p:txBody>
-          <a:bodyPr lIns="0" rIns="0" tIns="0" bIns="0" anchor="ctr">
+          <a:bodyPr lIns="0" tIns="0" rIns="0" bIns="0" anchor="ctr">
             <a:noAutofit/>
           </a:bodyPr>
-          <a:p>
-            <a:endParaRPr b="0" lang="en-US" sz="1800" spc="-1" strike="noStrike">
-              <a:solidFill>
-                <a:srgbClr val="ffffff"/>
+          <a:lstStyle/>
+          <a:p>
+            <a:endParaRPr lang="en-US" sz="1800" b="0" strike="noStrike" spc="-1">
+              <a:solidFill>
+                <a:srgbClr val="FFFFFF"/>
               </a:solidFill>
               <a:latin typeface="Century Gothic"/>
             </a:endParaRPr>
@@ -2209,13 +2409,14 @@
           </a:prstGeom>
         </p:spPr>
         <p:txBody>
-          <a:bodyPr lIns="0" rIns="0" tIns="0" bIns="0">
+          <a:bodyPr lIns="0" tIns="0" rIns="0" bIns="0">
             <a:normAutofit/>
           </a:bodyPr>
-          <a:p>
-            <a:endParaRPr b="0" lang="en-US" sz="2000" spc="-1" strike="noStrike">
-              <a:solidFill>
-                <a:srgbClr val="0f496f"/>
+          <a:lstStyle/>
+          <a:p>
+            <a:endParaRPr lang="en-US" sz="2000" b="0" strike="noStrike" spc="-1">
+              <a:solidFill>
+                <a:srgbClr val="0F496F"/>
               </a:solidFill>
               <a:latin typeface="Century Gothic"/>
             </a:endParaRPr>
@@ -2224,11 +2425,14 @@
       </p:sp>
     </p:spTree>
   </p:cSld>
+  <p:clrMapOvr>
+    <a:masterClrMapping/>
+  </p:clrMapOvr>
 </p:sldLayout>
 </file>
 
 <file path=ppt/slideLayouts/slideLayout4.xml><?xml version="1.0" encoding="utf-8"?>
-<p:sldLayout xmlns:a="http://schemas.openxmlformats.org/drawingml/2006/main" xmlns:p="http://schemas.openxmlformats.org/presentationml/2006/main" xmlns:r="http://schemas.openxmlformats.org/officeDocument/2006/relationships" xmlns:p14="http://schemas.microsoft.com/office/powerpoint/2010/main" xmlns:p15="http://schemas.microsoft.com/office/powerpoint/2012/main" xmlns:mc="http://schemas.openxmlformats.org/markup-compatibility/2006" type="twoObj" preserve="1">
+<p:sldLayout xmlns:a="http://schemas.openxmlformats.org/drawingml/2006/main" xmlns:r="http://schemas.openxmlformats.org/officeDocument/2006/relationships" xmlns:p="http://schemas.openxmlformats.org/presentationml/2006/main" type="twoObj" preserve="1">
   <p:cSld name="Title, 2 Content">
     <p:spTree>
       <p:nvGrpSpPr>
@@ -2264,13 +2468,14 @@
           </a:prstGeom>
         </p:spPr>
         <p:txBody>
-          <a:bodyPr lIns="0" rIns="0" tIns="0" bIns="0" anchor="ctr">
+          <a:bodyPr lIns="0" tIns="0" rIns="0" bIns="0" anchor="ctr">
             <a:noAutofit/>
           </a:bodyPr>
-          <a:p>
-            <a:endParaRPr b="0" lang="en-US" sz="1800" spc="-1" strike="noStrike">
-              <a:solidFill>
-                <a:srgbClr val="ffffff"/>
+          <a:lstStyle/>
+          <a:p>
+            <a:endParaRPr lang="en-US" sz="1800" b="0" strike="noStrike" spc="-1">
+              <a:solidFill>
+                <a:srgbClr val="FFFFFF"/>
               </a:solidFill>
               <a:latin typeface="Century Gothic"/>
             </a:endParaRPr>
@@ -2297,13 +2502,14 @@
           </a:prstGeom>
         </p:spPr>
         <p:txBody>
-          <a:bodyPr lIns="0" rIns="0" tIns="0" bIns="0">
+          <a:bodyPr lIns="0" tIns="0" rIns="0" bIns="0">
             <a:normAutofit/>
           </a:bodyPr>
-          <a:p>
-            <a:endParaRPr b="0" lang="en-US" sz="2000" spc="-1" strike="noStrike">
-              <a:solidFill>
-                <a:srgbClr val="0f496f"/>
+          <a:lstStyle/>
+          <a:p>
+            <a:endParaRPr lang="en-US" sz="2000" b="0" strike="noStrike" spc="-1">
+              <a:solidFill>
+                <a:srgbClr val="0F496F"/>
               </a:solidFill>
               <a:latin typeface="Century Gothic"/>
             </a:endParaRPr>
@@ -2330,13 +2536,14 @@
           </a:prstGeom>
         </p:spPr>
         <p:txBody>
-          <a:bodyPr lIns="0" rIns="0" tIns="0" bIns="0">
+          <a:bodyPr lIns="0" tIns="0" rIns="0" bIns="0">
             <a:normAutofit/>
           </a:bodyPr>
-          <a:p>
-            <a:endParaRPr b="0" lang="en-US" sz="2000" spc="-1" strike="noStrike">
-              <a:solidFill>
-                <a:srgbClr val="0f496f"/>
+          <a:lstStyle/>
+          <a:p>
+            <a:endParaRPr lang="en-US" sz="2000" b="0" strike="noStrike" spc="-1">
+              <a:solidFill>
+                <a:srgbClr val="0F496F"/>
               </a:solidFill>
               <a:latin typeface="Century Gothic"/>
             </a:endParaRPr>
@@ -2345,11 +2552,14 @@
       </p:sp>
     </p:spTree>
   </p:cSld>
+  <p:clrMapOvr>
+    <a:masterClrMapping/>
+  </p:clrMapOvr>
 </p:sldLayout>
 </file>
 
 <file path=ppt/slideLayouts/slideLayout5.xml><?xml version="1.0" encoding="utf-8"?>
-<p:sldLayout xmlns:a="http://schemas.openxmlformats.org/drawingml/2006/main" xmlns:p="http://schemas.openxmlformats.org/presentationml/2006/main" xmlns:r="http://schemas.openxmlformats.org/officeDocument/2006/relationships" xmlns:p14="http://schemas.microsoft.com/office/powerpoint/2010/main" xmlns:p15="http://schemas.microsoft.com/office/powerpoint/2012/main" xmlns:mc="http://schemas.openxmlformats.org/markup-compatibility/2006" type="titleOnly" preserve="1">
+<p:sldLayout xmlns:a="http://schemas.openxmlformats.org/drawingml/2006/main" xmlns:r="http://schemas.openxmlformats.org/officeDocument/2006/relationships" xmlns:p="http://schemas.openxmlformats.org/presentationml/2006/main" type="titleOnly" preserve="1">
   <p:cSld name="Title Only">
     <p:spTree>
       <p:nvGrpSpPr>
@@ -2385,13 +2595,14 @@
           </a:prstGeom>
         </p:spPr>
         <p:txBody>
-          <a:bodyPr lIns="0" rIns="0" tIns="0" bIns="0" anchor="ctr">
+          <a:bodyPr lIns="0" tIns="0" rIns="0" bIns="0" anchor="ctr">
             <a:noAutofit/>
           </a:bodyPr>
-          <a:p>
-            <a:endParaRPr b="0" lang="en-US" sz="1800" spc="-1" strike="noStrike">
-              <a:solidFill>
-                <a:srgbClr val="ffffff"/>
+          <a:lstStyle/>
+          <a:p>
+            <a:endParaRPr lang="en-US" sz="1800" b="0" strike="noStrike" spc="-1">
+              <a:solidFill>
+                <a:srgbClr val="FFFFFF"/>
               </a:solidFill>
               <a:latin typeface="Century Gothic"/>
             </a:endParaRPr>
@@ -2400,11 +2611,14 @@
       </p:sp>
     </p:spTree>
   </p:cSld>
+  <p:clrMapOvr>
+    <a:masterClrMapping/>
+  </p:clrMapOvr>
 </p:sldLayout>
 </file>
 
 <file path=ppt/slideLayouts/slideLayout6.xml><?xml version="1.0" encoding="utf-8"?>
-<p:sldLayout xmlns:a="http://schemas.openxmlformats.org/drawingml/2006/main" xmlns:p="http://schemas.openxmlformats.org/presentationml/2006/main" xmlns:r="http://schemas.openxmlformats.org/officeDocument/2006/relationships" xmlns:p14="http://schemas.microsoft.com/office/powerpoint/2010/main" xmlns:p15="http://schemas.microsoft.com/office/powerpoint/2012/main" xmlns:mc="http://schemas.openxmlformats.org/markup-compatibility/2006" type="objOnly" preserve="1">
+<p:sldLayout xmlns:a="http://schemas.openxmlformats.org/drawingml/2006/main" xmlns:r="http://schemas.openxmlformats.org/officeDocument/2006/relationships" xmlns:p="http://schemas.openxmlformats.org/presentationml/2006/main" type="objOnly" preserve="1">
   <p:cSld name="Centered Text">
     <p:spTree>
       <p:nvGrpSpPr>
@@ -2440,12 +2654,13 @@
           </a:prstGeom>
         </p:spPr>
         <p:txBody>
-          <a:bodyPr lIns="0" rIns="0" tIns="0" bIns="0" anchor="ctr">
+          <a:bodyPr lIns="0" tIns="0" rIns="0" bIns="0" anchor="ctr">
             <a:noAutofit/>
           </a:bodyPr>
+          <a:lstStyle/>
           <a:p>
             <a:pPr algn="ctr"/>
-            <a:endParaRPr b="0" lang="en-CA" sz="3200" spc="-1" strike="noStrike">
+            <a:endParaRPr lang="en-CA" sz="3200" b="0" strike="noStrike" spc="-1">
               <a:latin typeface="arial"/>
             </a:endParaRPr>
           </a:p>
@@ -2453,11 +2668,14 @@
       </p:sp>
     </p:spTree>
   </p:cSld>
+  <p:clrMapOvr>
+    <a:masterClrMapping/>
+  </p:clrMapOvr>
 </p:sldLayout>
 </file>
 
 <file path=ppt/slideLayouts/slideLayout7.xml><?xml version="1.0" encoding="utf-8"?>
-<p:sldLayout xmlns:a="http://schemas.openxmlformats.org/drawingml/2006/main" xmlns:p="http://schemas.openxmlformats.org/presentationml/2006/main" xmlns:r="http://schemas.openxmlformats.org/officeDocument/2006/relationships" xmlns:p14="http://schemas.microsoft.com/office/powerpoint/2010/main" xmlns:p15="http://schemas.microsoft.com/office/powerpoint/2012/main" xmlns:mc="http://schemas.openxmlformats.org/markup-compatibility/2006" type="twoObjAndObj" preserve="1">
+<p:sldLayout xmlns:a="http://schemas.openxmlformats.org/drawingml/2006/main" xmlns:r="http://schemas.openxmlformats.org/officeDocument/2006/relationships" xmlns:p="http://schemas.openxmlformats.org/presentationml/2006/main" type="twoObjAndObj" preserve="1">
   <p:cSld name="Title, 2 Content and Content">
     <p:spTree>
       <p:nvGrpSpPr>
@@ -2493,13 +2711,14 @@
           </a:prstGeom>
         </p:spPr>
         <p:txBody>
-          <a:bodyPr lIns="0" rIns="0" tIns="0" bIns="0" anchor="ctr">
+          <a:bodyPr lIns="0" tIns="0" rIns="0" bIns="0" anchor="ctr">
             <a:noAutofit/>
           </a:bodyPr>
-          <a:p>
-            <a:endParaRPr b="0" lang="en-US" sz="1800" spc="-1" strike="noStrike">
-              <a:solidFill>
-                <a:srgbClr val="ffffff"/>
+          <a:lstStyle/>
+          <a:p>
+            <a:endParaRPr lang="en-US" sz="1800" b="0" strike="noStrike" spc="-1">
+              <a:solidFill>
+                <a:srgbClr val="FFFFFF"/>
               </a:solidFill>
               <a:latin typeface="Century Gothic"/>
             </a:endParaRPr>
@@ -2526,13 +2745,14 @@
           </a:prstGeom>
         </p:spPr>
         <p:txBody>
-          <a:bodyPr lIns="0" rIns="0" tIns="0" bIns="0">
+          <a:bodyPr lIns="0" tIns="0" rIns="0" bIns="0">
             <a:normAutofit/>
           </a:bodyPr>
-          <a:p>
-            <a:endParaRPr b="0" lang="en-US" sz="2000" spc="-1" strike="noStrike">
-              <a:solidFill>
-                <a:srgbClr val="0f496f"/>
+          <a:lstStyle/>
+          <a:p>
+            <a:endParaRPr lang="en-US" sz="2000" b="0" strike="noStrike" spc="-1">
+              <a:solidFill>
+                <a:srgbClr val="0F496F"/>
               </a:solidFill>
               <a:latin typeface="Century Gothic"/>
             </a:endParaRPr>
@@ -2559,13 +2779,14 @@
           </a:prstGeom>
         </p:spPr>
         <p:txBody>
-          <a:bodyPr lIns="0" rIns="0" tIns="0" bIns="0">
+          <a:bodyPr lIns="0" tIns="0" rIns="0" bIns="0">
             <a:normAutofit/>
           </a:bodyPr>
-          <a:p>
-            <a:endParaRPr b="0" lang="en-US" sz="2000" spc="-1" strike="noStrike">
-              <a:solidFill>
-                <a:srgbClr val="0f496f"/>
+          <a:lstStyle/>
+          <a:p>
+            <a:endParaRPr lang="en-US" sz="2000" b="0" strike="noStrike" spc="-1">
+              <a:solidFill>
+                <a:srgbClr val="0F496F"/>
               </a:solidFill>
               <a:latin typeface="Century Gothic"/>
             </a:endParaRPr>
@@ -2592,13 +2813,14 @@
           </a:prstGeom>
         </p:spPr>
         <p:txBody>
-          <a:bodyPr lIns="0" rIns="0" tIns="0" bIns="0">
+          <a:bodyPr lIns="0" tIns="0" rIns="0" bIns="0">
             <a:normAutofit/>
           </a:bodyPr>
-          <a:p>
-            <a:endParaRPr b="0" lang="en-US" sz="2000" spc="-1" strike="noStrike">
-              <a:solidFill>
-                <a:srgbClr val="0f496f"/>
+          <a:lstStyle/>
+          <a:p>
+            <a:endParaRPr lang="en-US" sz="2000" b="0" strike="noStrike" spc="-1">
+              <a:solidFill>
+                <a:srgbClr val="0F496F"/>
               </a:solidFill>
               <a:latin typeface="Century Gothic"/>
             </a:endParaRPr>
@@ -2607,11 +2829,14 @@
       </p:sp>
     </p:spTree>
   </p:cSld>
+  <p:clrMapOvr>
+    <a:masterClrMapping/>
+  </p:clrMapOvr>
 </p:sldLayout>
 </file>
 
 <file path=ppt/slideLayouts/slideLayout8.xml><?xml version="1.0" encoding="utf-8"?>
-<p:sldLayout xmlns:a="http://schemas.openxmlformats.org/drawingml/2006/main" xmlns:p="http://schemas.openxmlformats.org/presentationml/2006/main" xmlns:r="http://schemas.openxmlformats.org/officeDocument/2006/relationships" xmlns:p14="http://schemas.microsoft.com/office/powerpoint/2010/main" xmlns:p15="http://schemas.microsoft.com/office/powerpoint/2012/main" xmlns:mc="http://schemas.openxmlformats.org/markup-compatibility/2006" type="objAndTwoObj" preserve="1">
+<p:sldLayout xmlns:a="http://schemas.openxmlformats.org/drawingml/2006/main" xmlns:r="http://schemas.openxmlformats.org/officeDocument/2006/relationships" xmlns:p="http://schemas.openxmlformats.org/presentationml/2006/main" type="objAndTwoObj" preserve="1">
   <p:cSld name="Title Content and 2 Content">
     <p:spTree>
       <p:nvGrpSpPr>
@@ -2647,13 +2872,14 @@
           </a:prstGeom>
         </p:spPr>
         <p:txBody>
-          <a:bodyPr lIns="0" rIns="0" tIns="0" bIns="0" anchor="ctr">
+          <a:bodyPr lIns="0" tIns="0" rIns="0" bIns="0" anchor="ctr">
             <a:noAutofit/>
           </a:bodyPr>
-          <a:p>
-            <a:endParaRPr b="0" lang="en-US" sz="1800" spc="-1" strike="noStrike">
-              <a:solidFill>
-                <a:srgbClr val="ffffff"/>
+          <a:lstStyle/>
+          <a:p>
+            <a:endParaRPr lang="en-US" sz="1800" b="0" strike="noStrike" spc="-1">
+              <a:solidFill>
+                <a:srgbClr val="FFFFFF"/>
               </a:solidFill>
               <a:latin typeface="Century Gothic"/>
             </a:endParaRPr>
@@ -2680,13 +2906,14 @@
           </a:prstGeom>
         </p:spPr>
         <p:txBody>
-          <a:bodyPr lIns="0" rIns="0" tIns="0" bIns="0">
+          <a:bodyPr lIns="0" tIns="0" rIns="0" bIns="0">
             <a:normAutofit/>
           </a:bodyPr>
-          <a:p>
-            <a:endParaRPr b="0" lang="en-US" sz="2000" spc="-1" strike="noStrike">
-              <a:solidFill>
-                <a:srgbClr val="0f496f"/>
+          <a:lstStyle/>
+          <a:p>
+            <a:endParaRPr lang="en-US" sz="2000" b="0" strike="noStrike" spc="-1">
+              <a:solidFill>
+                <a:srgbClr val="0F496F"/>
               </a:solidFill>
               <a:latin typeface="Century Gothic"/>
             </a:endParaRPr>
@@ -2713,13 +2940,14 @@
           </a:prstGeom>
         </p:spPr>
         <p:txBody>
-          <a:bodyPr lIns="0" rIns="0" tIns="0" bIns="0">
+          <a:bodyPr lIns="0" tIns="0" rIns="0" bIns="0">
             <a:normAutofit/>
           </a:bodyPr>
-          <a:p>
-            <a:endParaRPr b="0" lang="en-US" sz="2000" spc="-1" strike="noStrike">
-              <a:solidFill>
-                <a:srgbClr val="0f496f"/>
+          <a:lstStyle/>
+          <a:p>
+            <a:endParaRPr lang="en-US" sz="2000" b="0" strike="noStrike" spc="-1">
+              <a:solidFill>
+                <a:srgbClr val="0F496F"/>
               </a:solidFill>
               <a:latin typeface="Century Gothic"/>
             </a:endParaRPr>
@@ -2746,13 +2974,14 @@
           </a:prstGeom>
         </p:spPr>
         <p:txBody>
-          <a:bodyPr lIns="0" rIns="0" tIns="0" bIns="0">
+          <a:bodyPr lIns="0" tIns="0" rIns="0" bIns="0">
             <a:normAutofit/>
           </a:bodyPr>
-          <a:p>
-            <a:endParaRPr b="0" lang="en-US" sz="2000" spc="-1" strike="noStrike">
-              <a:solidFill>
-                <a:srgbClr val="0f496f"/>
+          <a:lstStyle/>
+          <a:p>
+            <a:endParaRPr lang="en-US" sz="2000" b="0" strike="noStrike" spc="-1">
+              <a:solidFill>
+                <a:srgbClr val="0F496F"/>
               </a:solidFill>
               <a:latin typeface="Century Gothic"/>
             </a:endParaRPr>
@@ -2761,11 +2990,14 @@
       </p:sp>
     </p:spTree>
   </p:cSld>
+  <p:clrMapOvr>
+    <a:masterClrMapping/>
+  </p:clrMapOvr>
 </p:sldLayout>
 </file>
 
 <file path=ppt/slideLayouts/slideLayout9.xml><?xml version="1.0" encoding="utf-8"?>
-<p:sldLayout xmlns:a="http://schemas.openxmlformats.org/drawingml/2006/main" xmlns:p="http://schemas.openxmlformats.org/presentationml/2006/main" xmlns:r="http://schemas.openxmlformats.org/officeDocument/2006/relationships" xmlns:p14="http://schemas.microsoft.com/office/powerpoint/2010/main" xmlns:p15="http://schemas.microsoft.com/office/powerpoint/2012/main" xmlns:mc="http://schemas.openxmlformats.org/markup-compatibility/2006" type="twoObjOverTx" preserve="1">
+<p:sldLayout xmlns:a="http://schemas.openxmlformats.org/drawingml/2006/main" xmlns:r="http://schemas.openxmlformats.org/officeDocument/2006/relationships" xmlns:p="http://schemas.openxmlformats.org/presentationml/2006/main" type="twoObjOverTx" preserve="1">
   <p:cSld name="Title, 2 Content over Content">
     <p:spTree>
       <p:nvGrpSpPr>
@@ -2801,13 +3033,14 @@
           </a:prstGeom>
         </p:spPr>
         <p:txBody>
-          <a:bodyPr lIns="0" rIns="0" tIns="0" bIns="0" anchor="ctr">
+          <a:bodyPr lIns="0" tIns="0" rIns="0" bIns="0" anchor="ctr">
             <a:noAutofit/>
           </a:bodyPr>
-          <a:p>
-            <a:endParaRPr b="0" lang="en-US" sz="1800" spc="-1" strike="noStrike">
-              <a:solidFill>
-                <a:srgbClr val="ffffff"/>
+          <a:lstStyle/>
+          <a:p>
+            <a:endParaRPr lang="en-US" sz="1800" b="0" strike="noStrike" spc="-1">
+              <a:solidFill>
+                <a:srgbClr val="FFFFFF"/>
               </a:solidFill>
               <a:latin typeface="Century Gothic"/>
             </a:endParaRPr>
@@ -2834,13 +3067,14 @@
           </a:prstGeom>
         </p:spPr>
         <p:txBody>
-          <a:bodyPr lIns="0" rIns="0" tIns="0" bIns="0">
+          <a:bodyPr lIns="0" tIns="0" rIns="0" bIns="0">
             <a:normAutofit/>
           </a:bodyPr>
-          <a:p>
-            <a:endParaRPr b="0" lang="en-US" sz="2000" spc="-1" strike="noStrike">
-              <a:solidFill>
-                <a:srgbClr val="0f496f"/>
+          <a:lstStyle/>
+          <a:p>
+            <a:endParaRPr lang="en-US" sz="2000" b="0" strike="noStrike" spc="-1">
+              <a:solidFill>
+                <a:srgbClr val="0F496F"/>
               </a:solidFill>
               <a:latin typeface="Century Gothic"/>
             </a:endParaRPr>
@@ -2867,13 +3101,14 @@
           </a:prstGeom>
         </p:spPr>
         <p:txBody>
-          <a:bodyPr lIns="0" rIns="0" tIns="0" bIns="0">
+          <a:bodyPr lIns="0" tIns="0" rIns="0" bIns="0">
             <a:normAutofit/>
           </a:bodyPr>
-          <a:p>
-            <a:endParaRPr b="0" lang="en-US" sz="2000" spc="-1" strike="noStrike">
-              <a:solidFill>
-                <a:srgbClr val="0f496f"/>
+          <a:lstStyle/>
+          <a:p>
+            <a:endParaRPr lang="en-US" sz="2000" b="0" strike="noStrike" spc="-1">
+              <a:solidFill>
+                <a:srgbClr val="0F496F"/>
               </a:solidFill>
               <a:latin typeface="Century Gothic"/>
             </a:endParaRPr>
@@ -2900,13 +3135,14 @@
           </a:prstGeom>
         </p:spPr>
         <p:txBody>
-          <a:bodyPr lIns="0" rIns="0" tIns="0" bIns="0">
+          <a:bodyPr lIns="0" tIns="0" rIns="0" bIns="0">
             <a:normAutofit/>
           </a:bodyPr>
-          <a:p>
-            <a:endParaRPr b="0" lang="en-US" sz="2000" spc="-1" strike="noStrike">
-              <a:solidFill>
-                <a:srgbClr val="0f496f"/>
+          <a:lstStyle/>
+          <a:p>
+            <a:endParaRPr lang="en-US" sz="2000" b="0" strike="noStrike" spc="-1">
+              <a:solidFill>
+                <a:srgbClr val="0F496F"/>
               </a:solidFill>
               <a:latin typeface="Century Gothic"/>
             </a:endParaRPr>
@@ -2915,25 +3151,29 @@
       </p:sp>
     </p:spTree>
   </p:cSld>
+  <p:clrMapOvr>
+    <a:masterClrMapping/>
+  </p:clrMapOvr>
 </p:sldLayout>
 </file>
 
 <file path=ppt/slideMasters/slideMaster1.xml><?xml version="1.0" encoding="utf-8"?>
-<p:sldMaster xmlns:a="http://schemas.openxmlformats.org/drawingml/2006/main" xmlns:p="http://schemas.openxmlformats.org/presentationml/2006/main" xmlns:r="http://schemas.openxmlformats.org/officeDocument/2006/relationships" xmlns:p14="http://schemas.microsoft.com/office/powerpoint/2010/main" xmlns:p15="http://schemas.microsoft.com/office/powerpoint/2012/main" xmlns:mc="http://schemas.openxmlformats.org/markup-compatibility/2006">
+<p:sldMaster xmlns:a="http://schemas.openxmlformats.org/drawingml/2006/main" xmlns:r="http://schemas.openxmlformats.org/officeDocument/2006/relationships" xmlns:p="http://schemas.openxmlformats.org/presentationml/2006/main">
   <p:cSld>
     <p:bg>
       <p:bgPr>
         <a:gradFill rotWithShape="0">
           <a:gsLst>
             <a:gs pos="10000">
-              <a:srgbClr val="6bd1ec"/>
+              <a:srgbClr val="6BD1EC"/>
             </a:gs>
             <a:gs pos="100000">
-              <a:srgbClr val="06588e"/>
+              <a:srgbClr val="06588E"/>
             </a:gs>
           </a:gsLst>
           <a:lin ang="6120000"/>
         </a:gradFill>
+        <a:effectLst/>
       </p:bgPr>
     </p:bg>
     <p:spTree>
@@ -2952,7 +3192,7 @@
       </p:grpSpPr>
       <p:grpSp>
         <p:nvGrpSpPr>
-          <p:cNvPr id="0" name="Group 1"/>
+          <p:cNvPr id="16" name="Group 1"/>
           <p:cNvGrpSpPr/>
           <p:nvPr/>
         </p:nvGrpSpPr>
@@ -2966,7 +3206,7 @@
         </p:grpSpPr>
         <p:sp>
           <p:nvSpPr>
-            <p:cNvPr id="1" name="Line 2"/>
+            <p:cNvPr id="17" name="Line 2"/>
             <p:cNvSpPr/>
             <p:nvPr/>
           </p:nvSpPr>
@@ -2978,7 +3218,7 @@
             <a:prstGeom prst="line">
               <a:avLst/>
             </a:prstGeom>
-            <a:ln cap="rnd" w="9525">
+            <a:ln w="9525" cap="rnd">
               <a:solidFill>
                 <a:schemeClr val="tx1"/>
               </a:solidFill>
@@ -3012,7 +3252,7 @@
             <a:prstGeom prst="line">
               <a:avLst/>
             </a:prstGeom>
-            <a:ln cap="rnd" w="9525">
+            <a:ln w="9525" cap="rnd">
               <a:solidFill>
                 <a:schemeClr val="tx1"/>
               </a:solidFill>
@@ -3046,7 +3286,7 @@
             <a:prstGeom prst="line">
               <a:avLst/>
             </a:prstGeom>
-            <a:ln cap="rnd" w="9525">
+            <a:ln w="9525" cap="rnd">
               <a:solidFill>
                 <a:schemeClr val="tx1"/>
               </a:solidFill>
@@ -3080,7 +3320,7 @@
             <a:prstGeom prst="line">
               <a:avLst/>
             </a:prstGeom>
-            <a:ln cap="rnd" w="28575">
+            <a:ln w="28575" cap="rnd">
               <a:solidFill>
                 <a:schemeClr val="tx1"/>
               </a:solidFill>
@@ -3114,7 +3354,7 @@
             <a:prstGeom prst="line">
               <a:avLst/>
             </a:prstGeom>
-            <a:ln cap="rnd" w="28575">
+            <a:ln w="28575" cap="rnd">
               <a:solidFill>
                 <a:schemeClr val="tx1"/>
               </a:solidFill>
@@ -3158,6 +3398,7 @@
           <a:bodyPr anchor="b">
             <a:normAutofit/>
           </a:bodyPr>
+          <a:lstStyle/>
           <a:p>
             <a:pPr>
               <a:lnSpc>
@@ -3165,17 +3406,17 @@
               </a:lnSpc>
             </a:pPr>
             <a:r>
-              <a:rPr b="0" lang="en-US" sz="4800" spc="-1" strike="noStrike" cap="all">
+              <a:rPr lang="en-US" sz="4800" b="0" strike="noStrike" cap="all" spc="-1">
                 <a:solidFill>
-                  <a:srgbClr val="ffffff"/>
+                  <a:srgbClr val="FFFFFF"/>
                 </a:solidFill>
                 <a:latin typeface="Century Gothic"/>
               </a:rPr>
               <a:t>Click to edit Master title style</a:t>
             </a:r>
-            <a:endParaRPr b="0" lang="en-US" sz="4800" spc="-1" strike="noStrike">
-              <a:solidFill>
-                <a:srgbClr val="ffffff"/>
+            <a:endParaRPr lang="en-US" sz="4800" b="0" strike="noStrike" spc="-1">
+              <a:solidFill>
+                <a:srgbClr val="FFFFFF"/>
               </a:solidFill>
               <a:latin typeface="Century Gothic"/>
             </a:endParaRPr>
@@ -3205,6 +3446,7 @@
           <a:bodyPr>
             <a:noAutofit/>
           </a:bodyPr>
+          <a:lstStyle/>
           <a:p>
             <a:pPr algn="r">
               <a:lnSpc>
@@ -3212,15 +3454,15 @@
               </a:lnSpc>
             </a:pPr>
             <a:fld id="{267B4CB7-3F1D-4A20-975C-EDD16D13AF9F}" type="datetime">
-              <a:rPr b="0" lang="en-CA" sz="1000" spc="-1" strike="noStrike">
+              <a:rPr lang="en-CA" sz="1000" b="0" strike="noStrike" spc="-1">
                 <a:solidFill>
-                  <a:srgbClr val="0a304a"/>
+                  <a:srgbClr val="0A304A"/>
                 </a:solidFill>
                 <a:latin typeface="Century Gothic"/>
               </a:rPr>
-              <a:t>20-12-9</a:t>
+              <a:t>2020-12-09</a:t>
             </a:fld>
-            <a:endParaRPr b="0" lang="en-CA" sz="1000" spc="-1" strike="noStrike">
+            <a:endParaRPr lang="en-CA" sz="1000" b="0" strike="noStrike" spc="-1">
               <a:latin typeface="Tinos"/>
             </a:endParaRPr>
           </a:p>
@@ -3249,8 +3491,9 @@
           <a:bodyPr>
             <a:noAutofit/>
           </a:bodyPr>
-          <a:p>
-            <a:endParaRPr b="0" lang="en-CA" sz="2400" spc="-1" strike="noStrike">
+          <a:lstStyle/>
+          <a:p>
+            <a:endParaRPr lang="en-CA" sz="2400" b="0" strike="noStrike" spc="-1">
               <a:latin typeface="Tinos"/>
             </a:endParaRPr>
           </a:p>
@@ -3279,6 +3522,7 @@
           <a:bodyPr anchor="b">
             <a:noAutofit/>
           </a:bodyPr>
+          <a:lstStyle/>
           <a:p>
             <a:pPr algn="r">
               <a:lnSpc>
@@ -3286,15 +3530,15 @@
               </a:lnSpc>
             </a:pPr>
             <a:fld id="{B6AF0AB9-91C8-4F76-9353-75C1B469B40C}" type="slidenum">
-              <a:rPr b="0" lang="en-CA" sz="3200" spc="-1" strike="noStrike">
+              <a:rPr lang="en-CA" sz="3200" b="0" strike="noStrike" spc="-1">
                 <a:solidFill>
-                  <a:srgbClr val="0a304a"/>
+                  <a:srgbClr val="0A304A"/>
                 </a:solidFill>
                 <a:latin typeface="Century Gothic"/>
               </a:rPr>
-              <a:t>&lt;number&gt;</a:t>
+              <a:t>‹#›</a:t>
             </a:fld>
-            <a:endParaRPr b="0" lang="en-CA" sz="3200" spc="-1" strike="noStrike">
+            <a:endParaRPr lang="en-CA" sz="3200" b="0" strike="noStrike" spc="-1">
               <a:latin typeface="Tinos"/>
             </a:endParaRPr>
           </a:p>
@@ -3314,7 +3558,7 @@
           <a:prstGeom prst="line">
             <a:avLst/>
           </a:prstGeom>
-          <a:ln cap="rnd" w="12700">
+          <a:ln w="12700" cap="rnd">
             <a:solidFill>
               <a:schemeClr val="tx1"/>
             </a:solidFill>
@@ -3348,7 +3592,7 @@
           <a:prstGeom prst="line">
             <a:avLst/>
           </a:prstGeom>
-          <a:ln cap="rnd" w="12700">
+          <a:ln w="12700" cap="rnd">
             <a:solidFill>
               <a:schemeClr val="tx1"/>
             </a:solidFill>
@@ -3382,7 +3626,7 @@
           <a:prstGeom prst="line">
             <a:avLst/>
           </a:prstGeom>
-          <a:ln cap="rnd" w="12700">
+          <a:ln w="12700" cap="rnd">
             <a:solidFill>
               <a:schemeClr val="tx1"/>
             </a:solidFill>
@@ -3416,7 +3660,7 @@
           <a:prstGeom prst="line">
             <a:avLst/>
           </a:prstGeom>
-          <a:ln cap="rnd" w="31750">
+          <a:ln w="31750" cap="rnd">
             <a:solidFill>
               <a:schemeClr val="tx1"/>
             </a:solidFill>
@@ -3450,7 +3694,7 @@
           <a:prstGeom prst="line">
             <a:avLst/>
           </a:prstGeom>
-          <a:ln cap="rnd" w="31750">
+          <a:ln w="31750" cap="rnd">
             <a:solidFill>
               <a:schemeClr val="tx1"/>
             </a:solidFill>
@@ -3490,9 +3734,10 @@
           </a:prstGeom>
         </p:spPr>
         <p:txBody>
-          <a:bodyPr lIns="0" rIns="0" tIns="0" bIns="0">
+          <a:bodyPr lIns="0" tIns="0" rIns="0" bIns="0">
             <a:normAutofit/>
           </a:bodyPr>
+          <a:lstStyle/>
           <a:p>
             <a:pPr marL="432000" indent="-324000">
               <a:spcBef>
@@ -3506,23 +3751,17 @@
               <a:buChar char=""/>
             </a:pPr>
             <a:r>
-              <a:rPr b="0" lang="en-US" sz="2000" spc="-1" strike="noStrike">
+              <a:rPr lang="en-US" sz="2000" b="0" strike="noStrike" spc="-1">
                 <a:solidFill>
-                  <a:srgbClr val="0f496f"/>
+                  <a:srgbClr val="0F496F"/>
                 </a:solidFill>
                 <a:latin typeface="Century Gothic"/>
               </a:rPr>
               <a:t>Click to edit the outline text format</a:t>
             </a:r>
-            <a:endParaRPr b="0" lang="en-US" sz="2000" spc="-1" strike="noStrike">
-              <a:solidFill>
-                <a:srgbClr val="0f496f"/>
-              </a:solidFill>
-              <a:latin typeface="Century Gothic"/>
-            </a:endParaRPr>
-          </a:p>
-          <a:p>
-            <a:pPr lvl="1" marL="864000" indent="-324000">
+          </a:p>
+          <a:p>
+            <a:pPr marL="864000" lvl="1" indent="-324000">
               <a:spcBef>
                 <a:spcPts val="1134"/>
               </a:spcBef>
@@ -3534,23 +3773,17 @@
               <a:buChar char=""/>
             </a:pPr>
             <a:r>
-              <a:rPr b="0" lang="en-US" sz="1600" spc="-1" strike="noStrike">
+              <a:rPr lang="en-US" sz="1600" b="0" strike="noStrike" spc="-1">
                 <a:solidFill>
-                  <a:srgbClr val="0f496f"/>
+                  <a:srgbClr val="0F496F"/>
                 </a:solidFill>
                 <a:latin typeface="Century Gothic"/>
               </a:rPr>
               <a:t>Second Outline Level</a:t>
             </a:r>
-            <a:endParaRPr b="0" lang="en-US" sz="1600" spc="-1" strike="noStrike">
-              <a:solidFill>
-                <a:srgbClr val="0f496f"/>
-              </a:solidFill>
-              <a:latin typeface="Century Gothic"/>
-            </a:endParaRPr>
-          </a:p>
-          <a:p>
-            <a:pPr lvl="2" marL="1296000" indent="-288000">
+          </a:p>
+          <a:p>
+            <a:pPr marL="1296000" lvl="2" indent="-288000">
               <a:spcBef>
                 <a:spcPts val="850"/>
               </a:spcBef>
@@ -3562,23 +3795,17 @@
               <a:buChar char=""/>
             </a:pPr>
             <a:r>
-              <a:rPr b="0" lang="en-US" sz="1400" spc="-1" strike="noStrike">
+              <a:rPr lang="en-US" sz="1400" b="0" strike="noStrike" spc="-1">
                 <a:solidFill>
-                  <a:srgbClr val="0f496f"/>
+                  <a:srgbClr val="0F496F"/>
                 </a:solidFill>
                 <a:latin typeface="Century Gothic"/>
               </a:rPr>
               <a:t>Third Outline Level</a:t>
             </a:r>
-            <a:endParaRPr b="0" lang="en-US" sz="1400" spc="-1" strike="noStrike">
-              <a:solidFill>
-                <a:srgbClr val="0f496f"/>
-              </a:solidFill>
-              <a:latin typeface="Century Gothic"/>
-            </a:endParaRPr>
-          </a:p>
-          <a:p>
-            <a:pPr lvl="3" marL="1728000" indent="-216000">
+          </a:p>
+          <a:p>
+            <a:pPr marL="1728000" lvl="3" indent="-216000">
               <a:spcBef>
                 <a:spcPts val="567"/>
               </a:spcBef>
@@ -3590,23 +3817,17 @@
               <a:buChar char=""/>
             </a:pPr>
             <a:r>
-              <a:rPr b="0" lang="en-US" sz="1400" spc="-1" strike="noStrike">
+              <a:rPr lang="en-US" sz="1400" b="0" strike="noStrike" spc="-1">
                 <a:solidFill>
-                  <a:srgbClr val="0f496f"/>
+                  <a:srgbClr val="0F496F"/>
                 </a:solidFill>
                 <a:latin typeface="Century Gothic"/>
               </a:rPr>
               <a:t>Fourth Outline Level</a:t>
             </a:r>
-            <a:endParaRPr b="0" lang="en-US" sz="1400" spc="-1" strike="noStrike">
-              <a:solidFill>
-                <a:srgbClr val="0f496f"/>
-              </a:solidFill>
-              <a:latin typeface="Century Gothic"/>
-            </a:endParaRPr>
-          </a:p>
-          <a:p>
-            <a:pPr lvl="4" marL="2160000" indent="-216000">
+          </a:p>
+          <a:p>
+            <a:pPr marL="2160000" lvl="4" indent="-216000">
               <a:spcBef>
                 <a:spcPts val="283"/>
               </a:spcBef>
@@ -3618,23 +3839,17 @@
               <a:buChar char=""/>
             </a:pPr>
             <a:r>
-              <a:rPr b="0" lang="en-US" sz="2000" spc="-1" strike="noStrike">
+              <a:rPr lang="en-US" sz="2000" b="0" strike="noStrike" spc="-1">
                 <a:solidFill>
-                  <a:srgbClr val="0f496f"/>
+                  <a:srgbClr val="0F496F"/>
                 </a:solidFill>
                 <a:latin typeface="Century Gothic"/>
               </a:rPr>
               <a:t>Fifth Outline Level</a:t>
             </a:r>
-            <a:endParaRPr b="0" lang="en-US" sz="2000" spc="-1" strike="noStrike">
-              <a:solidFill>
-                <a:srgbClr val="0f496f"/>
-              </a:solidFill>
-              <a:latin typeface="Century Gothic"/>
-            </a:endParaRPr>
-          </a:p>
-          <a:p>
-            <a:pPr lvl="5" marL="2592000" indent="-216000">
+          </a:p>
+          <a:p>
+            <a:pPr marL="2592000" lvl="5" indent="-216000">
               <a:spcBef>
                 <a:spcPts val="283"/>
               </a:spcBef>
@@ -3646,23 +3861,17 @@
               <a:buChar char=""/>
             </a:pPr>
             <a:r>
-              <a:rPr b="0" lang="en-US" sz="2000" spc="-1" strike="noStrike">
+              <a:rPr lang="en-US" sz="2000" b="0" strike="noStrike" spc="-1">
                 <a:solidFill>
-                  <a:srgbClr val="0f496f"/>
+                  <a:srgbClr val="0F496F"/>
                 </a:solidFill>
                 <a:latin typeface="Century Gothic"/>
               </a:rPr>
               <a:t>Sixth Outline Level</a:t>
             </a:r>
-            <a:endParaRPr b="0" lang="en-US" sz="2000" spc="-1" strike="noStrike">
-              <a:solidFill>
-                <a:srgbClr val="0f496f"/>
-              </a:solidFill>
-              <a:latin typeface="Century Gothic"/>
-            </a:endParaRPr>
-          </a:p>
-          <a:p>
-            <a:pPr lvl="6" marL="3024000" indent="-216000">
+          </a:p>
+          <a:p>
+            <a:pPr marL="3024000" lvl="6" indent="-216000">
               <a:spcBef>
                 <a:spcPts val="283"/>
               </a:spcBef>
@@ -3674,59 +3883,334 @@
               <a:buChar char=""/>
             </a:pPr>
             <a:r>
-              <a:rPr b="0" lang="en-US" sz="2000" spc="-1" strike="noStrike">
+              <a:rPr lang="en-US" sz="2000" b="0" strike="noStrike" spc="-1">
                 <a:solidFill>
-                  <a:srgbClr val="0f496f"/>
+                  <a:srgbClr val="0F496F"/>
                 </a:solidFill>
                 <a:latin typeface="Century Gothic"/>
               </a:rPr>
               <a:t>Seventh Outline Level</a:t>
             </a:r>
-            <a:endParaRPr b="0" lang="en-US" sz="2000" spc="-1" strike="noStrike">
-              <a:solidFill>
-                <a:srgbClr val="0f496f"/>
-              </a:solidFill>
-              <a:latin typeface="Century Gothic"/>
-            </a:endParaRPr>
           </a:p>
         </p:txBody>
       </p:sp>
     </p:spTree>
   </p:cSld>
-  <p:clrMap bg1="lt1" bg2="lt2" tx1="dk1" tx2="dk2" accent1="accent1" accent2="accent2" accent3="accent3" accent4="accent4" accent5="accent5" accent6="accent6" hlink="hlink" folHlink="folHlink"/>
+  <p:clrMap bg1="lt1" tx1="dk1" bg2="lt2" tx2="dk2" accent1="accent1" accent2="accent2" accent3="accent3" accent4="accent4" accent5="accent5" accent6="accent6" hlink="hlink" folHlink="folHlink"/>
   <p:sldLayoutIdLst>
-    <p:sldLayoutId id="2147483649" r:id="rId2"/>
-    <p:sldLayoutId id="2147483650" r:id="rId3"/>
-    <p:sldLayoutId id="2147483651" r:id="rId4"/>
-    <p:sldLayoutId id="2147483652" r:id="rId5"/>
-    <p:sldLayoutId id="2147483653" r:id="rId6"/>
-    <p:sldLayoutId id="2147483654" r:id="rId7"/>
-    <p:sldLayoutId id="2147483655" r:id="rId8"/>
-    <p:sldLayoutId id="2147483656" r:id="rId9"/>
-    <p:sldLayoutId id="2147483657" r:id="rId10"/>
-    <p:sldLayoutId id="2147483658" r:id="rId11"/>
-    <p:sldLayoutId id="2147483659" r:id="rId12"/>
-    <p:sldLayoutId id="2147483660" r:id="rId13"/>
+    <p:sldLayoutId id="2147483649" r:id="rId1"/>
+    <p:sldLayoutId id="2147483650" r:id="rId2"/>
+    <p:sldLayoutId id="2147483651" r:id="rId3"/>
+    <p:sldLayoutId id="2147483652" r:id="rId4"/>
+    <p:sldLayoutId id="2147483653" r:id="rId5"/>
+    <p:sldLayoutId id="2147483654" r:id="rId6"/>
+    <p:sldLayoutId id="2147483655" r:id="rId7"/>
+    <p:sldLayoutId id="2147483656" r:id="rId8"/>
+    <p:sldLayoutId id="2147483657" r:id="rId9"/>
+    <p:sldLayoutId id="2147483658" r:id="rId10"/>
+    <p:sldLayoutId id="2147483659" r:id="rId11"/>
+    <p:sldLayoutId id="2147483660" r:id="rId12"/>
   </p:sldLayoutIdLst>
+  <p:txStyles>
+    <p:titleStyle>
+      <a:lvl1pPr algn="l" defTabSz="914400" rtl="0" eaLnBrk="1" latinLnBrk="0" hangingPunct="1">
+        <a:lnSpc>
+          <a:spcPct val="90000"/>
+        </a:lnSpc>
+        <a:spcBef>
+          <a:spcPct val="0"/>
+        </a:spcBef>
+        <a:buNone/>
+        <a:defRPr sz="4400" kern="1200">
+          <a:solidFill>
+            <a:schemeClr val="tx1"/>
+          </a:solidFill>
+          <a:latin typeface="+mj-lt"/>
+          <a:ea typeface="+mj-ea"/>
+          <a:cs typeface="+mj-cs"/>
+        </a:defRPr>
+      </a:lvl1pPr>
+    </p:titleStyle>
+    <p:bodyStyle>
+      <a:lvl1pPr marL="228600" indent="-228600" algn="l" defTabSz="914400" rtl="0" eaLnBrk="1" latinLnBrk="0" hangingPunct="1">
+        <a:lnSpc>
+          <a:spcPct val="90000"/>
+        </a:lnSpc>
+        <a:spcBef>
+          <a:spcPts val="1000"/>
+        </a:spcBef>
+        <a:buFont typeface="Arial" panose="020B0604020202020204" pitchFamily="34" charset="0"/>
+        <a:buChar char="•"/>
+        <a:defRPr sz="2800" kern="1200">
+          <a:solidFill>
+            <a:schemeClr val="tx1"/>
+          </a:solidFill>
+          <a:latin typeface="+mn-lt"/>
+          <a:ea typeface="+mn-ea"/>
+          <a:cs typeface="+mn-cs"/>
+        </a:defRPr>
+      </a:lvl1pPr>
+      <a:lvl2pPr marL="685800" indent="-228600" algn="l" defTabSz="914400" rtl="0" eaLnBrk="1" latinLnBrk="0" hangingPunct="1">
+        <a:lnSpc>
+          <a:spcPct val="90000"/>
+        </a:lnSpc>
+        <a:spcBef>
+          <a:spcPts val="500"/>
+        </a:spcBef>
+        <a:buFont typeface="Arial" panose="020B0604020202020204" pitchFamily="34" charset="0"/>
+        <a:buChar char="•"/>
+        <a:defRPr sz="2400" kern="1200">
+          <a:solidFill>
+            <a:schemeClr val="tx1"/>
+          </a:solidFill>
+          <a:latin typeface="+mn-lt"/>
+          <a:ea typeface="+mn-ea"/>
+          <a:cs typeface="+mn-cs"/>
+        </a:defRPr>
+      </a:lvl2pPr>
+      <a:lvl3pPr marL="1143000" indent="-228600" algn="l" defTabSz="914400" rtl="0" eaLnBrk="1" latinLnBrk="0" hangingPunct="1">
+        <a:lnSpc>
+          <a:spcPct val="90000"/>
+        </a:lnSpc>
+        <a:spcBef>
+          <a:spcPts val="500"/>
+        </a:spcBef>
+        <a:buFont typeface="Arial" panose="020B0604020202020204" pitchFamily="34" charset="0"/>
+        <a:buChar char="•"/>
+        <a:defRPr sz="2000" kern="1200">
+          <a:solidFill>
+            <a:schemeClr val="tx1"/>
+          </a:solidFill>
+          <a:latin typeface="+mn-lt"/>
+          <a:ea typeface="+mn-ea"/>
+          <a:cs typeface="+mn-cs"/>
+        </a:defRPr>
+      </a:lvl3pPr>
+      <a:lvl4pPr marL="1600200" indent="-228600" algn="l" defTabSz="914400" rtl="0" eaLnBrk="1" latinLnBrk="0" hangingPunct="1">
+        <a:lnSpc>
+          <a:spcPct val="90000"/>
+        </a:lnSpc>
+        <a:spcBef>
+          <a:spcPts val="500"/>
+        </a:spcBef>
+        <a:buFont typeface="Arial" panose="020B0604020202020204" pitchFamily="34" charset="0"/>
+        <a:buChar char="•"/>
+        <a:defRPr sz="1800" kern="1200">
+          <a:solidFill>
+            <a:schemeClr val="tx1"/>
+          </a:solidFill>
+          <a:latin typeface="+mn-lt"/>
+          <a:ea typeface="+mn-ea"/>
+          <a:cs typeface="+mn-cs"/>
+        </a:defRPr>
+      </a:lvl4pPr>
+      <a:lvl5pPr marL="2057400" indent="-228600" algn="l" defTabSz="914400" rtl="0" eaLnBrk="1" latinLnBrk="0" hangingPunct="1">
+        <a:lnSpc>
+          <a:spcPct val="90000"/>
+        </a:lnSpc>
+        <a:spcBef>
+          <a:spcPts val="500"/>
+        </a:spcBef>
+        <a:buFont typeface="Arial" panose="020B0604020202020204" pitchFamily="34" charset="0"/>
+        <a:buChar char="•"/>
+        <a:defRPr sz="1800" kern="1200">
+          <a:solidFill>
+            <a:schemeClr val="tx1"/>
+          </a:solidFill>
+          <a:latin typeface="+mn-lt"/>
+          <a:ea typeface="+mn-ea"/>
+          <a:cs typeface="+mn-cs"/>
+        </a:defRPr>
+      </a:lvl5pPr>
+      <a:lvl6pPr marL="2514600" indent="-228600" algn="l" defTabSz="914400" rtl="0" eaLnBrk="1" latinLnBrk="0" hangingPunct="1">
+        <a:lnSpc>
+          <a:spcPct val="90000"/>
+        </a:lnSpc>
+        <a:spcBef>
+          <a:spcPts val="500"/>
+        </a:spcBef>
+        <a:buFont typeface="Arial" panose="020B0604020202020204" pitchFamily="34" charset="0"/>
+        <a:buChar char="•"/>
+        <a:defRPr sz="1800" kern="1200">
+          <a:solidFill>
+            <a:schemeClr val="tx1"/>
+          </a:solidFill>
+          <a:latin typeface="+mn-lt"/>
+          <a:ea typeface="+mn-ea"/>
+          <a:cs typeface="+mn-cs"/>
+        </a:defRPr>
+      </a:lvl6pPr>
+      <a:lvl7pPr marL="2971800" indent="-228600" algn="l" defTabSz="914400" rtl="0" eaLnBrk="1" latinLnBrk="0" hangingPunct="1">
+        <a:lnSpc>
+          <a:spcPct val="90000"/>
+        </a:lnSpc>
+        <a:spcBef>
+          <a:spcPts val="500"/>
+        </a:spcBef>
+        <a:buFont typeface="Arial" panose="020B0604020202020204" pitchFamily="34" charset="0"/>
+        <a:buChar char="•"/>
+        <a:defRPr sz="1800" kern="1200">
+          <a:solidFill>
+            <a:schemeClr val="tx1"/>
+          </a:solidFill>
+          <a:latin typeface="+mn-lt"/>
+          <a:ea typeface="+mn-ea"/>
+          <a:cs typeface="+mn-cs"/>
+        </a:defRPr>
+      </a:lvl7pPr>
+      <a:lvl8pPr marL="3429000" indent="-228600" algn="l" defTabSz="914400" rtl="0" eaLnBrk="1" latinLnBrk="0" hangingPunct="1">
+        <a:lnSpc>
+          <a:spcPct val="90000"/>
+        </a:lnSpc>
+        <a:spcBef>
+          <a:spcPts val="500"/>
+        </a:spcBef>
+        <a:buFont typeface="Arial" panose="020B0604020202020204" pitchFamily="34" charset="0"/>
+        <a:buChar char="•"/>
+        <a:defRPr sz="1800" kern="1200">
+          <a:solidFill>
+            <a:schemeClr val="tx1"/>
+          </a:solidFill>
+          <a:latin typeface="+mn-lt"/>
+          <a:ea typeface="+mn-ea"/>
+          <a:cs typeface="+mn-cs"/>
+        </a:defRPr>
+      </a:lvl8pPr>
+      <a:lvl9pPr marL="3886200" indent="-228600" algn="l" defTabSz="914400" rtl="0" eaLnBrk="1" latinLnBrk="0" hangingPunct="1">
+        <a:lnSpc>
+          <a:spcPct val="90000"/>
+        </a:lnSpc>
+        <a:spcBef>
+          <a:spcPts val="500"/>
+        </a:spcBef>
+        <a:buFont typeface="Arial" panose="020B0604020202020204" pitchFamily="34" charset="0"/>
+        <a:buChar char="•"/>
+        <a:defRPr sz="1800" kern="1200">
+          <a:solidFill>
+            <a:schemeClr val="tx1"/>
+          </a:solidFill>
+          <a:latin typeface="+mn-lt"/>
+          <a:ea typeface="+mn-ea"/>
+          <a:cs typeface="+mn-cs"/>
+        </a:defRPr>
+      </a:lvl9pPr>
+    </p:bodyStyle>
+    <p:otherStyle>
+      <a:defPPr>
+        <a:defRPr lang="en-US"/>
+      </a:defPPr>
+      <a:lvl1pPr marL="0" algn="l" defTabSz="914400" rtl="0" eaLnBrk="1" latinLnBrk="0" hangingPunct="1">
+        <a:defRPr sz="1800" kern="1200">
+          <a:solidFill>
+            <a:schemeClr val="tx1"/>
+          </a:solidFill>
+          <a:latin typeface="+mn-lt"/>
+          <a:ea typeface="+mn-ea"/>
+          <a:cs typeface="+mn-cs"/>
+        </a:defRPr>
+      </a:lvl1pPr>
+      <a:lvl2pPr marL="457200" algn="l" defTabSz="914400" rtl="0" eaLnBrk="1" latinLnBrk="0" hangingPunct="1">
+        <a:defRPr sz="1800" kern="1200">
+          <a:solidFill>
+            <a:schemeClr val="tx1"/>
+          </a:solidFill>
+          <a:latin typeface="+mn-lt"/>
+          <a:ea typeface="+mn-ea"/>
+          <a:cs typeface="+mn-cs"/>
+        </a:defRPr>
+      </a:lvl2pPr>
+      <a:lvl3pPr marL="914400" algn="l" defTabSz="914400" rtl="0" eaLnBrk="1" latinLnBrk="0" hangingPunct="1">
+        <a:defRPr sz="1800" kern="1200">
+          <a:solidFill>
+            <a:schemeClr val="tx1"/>
+          </a:solidFill>
+          <a:latin typeface="+mn-lt"/>
+          <a:ea typeface="+mn-ea"/>
+          <a:cs typeface="+mn-cs"/>
+        </a:defRPr>
+      </a:lvl3pPr>
+      <a:lvl4pPr marL="1371600" algn="l" defTabSz="914400" rtl="0" eaLnBrk="1" latinLnBrk="0" hangingPunct="1">
+        <a:defRPr sz="1800" kern="1200">
+          <a:solidFill>
+            <a:schemeClr val="tx1"/>
+          </a:solidFill>
+          <a:latin typeface="+mn-lt"/>
+          <a:ea typeface="+mn-ea"/>
+          <a:cs typeface="+mn-cs"/>
+        </a:defRPr>
+      </a:lvl4pPr>
+      <a:lvl5pPr marL="1828800" algn="l" defTabSz="914400" rtl="0" eaLnBrk="1" latinLnBrk="0" hangingPunct="1">
+        <a:defRPr sz="1800" kern="1200">
+          <a:solidFill>
+            <a:schemeClr val="tx1"/>
+          </a:solidFill>
+          <a:latin typeface="+mn-lt"/>
+          <a:ea typeface="+mn-ea"/>
+          <a:cs typeface="+mn-cs"/>
+        </a:defRPr>
+      </a:lvl5pPr>
+      <a:lvl6pPr marL="2286000" algn="l" defTabSz="914400" rtl="0" eaLnBrk="1" latinLnBrk="0" hangingPunct="1">
+        <a:defRPr sz="1800" kern="1200">
+          <a:solidFill>
+            <a:schemeClr val="tx1"/>
+          </a:solidFill>
+          <a:latin typeface="+mn-lt"/>
+          <a:ea typeface="+mn-ea"/>
+          <a:cs typeface="+mn-cs"/>
+        </a:defRPr>
+      </a:lvl6pPr>
+      <a:lvl7pPr marL="2743200" algn="l" defTabSz="914400" rtl="0" eaLnBrk="1" latinLnBrk="0" hangingPunct="1">
+        <a:defRPr sz="1800" kern="1200">
+          <a:solidFill>
+            <a:schemeClr val="tx1"/>
+          </a:solidFill>
+          <a:latin typeface="+mn-lt"/>
+          <a:ea typeface="+mn-ea"/>
+          <a:cs typeface="+mn-cs"/>
+        </a:defRPr>
+      </a:lvl7pPr>
+      <a:lvl8pPr marL="3200400" algn="l" defTabSz="914400" rtl="0" eaLnBrk="1" latinLnBrk="0" hangingPunct="1">
+        <a:defRPr sz="1800" kern="1200">
+          <a:solidFill>
+            <a:schemeClr val="tx1"/>
+          </a:solidFill>
+          <a:latin typeface="+mn-lt"/>
+          <a:ea typeface="+mn-ea"/>
+          <a:cs typeface="+mn-cs"/>
+        </a:defRPr>
+      </a:lvl8pPr>
+      <a:lvl9pPr marL="3657600" algn="l" defTabSz="914400" rtl="0" eaLnBrk="1" latinLnBrk="0" hangingPunct="1">
+        <a:defRPr sz="1800" kern="1200">
+          <a:solidFill>
+            <a:schemeClr val="tx1"/>
+          </a:solidFill>
+          <a:latin typeface="+mn-lt"/>
+          <a:ea typeface="+mn-ea"/>
+          <a:cs typeface="+mn-cs"/>
+        </a:defRPr>
+      </a:lvl9pPr>
+    </p:otherStyle>
+  </p:txStyles>
 </p:sldMaster>
 </file>
 
 <file path=ppt/slideMasters/slideMaster2.xml><?xml version="1.0" encoding="utf-8"?>
-<p:sldMaster xmlns:a="http://schemas.openxmlformats.org/drawingml/2006/main" xmlns:p="http://schemas.openxmlformats.org/presentationml/2006/main" xmlns:r="http://schemas.openxmlformats.org/officeDocument/2006/relationships" xmlns:p14="http://schemas.microsoft.com/office/powerpoint/2010/main" xmlns:p15="http://schemas.microsoft.com/office/powerpoint/2012/main" xmlns:mc="http://schemas.openxmlformats.org/markup-compatibility/2006">
+<p:sldMaster xmlns:a="http://schemas.openxmlformats.org/drawingml/2006/main" xmlns:r="http://schemas.openxmlformats.org/officeDocument/2006/relationships" xmlns:p="http://schemas.openxmlformats.org/presentationml/2006/main">
   <p:cSld>
     <p:bg>
       <p:bgPr>
         <a:gradFill rotWithShape="0">
           <a:gsLst>
             <a:gs pos="10000">
-              <a:srgbClr val="6bd1ec"/>
+              <a:srgbClr val="6BD1EC"/>
             </a:gs>
             <a:gs pos="100000">
-              <a:srgbClr val="06588e"/>
+              <a:srgbClr val="06588E"/>
             </a:gs>
           </a:gsLst>
           <a:lin ang="6120000"/>
         </a:gradFill>
+        <a:effectLst/>
       </p:bgPr>
     </p:bg>
     <p:spTree>
@@ -3771,7 +4255,7 @@
             <a:prstGeom prst="line">
               <a:avLst/>
             </a:prstGeom>
-            <a:ln cap="rnd" w="9525">
+            <a:ln w="9525" cap="rnd">
               <a:solidFill>
                 <a:schemeClr val="tx1"/>
               </a:solidFill>
@@ -3805,7 +4289,7 @@
             <a:prstGeom prst="line">
               <a:avLst/>
             </a:prstGeom>
-            <a:ln cap="rnd" w="9525">
+            <a:ln w="9525" cap="rnd">
               <a:solidFill>
                 <a:schemeClr val="tx1"/>
               </a:solidFill>
@@ -3839,7 +4323,7 @@
             <a:prstGeom prst="line">
               <a:avLst/>
             </a:prstGeom>
-            <a:ln cap="rnd" w="9525">
+            <a:ln w="9525" cap="rnd">
               <a:solidFill>
                 <a:schemeClr val="tx1"/>
               </a:solidFill>
@@ -3873,7 +4357,7 @@
             <a:prstGeom prst="line">
               <a:avLst/>
             </a:prstGeom>
-            <a:ln cap="rnd" w="28575">
+            <a:ln w="28575" cap="rnd">
               <a:solidFill>
                 <a:schemeClr val="tx1"/>
               </a:solidFill>
@@ -3907,7 +4391,7 @@
             <a:prstGeom prst="line">
               <a:avLst/>
             </a:prstGeom>
-            <a:ln cap="rnd" w="28575">
+            <a:ln w="28575" cap="rnd">
               <a:solidFill>
                 <a:schemeClr val="tx1"/>
               </a:solidFill>
@@ -3951,6 +4435,7 @@
           <a:bodyPr anchor="ctr">
             <a:noAutofit/>
           </a:bodyPr>
+          <a:lstStyle/>
           <a:p>
             <a:pPr>
               <a:lnSpc>
@@ -3958,17 +4443,17 @@
               </a:lnSpc>
             </a:pPr>
             <a:r>
-              <a:rPr b="0" lang="en-US" sz="3600" spc="-1" strike="noStrike" cap="all">
+              <a:rPr lang="en-US" sz="3600" b="0" strike="noStrike" cap="all" spc="-1">
                 <a:solidFill>
-                  <a:srgbClr val="ffffff"/>
+                  <a:srgbClr val="FFFFFF"/>
                 </a:solidFill>
                 <a:latin typeface="Century Gothic"/>
               </a:rPr>
               <a:t>Click to edit Master title style</a:t>
             </a:r>
-            <a:endParaRPr b="0" lang="en-US" sz="3600" spc="-1" strike="noStrike">
-              <a:solidFill>
-                <a:srgbClr val="ffffff"/>
+            <a:endParaRPr lang="en-US" sz="3600" b="0" strike="noStrike" spc="-1">
+              <a:solidFill>
+                <a:srgbClr val="FFFFFF"/>
               </a:solidFill>
               <a:latin typeface="Century Gothic"/>
             </a:endParaRPr>
@@ -3998,6 +4483,7 @@
           <a:bodyPr anchor="ctr">
             <a:noAutofit/>
           </a:bodyPr>
+          <a:lstStyle/>
           <a:p>
             <a:pPr marL="285840" indent="-285480">
               <a:lnSpc>
@@ -4010,30 +4496,24 @@
                 <a:spcPts val="601"/>
               </a:spcAft>
               <a:buClr>
-                <a:srgbClr val="ffffff"/>
+                <a:srgbClr val="FFFFFF"/>
               </a:buClr>
               <a:buSzPct val="80000"/>
               <a:buFont typeface="Wingdings 3" charset="2"/>
               <a:buChar char=""/>
             </a:pPr>
             <a:r>
-              <a:rPr b="0" lang="en-US" sz="2000" spc="-1" strike="noStrike">
+              <a:rPr lang="en-US" sz="2000" b="0" strike="noStrike" spc="-1">
                 <a:solidFill>
-                  <a:srgbClr val="0f496f"/>
+                  <a:srgbClr val="0F496F"/>
                 </a:solidFill>
                 <a:latin typeface="Century Gothic"/>
               </a:rPr>
               <a:t>Click to edit Master text styles</a:t>
             </a:r>
-            <a:endParaRPr b="0" lang="en-US" sz="2000" spc="-1" strike="noStrike">
-              <a:solidFill>
-                <a:srgbClr val="0f496f"/>
-              </a:solidFill>
-              <a:latin typeface="Century Gothic"/>
-            </a:endParaRPr>
-          </a:p>
-          <a:p>
-            <a:pPr lvl="1" marL="743040" indent="-285480">
+          </a:p>
+          <a:p>
+            <a:pPr marL="743040" lvl="1" indent="-285480">
               <a:lnSpc>
                 <a:spcPct val="100000"/>
               </a:lnSpc>
@@ -4044,30 +4524,24 @@
                 <a:spcPts val="601"/>
               </a:spcAft>
               <a:buClr>
-                <a:srgbClr val="ffffff"/>
+                <a:srgbClr val="FFFFFF"/>
               </a:buClr>
               <a:buSzPct val="80000"/>
               <a:buFont typeface="Wingdings 3" charset="2"/>
               <a:buChar char=""/>
             </a:pPr>
             <a:r>
-              <a:rPr b="0" lang="en-US" sz="1800" spc="-1" strike="noStrike">
+              <a:rPr lang="en-US" sz="1800" b="0" strike="noStrike" spc="-1">
                 <a:solidFill>
-                  <a:srgbClr val="0f496f"/>
+                  <a:srgbClr val="0F496F"/>
                 </a:solidFill>
                 <a:latin typeface="Century Gothic"/>
               </a:rPr>
               <a:t>Second level</a:t>
             </a:r>
-            <a:endParaRPr b="0" lang="en-US" sz="1800" spc="-1" strike="noStrike">
-              <a:solidFill>
-                <a:srgbClr val="0f496f"/>
-              </a:solidFill>
-              <a:latin typeface="Century Gothic"/>
-            </a:endParaRPr>
-          </a:p>
-          <a:p>
-            <a:pPr lvl="2" marL="1200240" indent="-285480">
+          </a:p>
+          <a:p>
+            <a:pPr marL="1200240" lvl="2" indent="-285480">
               <a:lnSpc>
                 <a:spcPct val="100000"/>
               </a:lnSpc>
@@ -4078,30 +4552,24 @@
                 <a:spcPts val="601"/>
               </a:spcAft>
               <a:buClr>
-                <a:srgbClr val="ffffff"/>
+                <a:srgbClr val="FFFFFF"/>
               </a:buClr>
               <a:buSzPct val="80000"/>
               <a:buFont typeface="Wingdings 3" charset="2"/>
               <a:buChar char=""/>
             </a:pPr>
             <a:r>
-              <a:rPr b="0" lang="en-US" sz="1600" spc="-1" strike="noStrike">
+              <a:rPr lang="en-US" sz="1600" b="0" strike="noStrike" spc="-1">
                 <a:solidFill>
-                  <a:srgbClr val="0f496f"/>
+                  <a:srgbClr val="0F496F"/>
                 </a:solidFill>
                 <a:latin typeface="Century Gothic"/>
               </a:rPr>
               <a:t>Third level</a:t>
             </a:r>
-            <a:endParaRPr b="0" lang="en-US" sz="1600" spc="-1" strike="noStrike">
-              <a:solidFill>
-                <a:srgbClr val="0f496f"/>
-              </a:solidFill>
-              <a:latin typeface="Century Gothic"/>
-            </a:endParaRPr>
-          </a:p>
-          <a:p>
-            <a:pPr lvl="3" marL="1542960" indent="-171000">
+          </a:p>
+          <a:p>
+            <a:pPr marL="1542960" lvl="3" indent="-171000">
               <a:lnSpc>
                 <a:spcPct val="100000"/>
               </a:lnSpc>
@@ -4112,30 +4580,24 @@
                 <a:spcPts val="601"/>
               </a:spcAft>
               <a:buClr>
-                <a:srgbClr val="ffffff"/>
+                <a:srgbClr val="FFFFFF"/>
               </a:buClr>
               <a:buSzPct val="80000"/>
               <a:buFont typeface="Wingdings 3" charset="2"/>
               <a:buChar char=""/>
             </a:pPr>
             <a:r>
-              <a:rPr b="0" lang="en-US" sz="1400" spc="-1" strike="noStrike">
+              <a:rPr lang="en-US" sz="1400" b="0" strike="noStrike" spc="-1">
                 <a:solidFill>
-                  <a:srgbClr val="0f496f"/>
+                  <a:srgbClr val="0F496F"/>
                 </a:solidFill>
                 <a:latin typeface="Century Gothic"/>
               </a:rPr>
               <a:t>Fourth level</a:t>
             </a:r>
-            <a:endParaRPr b="0" lang="en-US" sz="1400" spc="-1" strike="noStrike">
-              <a:solidFill>
-                <a:srgbClr val="0f496f"/>
-              </a:solidFill>
-              <a:latin typeface="Century Gothic"/>
-            </a:endParaRPr>
-          </a:p>
-          <a:p>
-            <a:pPr lvl="4" marL="2000160" indent="-171000">
+          </a:p>
+          <a:p>
+            <a:pPr marL="2000160" lvl="4" indent="-171000">
               <a:lnSpc>
                 <a:spcPct val="100000"/>
               </a:lnSpc>
@@ -4146,27 +4608,21 @@
                 <a:spcPts val="601"/>
               </a:spcAft>
               <a:buClr>
-                <a:srgbClr val="ffffff"/>
+                <a:srgbClr val="FFFFFF"/>
               </a:buClr>
               <a:buSzPct val="80000"/>
               <a:buFont typeface="Wingdings 3" charset="2"/>
               <a:buChar char=""/>
             </a:pPr>
             <a:r>
-              <a:rPr b="0" lang="en-US" sz="1400" spc="-1" strike="noStrike">
+              <a:rPr lang="en-US" sz="1400" b="0" strike="noStrike" spc="-1">
                 <a:solidFill>
-                  <a:srgbClr val="0f496f"/>
+                  <a:srgbClr val="0F496F"/>
                 </a:solidFill>
                 <a:latin typeface="Century Gothic"/>
               </a:rPr>
               <a:t>Fifth level</a:t>
             </a:r>
-            <a:endParaRPr b="0" lang="en-US" sz="1400" spc="-1" strike="noStrike">
-              <a:solidFill>
-                <a:srgbClr val="0f496f"/>
-              </a:solidFill>
-              <a:latin typeface="Century Gothic"/>
-            </a:endParaRPr>
           </a:p>
         </p:txBody>
       </p:sp>
@@ -4193,6 +4649,7 @@
           <a:bodyPr>
             <a:noAutofit/>
           </a:bodyPr>
+          <a:lstStyle/>
           <a:p>
             <a:pPr algn="r">
               <a:lnSpc>
@@ -4200,15 +4657,15 @@
               </a:lnSpc>
             </a:pPr>
             <a:fld id="{15F3075A-2298-4B7C-B790-7D2D6DC8E082}" type="datetime">
-              <a:rPr b="0" lang="en-CA" sz="1000" spc="-1" strike="noStrike">
+              <a:rPr lang="en-CA" sz="1000" b="0" strike="noStrike" spc="-1">
                 <a:solidFill>
-                  <a:srgbClr val="0a304a"/>
+                  <a:srgbClr val="0A304A"/>
                 </a:solidFill>
                 <a:latin typeface="Century Gothic"/>
               </a:rPr>
-              <a:t>20-12-9</a:t>
+              <a:t>2020-12-09</a:t>
             </a:fld>
-            <a:endParaRPr b="0" lang="en-CA" sz="1000" spc="-1" strike="noStrike">
+            <a:endParaRPr lang="en-CA" sz="1000" b="0" strike="noStrike" spc="-1">
               <a:latin typeface="Tinos"/>
             </a:endParaRPr>
           </a:p>
@@ -4237,8 +4694,9 @@
           <a:bodyPr>
             <a:noAutofit/>
           </a:bodyPr>
-          <a:p>
-            <a:endParaRPr b="0" lang="en-CA" sz="2400" spc="-1" strike="noStrike">
+          <a:lstStyle/>
+          <a:p>
+            <a:endParaRPr lang="en-CA" sz="2400" b="0" strike="noStrike" spc="-1">
               <a:latin typeface="Tinos"/>
             </a:endParaRPr>
           </a:p>
@@ -4267,6 +4725,7 @@
           <a:bodyPr anchor="b">
             <a:noAutofit/>
           </a:bodyPr>
+          <a:lstStyle/>
           <a:p>
             <a:pPr algn="r">
               <a:lnSpc>
@@ -4274,15 +4733,15 @@
               </a:lnSpc>
             </a:pPr>
             <a:fld id="{55BE0BD5-1064-47F7-8CA5-2B75FD0EE275}" type="slidenum">
-              <a:rPr b="0" lang="en-CA" sz="3200" spc="-1" strike="noStrike">
+              <a:rPr lang="en-CA" sz="3200" b="0" strike="noStrike" spc="-1">
                 <a:solidFill>
-                  <a:srgbClr val="0a304a"/>
+                  <a:srgbClr val="0A304A"/>
                 </a:solidFill>
                 <a:latin typeface="Century Gothic"/>
               </a:rPr>
-              <a:t>&lt;number&gt;</a:t>
+              <a:t>‹#›</a:t>
             </a:fld>
-            <a:endParaRPr b="0" lang="en-CA" sz="3200" spc="-1" strike="noStrike">
+            <a:endParaRPr lang="en-CA" sz="3200" b="0" strike="noStrike" spc="-1">
               <a:latin typeface="Tinos"/>
             </a:endParaRPr>
           </a:p>
@@ -4290,26 +4749,306 @@
       </p:sp>
     </p:spTree>
   </p:cSld>
-  <p:clrMap bg1="lt1" bg2="lt2" tx1="dk1" tx2="dk2" accent1="accent1" accent2="accent2" accent3="accent3" accent4="accent4" accent5="accent5" accent6="accent6" hlink="hlink" folHlink="folHlink"/>
+  <p:clrMap bg1="lt1" tx1="dk1" bg2="lt2" tx2="dk2" accent1="accent1" accent2="accent2" accent3="accent3" accent4="accent4" accent5="accent5" accent6="accent6" hlink="hlink" folHlink="folHlink"/>
   <p:sldLayoutIdLst>
-    <p:sldLayoutId id="2147483662" r:id="rId2"/>
-    <p:sldLayoutId id="2147483663" r:id="rId3"/>
-    <p:sldLayoutId id="2147483664" r:id="rId4"/>
-    <p:sldLayoutId id="2147483665" r:id="rId5"/>
-    <p:sldLayoutId id="2147483666" r:id="rId6"/>
-    <p:sldLayoutId id="2147483667" r:id="rId7"/>
-    <p:sldLayoutId id="2147483668" r:id="rId8"/>
-    <p:sldLayoutId id="2147483669" r:id="rId9"/>
-    <p:sldLayoutId id="2147483670" r:id="rId10"/>
-    <p:sldLayoutId id="2147483671" r:id="rId11"/>
-    <p:sldLayoutId id="2147483672" r:id="rId12"/>
-    <p:sldLayoutId id="2147483673" r:id="rId13"/>
+    <p:sldLayoutId id="2147483662" r:id="rId1"/>
+    <p:sldLayoutId id="2147483663" r:id="rId2"/>
+    <p:sldLayoutId id="2147483664" r:id="rId3"/>
+    <p:sldLayoutId id="2147483665" r:id="rId4"/>
+    <p:sldLayoutId id="2147483666" r:id="rId5"/>
+    <p:sldLayoutId id="2147483667" r:id="rId6"/>
+    <p:sldLayoutId id="2147483668" r:id="rId7"/>
+    <p:sldLayoutId id="2147483669" r:id="rId8"/>
+    <p:sldLayoutId id="2147483670" r:id="rId9"/>
+    <p:sldLayoutId id="2147483671" r:id="rId10"/>
+    <p:sldLayoutId id="2147483672" r:id="rId11"/>
+    <p:sldLayoutId id="2147483673" r:id="rId12"/>
   </p:sldLayoutIdLst>
+  <p:txStyles>
+    <p:titleStyle>
+      <a:lvl1pPr algn="l" defTabSz="914400" rtl="0" eaLnBrk="1" latinLnBrk="0" hangingPunct="1">
+        <a:lnSpc>
+          <a:spcPct val="90000"/>
+        </a:lnSpc>
+        <a:spcBef>
+          <a:spcPct val="0"/>
+        </a:spcBef>
+        <a:buNone/>
+        <a:defRPr sz="4400" kern="1200">
+          <a:solidFill>
+            <a:schemeClr val="tx1"/>
+          </a:solidFill>
+          <a:latin typeface="+mj-lt"/>
+          <a:ea typeface="+mj-ea"/>
+          <a:cs typeface="+mj-cs"/>
+        </a:defRPr>
+      </a:lvl1pPr>
+    </p:titleStyle>
+    <p:bodyStyle>
+      <a:lvl1pPr marL="228600" indent="-228600" algn="l" defTabSz="914400" rtl="0" eaLnBrk="1" latinLnBrk="0" hangingPunct="1">
+        <a:lnSpc>
+          <a:spcPct val="90000"/>
+        </a:lnSpc>
+        <a:spcBef>
+          <a:spcPts val="1000"/>
+        </a:spcBef>
+        <a:buFont typeface="Arial" panose="020B0604020202020204" pitchFamily="34" charset="0"/>
+        <a:buChar char="•"/>
+        <a:defRPr sz="2800" kern="1200">
+          <a:solidFill>
+            <a:schemeClr val="tx1"/>
+          </a:solidFill>
+          <a:latin typeface="+mn-lt"/>
+          <a:ea typeface="+mn-ea"/>
+          <a:cs typeface="+mn-cs"/>
+        </a:defRPr>
+      </a:lvl1pPr>
+      <a:lvl2pPr marL="685800" indent="-228600" algn="l" defTabSz="914400" rtl="0" eaLnBrk="1" latinLnBrk="0" hangingPunct="1">
+        <a:lnSpc>
+          <a:spcPct val="90000"/>
+        </a:lnSpc>
+        <a:spcBef>
+          <a:spcPts val="500"/>
+        </a:spcBef>
+        <a:buFont typeface="Arial" panose="020B0604020202020204" pitchFamily="34" charset="0"/>
+        <a:buChar char="•"/>
+        <a:defRPr sz="2400" kern="1200">
+          <a:solidFill>
+            <a:schemeClr val="tx1"/>
+          </a:solidFill>
+          <a:latin typeface="+mn-lt"/>
+          <a:ea typeface="+mn-ea"/>
+          <a:cs typeface="+mn-cs"/>
+        </a:defRPr>
+      </a:lvl2pPr>
+      <a:lvl3pPr marL="1143000" indent="-228600" algn="l" defTabSz="914400" rtl="0" eaLnBrk="1" latinLnBrk="0" hangingPunct="1">
+        <a:lnSpc>
+          <a:spcPct val="90000"/>
+        </a:lnSpc>
+        <a:spcBef>
+          <a:spcPts val="500"/>
+        </a:spcBef>
+        <a:buFont typeface="Arial" panose="020B0604020202020204" pitchFamily="34" charset="0"/>
+        <a:buChar char="•"/>
+        <a:defRPr sz="2000" kern="1200">
+          <a:solidFill>
+            <a:schemeClr val="tx1"/>
+          </a:solidFill>
+          <a:latin typeface="+mn-lt"/>
+          <a:ea typeface="+mn-ea"/>
+          <a:cs typeface="+mn-cs"/>
+        </a:defRPr>
+      </a:lvl3pPr>
+      <a:lvl4pPr marL="1600200" indent="-228600" algn="l" defTabSz="914400" rtl="0" eaLnBrk="1" latinLnBrk="0" hangingPunct="1">
+        <a:lnSpc>
+          <a:spcPct val="90000"/>
+        </a:lnSpc>
+        <a:spcBef>
+          <a:spcPts val="500"/>
+        </a:spcBef>
+        <a:buFont typeface="Arial" panose="020B0604020202020204" pitchFamily="34" charset="0"/>
+        <a:buChar char="•"/>
+        <a:defRPr sz="1800" kern="1200">
+          <a:solidFill>
+            <a:schemeClr val="tx1"/>
+          </a:solidFill>
+          <a:latin typeface="+mn-lt"/>
+          <a:ea typeface="+mn-ea"/>
+          <a:cs typeface="+mn-cs"/>
+        </a:defRPr>
+      </a:lvl4pPr>
+      <a:lvl5pPr marL="2057400" indent="-228600" algn="l" defTabSz="914400" rtl="0" eaLnBrk="1" latinLnBrk="0" hangingPunct="1">
+        <a:lnSpc>
+          <a:spcPct val="90000"/>
+        </a:lnSpc>
+        <a:spcBef>
+          <a:spcPts val="500"/>
+        </a:spcBef>
+        <a:buFont typeface="Arial" panose="020B0604020202020204" pitchFamily="34" charset="0"/>
+        <a:buChar char="•"/>
+        <a:defRPr sz="1800" kern="1200">
+          <a:solidFill>
+            <a:schemeClr val="tx1"/>
+          </a:solidFill>
+          <a:latin typeface="+mn-lt"/>
+          <a:ea typeface="+mn-ea"/>
+          <a:cs typeface="+mn-cs"/>
+        </a:defRPr>
+      </a:lvl5pPr>
+      <a:lvl6pPr marL="2514600" indent="-228600" algn="l" defTabSz="914400" rtl="0" eaLnBrk="1" latinLnBrk="0" hangingPunct="1">
+        <a:lnSpc>
+          <a:spcPct val="90000"/>
+        </a:lnSpc>
+        <a:spcBef>
+          <a:spcPts val="500"/>
+        </a:spcBef>
+        <a:buFont typeface="Arial" panose="020B0604020202020204" pitchFamily="34" charset="0"/>
+        <a:buChar char="•"/>
+        <a:defRPr sz="1800" kern="1200">
+          <a:solidFill>
+            <a:schemeClr val="tx1"/>
+          </a:solidFill>
+          <a:latin typeface="+mn-lt"/>
+          <a:ea typeface="+mn-ea"/>
+          <a:cs typeface="+mn-cs"/>
+        </a:defRPr>
+      </a:lvl6pPr>
+      <a:lvl7pPr marL="2971800" indent="-228600" algn="l" defTabSz="914400" rtl="0" eaLnBrk="1" latinLnBrk="0" hangingPunct="1">
+        <a:lnSpc>
+          <a:spcPct val="90000"/>
+        </a:lnSpc>
+        <a:spcBef>
+          <a:spcPts val="500"/>
+        </a:spcBef>
+        <a:buFont typeface="Arial" panose="020B0604020202020204" pitchFamily="34" charset="0"/>
+        <a:buChar char="•"/>
+        <a:defRPr sz="1800" kern="1200">
+          <a:solidFill>
+            <a:schemeClr val="tx1"/>
+          </a:solidFill>
+          <a:latin typeface="+mn-lt"/>
+          <a:ea typeface="+mn-ea"/>
+          <a:cs typeface="+mn-cs"/>
+        </a:defRPr>
+      </a:lvl7pPr>
+      <a:lvl8pPr marL="3429000" indent="-228600" algn="l" defTabSz="914400" rtl="0" eaLnBrk="1" latinLnBrk="0" hangingPunct="1">
+        <a:lnSpc>
+          <a:spcPct val="90000"/>
+        </a:lnSpc>
+        <a:spcBef>
+          <a:spcPts val="500"/>
+        </a:spcBef>
+        <a:buFont typeface="Arial" panose="020B0604020202020204" pitchFamily="34" charset="0"/>
+        <a:buChar char="•"/>
+        <a:defRPr sz="1800" kern="1200">
+          <a:solidFill>
+            <a:schemeClr val="tx1"/>
+          </a:solidFill>
+          <a:latin typeface="+mn-lt"/>
+          <a:ea typeface="+mn-ea"/>
+          <a:cs typeface="+mn-cs"/>
+        </a:defRPr>
+      </a:lvl8pPr>
+      <a:lvl9pPr marL="3886200" indent="-228600" algn="l" defTabSz="914400" rtl="0" eaLnBrk="1" latinLnBrk="0" hangingPunct="1">
+        <a:lnSpc>
+          <a:spcPct val="90000"/>
+        </a:lnSpc>
+        <a:spcBef>
+          <a:spcPts val="500"/>
+        </a:spcBef>
+        <a:buFont typeface="Arial" panose="020B0604020202020204" pitchFamily="34" charset="0"/>
+        <a:buChar char="•"/>
+        <a:defRPr sz="1800" kern="1200">
+          <a:solidFill>
+            <a:schemeClr val="tx1"/>
+          </a:solidFill>
+          <a:latin typeface="+mn-lt"/>
+          <a:ea typeface="+mn-ea"/>
+          <a:cs typeface="+mn-cs"/>
+        </a:defRPr>
+      </a:lvl9pPr>
+    </p:bodyStyle>
+    <p:otherStyle>
+      <a:defPPr>
+        <a:defRPr lang="en-US"/>
+      </a:defPPr>
+      <a:lvl1pPr marL="0" algn="l" defTabSz="914400" rtl="0" eaLnBrk="1" latinLnBrk="0" hangingPunct="1">
+        <a:defRPr sz="1800" kern="1200">
+          <a:solidFill>
+            <a:schemeClr val="tx1"/>
+          </a:solidFill>
+          <a:latin typeface="+mn-lt"/>
+          <a:ea typeface="+mn-ea"/>
+          <a:cs typeface="+mn-cs"/>
+        </a:defRPr>
+      </a:lvl1pPr>
+      <a:lvl2pPr marL="457200" algn="l" defTabSz="914400" rtl="0" eaLnBrk="1" latinLnBrk="0" hangingPunct="1">
+        <a:defRPr sz="1800" kern="1200">
+          <a:solidFill>
+            <a:schemeClr val="tx1"/>
+          </a:solidFill>
+          <a:latin typeface="+mn-lt"/>
+          <a:ea typeface="+mn-ea"/>
+          <a:cs typeface="+mn-cs"/>
+        </a:defRPr>
+      </a:lvl2pPr>
+      <a:lvl3pPr marL="914400" algn="l" defTabSz="914400" rtl="0" eaLnBrk="1" latinLnBrk="0" hangingPunct="1">
+        <a:defRPr sz="1800" kern="1200">
+          <a:solidFill>
+            <a:schemeClr val="tx1"/>
+          </a:solidFill>
+          <a:latin typeface="+mn-lt"/>
+          <a:ea typeface="+mn-ea"/>
+          <a:cs typeface="+mn-cs"/>
+        </a:defRPr>
+      </a:lvl3pPr>
+      <a:lvl4pPr marL="1371600" algn="l" defTabSz="914400" rtl="0" eaLnBrk="1" latinLnBrk="0" hangingPunct="1">
+        <a:defRPr sz="1800" kern="1200">
+          <a:solidFill>
+            <a:schemeClr val="tx1"/>
+          </a:solidFill>
+          <a:latin typeface="+mn-lt"/>
+          <a:ea typeface="+mn-ea"/>
+          <a:cs typeface="+mn-cs"/>
+        </a:defRPr>
+      </a:lvl4pPr>
+      <a:lvl5pPr marL="1828800" algn="l" defTabSz="914400" rtl="0" eaLnBrk="1" latinLnBrk="0" hangingPunct="1">
+        <a:defRPr sz="1800" kern="1200">
+          <a:solidFill>
+            <a:schemeClr val="tx1"/>
+          </a:solidFill>
+          <a:latin typeface="+mn-lt"/>
+          <a:ea typeface="+mn-ea"/>
+          <a:cs typeface="+mn-cs"/>
+        </a:defRPr>
+      </a:lvl5pPr>
+      <a:lvl6pPr marL="2286000" algn="l" defTabSz="914400" rtl="0" eaLnBrk="1" latinLnBrk="0" hangingPunct="1">
+        <a:defRPr sz="1800" kern="1200">
+          <a:solidFill>
+            <a:schemeClr val="tx1"/>
+          </a:solidFill>
+          <a:latin typeface="+mn-lt"/>
+          <a:ea typeface="+mn-ea"/>
+          <a:cs typeface="+mn-cs"/>
+        </a:defRPr>
+      </a:lvl6pPr>
+      <a:lvl7pPr marL="2743200" algn="l" defTabSz="914400" rtl="0" eaLnBrk="1" latinLnBrk="0" hangingPunct="1">
+        <a:defRPr sz="1800" kern="1200">
+          <a:solidFill>
+            <a:schemeClr val="tx1"/>
+          </a:solidFill>
+          <a:latin typeface="+mn-lt"/>
+          <a:ea typeface="+mn-ea"/>
+          <a:cs typeface="+mn-cs"/>
+        </a:defRPr>
+      </a:lvl7pPr>
+      <a:lvl8pPr marL="3200400" algn="l" defTabSz="914400" rtl="0" eaLnBrk="1" latinLnBrk="0" hangingPunct="1">
+        <a:defRPr sz="1800" kern="1200">
+          <a:solidFill>
+            <a:schemeClr val="tx1"/>
+          </a:solidFill>
+          <a:latin typeface="+mn-lt"/>
+          <a:ea typeface="+mn-ea"/>
+          <a:cs typeface="+mn-cs"/>
+        </a:defRPr>
+      </a:lvl8pPr>
+      <a:lvl9pPr marL="3657600" algn="l" defTabSz="914400" rtl="0" eaLnBrk="1" latinLnBrk="0" hangingPunct="1">
+        <a:defRPr sz="1800" kern="1200">
+          <a:solidFill>
+            <a:schemeClr val="tx1"/>
+          </a:solidFill>
+          <a:latin typeface="+mn-lt"/>
+          <a:ea typeface="+mn-ea"/>
+          <a:cs typeface="+mn-cs"/>
+        </a:defRPr>
+      </a:lvl9pPr>
+    </p:otherStyle>
+  </p:txStyles>
 </p:sldMaster>
 </file>
 
 <file path=ppt/slides/slide1.xml><?xml version="1.0" encoding="utf-8"?>
-<p:sld xmlns:a="http://schemas.openxmlformats.org/drawingml/2006/main" xmlns:p="http://schemas.openxmlformats.org/presentationml/2006/main" xmlns:r="http://schemas.openxmlformats.org/officeDocument/2006/relationships" xmlns:p14="http://schemas.microsoft.com/office/powerpoint/2010/main" xmlns:p15="http://schemas.microsoft.com/office/powerpoint/2012/main" xmlns:mc="http://schemas.openxmlformats.org/markup-compatibility/2006">
+<p:sld xmlns:a="http://schemas.openxmlformats.org/drawingml/2006/main" xmlns:r="http://schemas.openxmlformats.org/officeDocument/2006/relationships" xmlns:p="http://schemas.openxmlformats.org/presentationml/2006/main">
   <p:cSld>
     <p:spTree>
       <p:nvGrpSpPr>
@@ -4348,6 +5087,7 @@
           <a:bodyPr anchor="b">
             <a:noAutofit/>
           </a:bodyPr>
+          <a:lstStyle/>
           <a:p>
             <a:pPr>
               <a:lnSpc>
@@ -4355,17 +5095,17 @@
               </a:lnSpc>
             </a:pPr>
             <a:r>
-              <a:rPr b="0" lang="en-US" sz="4800" spc="-1" strike="noStrike" cap="all">
+              <a:rPr lang="en-US" sz="4800" b="0" strike="noStrike" cap="all" spc="-1">
                 <a:solidFill>
-                  <a:srgbClr val="ffffff"/>
+                  <a:srgbClr val="FFFFFF"/>
                 </a:solidFill>
                 <a:latin typeface="Century Gothic"/>
               </a:rPr>
               <a:t>SB Weather boys</a:t>
             </a:r>
-            <a:endParaRPr b="0" lang="en-US" sz="4800" spc="-1" strike="noStrike">
-              <a:solidFill>
-                <a:srgbClr val="ffffff"/>
+            <a:endParaRPr lang="en-US" sz="4800" b="0" strike="noStrike" spc="-1">
+              <a:solidFill>
+                <a:srgbClr val="FFFFFF"/>
               </a:solidFill>
               <a:latin typeface="Century Gothic"/>
             </a:endParaRPr>
@@ -4395,6 +5135,7 @@
           <a:bodyPr>
             <a:noAutofit/>
           </a:bodyPr>
+          <a:lstStyle/>
           <a:p>
             <a:pPr>
               <a:lnSpc>
@@ -4407,19 +5148,19 @@
                 <a:spcPts val="601"/>
               </a:spcAft>
               <a:tabLst>
-                <a:tab algn="l" pos="0"/>
+                <a:tab pos="0" algn="l"/>
               </a:tabLst>
             </a:pPr>
             <a:r>
-              <a:rPr b="0" lang="en-CA" sz="2100" spc="-1" strike="noStrike">
+              <a:rPr lang="en-CA" sz="2100" b="0" strike="noStrike" spc="-1">
                 <a:solidFill>
-                  <a:srgbClr val="0f496f"/>
+                  <a:srgbClr val="0F496F"/>
                 </a:solidFill>
                 <a:latin typeface="Century Gothic"/>
               </a:rPr>
               <a:t>Nathaniel Hedman - N01112536</a:t>
             </a:r>
-            <a:endParaRPr b="0" lang="en-CA" sz="2100" spc="-1" strike="noStrike">
+            <a:endParaRPr lang="en-CA" sz="2100" b="0" strike="noStrike" spc="-1">
               <a:latin typeface="arial"/>
             </a:endParaRPr>
           </a:p>
@@ -4435,19 +5176,19 @@
                 <a:spcPts val="601"/>
               </a:spcAft>
               <a:tabLst>
-                <a:tab algn="l" pos="0"/>
+                <a:tab pos="0" algn="l"/>
               </a:tabLst>
             </a:pPr>
             <a:r>
-              <a:rPr b="0" lang="en-CA" sz="2100" spc="-1" strike="noStrike">
+              <a:rPr lang="en-CA" sz="2100" b="0" strike="noStrike" spc="-1">
                 <a:solidFill>
-                  <a:srgbClr val="0f496f"/>
+                  <a:srgbClr val="0F496F"/>
                 </a:solidFill>
                 <a:latin typeface="Century Gothic"/>
               </a:rPr>
               <a:t>Robert Miller - N01364182</a:t>
             </a:r>
-            <a:endParaRPr b="0" lang="en-CA" sz="2100" spc="-1" strike="noStrike">
+            <a:endParaRPr lang="en-CA" sz="2100" b="0" strike="noStrike" spc="-1">
               <a:latin typeface="arial"/>
             </a:endParaRPr>
           </a:p>
@@ -4463,19 +5204,19 @@
                 <a:spcPts val="601"/>
               </a:spcAft>
               <a:tabLst>
-                <a:tab algn="l" pos="0"/>
+                <a:tab pos="0" algn="l"/>
               </a:tabLst>
             </a:pPr>
             <a:r>
-              <a:rPr b="0" lang="en-US" sz="2100" spc="-1" strike="noStrike">
+              <a:rPr lang="en-US" sz="2100" b="0" strike="noStrike" spc="-1">
                 <a:solidFill>
-                  <a:srgbClr val="0f496f"/>
+                  <a:srgbClr val="0F496F"/>
                 </a:solidFill>
                 <a:latin typeface="Century Gothic"/>
               </a:rPr>
               <a:t>Jeremy Persaud – N01338636</a:t>
             </a:r>
-            <a:endParaRPr b="0" lang="en-CA" sz="2100" spc="-1" strike="noStrike">
+            <a:endParaRPr lang="en-CA" sz="2100" b="0" strike="noStrike" spc="-1">
               <a:latin typeface="arial"/>
             </a:endParaRPr>
           </a:p>
@@ -4491,39 +5232,70 @@
                 <a:spcPts val="601"/>
               </a:spcAft>
               <a:tabLst>
-                <a:tab algn="l" pos="0"/>
+                <a:tab pos="0" algn="l"/>
               </a:tabLst>
             </a:pPr>
             <a:r>
-              <a:rPr b="0" lang="en-US" sz="2100" spc="-1" strike="noStrike">
+              <a:rPr lang="en-US" sz="2100" b="0" strike="noStrike" spc="-1">
                 <a:solidFill>
-                  <a:srgbClr val="0f496f"/>
+                  <a:srgbClr val="0F496F"/>
                 </a:solidFill>
                 <a:latin typeface="Century Gothic"/>
               </a:rPr>
               <a:t>Gagandeep Saini – N01364182</a:t>
             </a:r>
-            <a:endParaRPr b="0" lang="en-CA" sz="2100" spc="-1" strike="noStrike">
+            <a:endParaRPr lang="en-CA" sz="2100" b="0" strike="noStrike" spc="-1">
               <a:latin typeface="arial"/>
             </a:endParaRPr>
           </a:p>
         </p:txBody>
       </p:sp>
+      <p:pic>
+        <p:nvPicPr>
+          <p:cNvPr id="3" name="Picture 2">
+            <a:extLst>
+              <a:ext uri="{FF2B5EF4-FFF2-40B4-BE49-F238E27FC236}">
+                <a16:creationId xmlns:a16="http://schemas.microsoft.com/office/drawing/2014/main" id="{591E3B3B-7E4D-43E3-86E4-825E282A548D}"/>
+              </a:ext>
+            </a:extLst>
+          </p:cNvPr>
+          <p:cNvPicPr>
+            <a:picLocks noChangeAspect="1"/>
+          </p:cNvPicPr>
+          <p:nvPr/>
+        </p:nvPicPr>
+        <p:blipFill>
+          <a:blip r:embed="rId2">
+            <a:extLst>
+              <a:ext uri="{28A0092B-C50C-407E-A947-70E740481C1C}">
+                <a14:useLocalDpi xmlns:a14="http://schemas.microsoft.com/office/drawing/2010/main" val="0"/>
+              </a:ext>
+            </a:extLst>
+          </a:blip>
+          <a:stretch>
+            <a:fillRect/>
+          </a:stretch>
+        </p:blipFill>
+        <p:spPr>
+          <a:xfrm>
+            <a:off x="8816623" y="3823035"/>
+            <a:ext cx="1248694" cy="1189232"/>
+          </a:xfrm>
+          <a:prstGeom prst="rect">
+            <a:avLst/>
+          </a:prstGeom>
+        </p:spPr>
+      </p:pic>
     </p:spTree>
   </p:cSld>
-  <mc:AlternateContent>
-    <mc:Choice Requires="p14">
-      <p:transition spd="slow" p14:dur="2000"/>
-    </mc:Choice>
-    <mc:Fallback>
-      <p:transition spd="slow"/>
-    </mc:Fallback>
-  </mc:AlternateContent>
+  <p:clrMapOvr>
+    <a:masterClrMapping/>
+  </p:clrMapOvr>
 </p:sld>
 </file>
 
 <file path=ppt/slides/slide10.xml><?xml version="1.0" encoding="utf-8"?>
-<p:sld xmlns:a="http://schemas.openxmlformats.org/drawingml/2006/main" xmlns:p="http://schemas.openxmlformats.org/presentationml/2006/main" xmlns:r="http://schemas.openxmlformats.org/officeDocument/2006/relationships" xmlns:p14="http://schemas.microsoft.com/office/powerpoint/2010/main" xmlns:p15="http://schemas.microsoft.com/office/powerpoint/2012/main" xmlns:mc="http://schemas.openxmlformats.org/markup-compatibility/2006">
+<p:sld xmlns:a="http://schemas.openxmlformats.org/drawingml/2006/main" xmlns:r="http://schemas.openxmlformats.org/officeDocument/2006/relationships" xmlns:p="http://schemas.openxmlformats.org/presentationml/2006/main">
   <p:cSld>
     <p:spTree>
       <p:nvGrpSpPr>
@@ -4559,9 +5331,10 @@
           </a:ln>
         </p:spPr>
         <p:txBody>
-          <a:bodyPr lIns="0" rIns="0" tIns="0" bIns="0" anchor="ctr">
+          <a:bodyPr lIns="0" tIns="0" rIns="0" bIns="0" anchor="ctr">
             <a:noAutofit/>
           </a:bodyPr>
+          <a:lstStyle/>
           <a:p>
             <a:pPr>
               <a:lnSpc>
@@ -4569,17 +5342,17 @@
               </a:lnSpc>
             </a:pPr>
             <a:r>
-              <a:rPr b="0" lang="en-US" sz="3600" spc="-1" strike="noStrike" cap="all">
+              <a:rPr lang="en-US" sz="3600" b="0" strike="noStrike" cap="all" spc="-1">
                 <a:solidFill>
-                  <a:srgbClr val="ffffff"/>
+                  <a:srgbClr val="FFFFFF"/>
                 </a:solidFill>
                 <a:latin typeface="Century Gothic"/>
               </a:rPr>
               <a:t>GITHUB II</a:t>
             </a:r>
-            <a:endParaRPr b="0" lang="en-US" sz="3600" spc="-1" strike="noStrike">
-              <a:solidFill>
-                <a:srgbClr val="ffffff"/>
+            <a:endParaRPr lang="en-US" sz="3600" b="0" strike="noStrike" spc="-1">
+              <a:solidFill>
+                <a:srgbClr val="FFFFFF"/>
               </a:solidFill>
               <a:latin typeface="Century Gothic"/>
             </a:endParaRPr>
@@ -4588,12 +5361,12 @@
       </p:sp>
       <p:pic>
         <p:nvPicPr>
-          <p:cNvPr id="124" name="" descr=""/>
+          <p:cNvPr id="124" name="Picture 123"/>
           <p:cNvPicPr/>
           <p:nvPr/>
         </p:nvPicPr>
         <p:blipFill>
-          <a:blip r:embed="rId1"/>
+          <a:blip r:embed="rId2"/>
           <a:stretch/>
         </p:blipFill>
         <p:spPr>
@@ -4611,19 +5384,14 @@
       </p:pic>
     </p:spTree>
   </p:cSld>
-  <mc:AlternateContent>
-    <mc:Choice Requires="p14">
-      <p:transition spd="slow" p14:dur="2000"/>
-    </mc:Choice>
-    <mc:Fallback>
-      <p:transition spd="slow"/>
-    </mc:Fallback>
-  </mc:AlternateContent>
+  <p:clrMapOvr>
+    <a:masterClrMapping/>
+  </p:clrMapOvr>
 </p:sld>
 </file>
 
 <file path=ppt/slides/slide2.xml><?xml version="1.0" encoding="utf-8"?>
-<p:sld xmlns:a="http://schemas.openxmlformats.org/drawingml/2006/main" xmlns:p="http://schemas.openxmlformats.org/presentationml/2006/main" xmlns:r="http://schemas.openxmlformats.org/officeDocument/2006/relationships" xmlns:p14="http://schemas.microsoft.com/office/powerpoint/2010/main" xmlns:p15="http://schemas.microsoft.com/office/powerpoint/2012/main" xmlns:mc="http://schemas.openxmlformats.org/markup-compatibility/2006">
+<p:sld xmlns:a="http://schemas.openxmlformats.org/drawingml/2006/main" xmlns:r="http://schemas.openxmlformats.org/officeDocument/2006/relationships" xmlns:p="http://schemas.openxmlformats.org/presentationml/2006/main">
   <p:cSld>
     <p:spTree>
       <p:nvGrpSpPr>
@@ -4662,6 +5430,7 @@
           <a:bodyPr anchor="ctr">
             <a:noAutofit/>
           </a:bodyPr>
+          <a:lstStyle/>
           <a:p>
             <a:pPr>
               <a:lnSpc>
@@ -4669,17 +5438,17 @@
               </a:lnSpc>
             </a:pPr>
             <a:r>
-              <a:rPr b="0" lang="en-US" sz="3600" spc="-1" strike="noStrike" cap="all">
+              <a:rPr lang="en-US" sz="3600" b="0" strike="noStrike" cap="all" spc="-1">
                 <a:solidFill>
-                  <a:srgbClr val="ffffff"/>
+                  <a:srgbClr val="FFFFFF"/>
                 </a:solidFill>
                 <a:latin typeface="Century Gothic"/>
               </a:rPr>
               <a:t>introduction</a:t>
             </a:r>
-            <a:endParaRPr b="0" lang="en-US" sz="3600" spc="-1" strike="noStrike">
-              <a:solidFill>
-                <a:srgbClr val="ffffff"/>
+            <a:endParaRPr lang="en-US" sz="3600" b="0" strike="noStrike" spc="-1">
+              <a:solidFill>
+                <a:srgbClr val="FFFFFF"/>
               </a:solidFill>
               <a:latin typeface="Century Gothic"/>
             </a:endParaRPr>
@@ -4709,6 +5478,7 @@
           <a:bodyPr anchor="ctr">
             <a:noAutofit/>
           </a:bodyPr>
+          <a:lstStyle/>
           <a:p>
             <a:pPr marL="285840" indent="-285480">
               <a:lnSpc>
@@ -4721,27 +5491,21 @@
                 <a:spcPts val="601"/>
               </a:spcAft>
               <a:buClr>
-                <a:srgbClr val="ffffff"/>
+                <a:srgbClr val="FFFFFF"/>
               </a:buClr>
               <a:buSzPct val="80000"/>
               <a:buFont typeface="Wingdings 3" charset="2"/>
               <a:buChar char=""/>
             </a:pPr>
             <a:r>
-              <a:rPr b="0" lang="en-US" sz="2000" spc="-1" strike="noStrike">
+              <a:rPr lang="en-US" sz="2000" b="0" strike="noStrike" spc="-1">
                 <a:solidFill>
-                  <a:srgbClr val="0f496f"/>
+                  <a:srgbClr val="0F496F"/>
                 </a:solidFill>
                 <a:latin typeface="Century Gothic"/>
               </a:rPr>
               <a:t>Our app SB Weather was designed to work with our hardware project in CENG 317</a:t>
             </a:r>
-            <a:endParaRPr b="0" lang="en-US" sz="2000" spc="-1" strike="noStrike">
-              <a:solidFill>
-                <a:srgbClr val="0f496f"/>
-              </a:solidFill>
-              <a:latin typeface="Century Gothic"/>
-            </a:endParaRPr>
           </a:p>
           <a:p>
             <a:pPr marL="285840" indent="-285480">
@@ -4755,27 +5519,21 @@
                 <a:spcPts val="601"/>
               </a:spcAft>
               <a:buClr>
-                <a:srgbClr val="ffffff"/>
+                <a:srgbClr val="FFFFFF"/>
               </a:buClr>
               <a:buSzPct val="80000"/>
               <a:buFont typeface="Wingdings 3" charset="2"/>
               <a:buChar char=""/>
             </a:pPr>
             <a:r>
-              <a:rPr b="0" lang="en-US" sz="2000" spc="-1" strike="noStrike">
+              <a:rPr lang="en-US" sz="2000" b="0" strike="noStrike" spc="-1">
                 <a:solidFill>
-                  <a:srgbClr val="0f496f"/>
+                  <a:srgbClr val="0F496F"/>
                 </a:solidFill>
                 <a:latin typeface="Century Gothic"/>
               </a:rPr>
               <a:t>Read Temperature, Humidity, Air Pressure and Wind Speed data recorded from their respective sensors and output the data into a database and then display the values within the app</a:t>
             </a:r>
-            <a:endParaRPr b="0" lang="en-US" sz="2000" spc="-1" strike="noStrike">
-              <a:solidFill>
-                <a:srgbClr val="0f496f"/>
-              </a:solidFill>
-              <a:latin typeface="Century Gothic"/>
-            </a:endParaRPr>
           </a:p>
           <a:p>
             <a:pPr marL="285840" indent="-285480">
@@ -4789,45 +5547,34 @@
                 <a:spcPts val="601"/>
               </a:spcAft>
               <a:buClr>
-                <a:srgbClr val="ffffff"/>
+                <a:srgbClr val="FFFFFF"/>
               </a:buClr>
               <a:buSzPct val="80000"/>
               <a:buFont typeface="Wingdings 3" charset="2"/>
               <a:buChar char=""/>
             </a:pPr>
             <a:r>
-              <a:rPr b="0" lang="en-US" sz="2000" spc="-1" strike="noStrike">
+              <a:rPr lang="en-US" sz="2000" b="0" strike="noStrike" spc="-1">
                 <a:solidFill>
-                  <a:srgbClr val="0f496f"/>
+                  <a:srgbClr val="0F496F"/>
                 </a:solidFill>
                 <a:latin typeface="Century Gothic"/>
               </a:rPr>
               <a:t>Chose this project because it can help amateurs get into meteorology and give home owners an idea about the climate in their area</a:t>
             </a:r>
-            <a:endParaRPr b="0" lang="en-US" sz="2000" spc="-1" strike="noStrike">
-              <a:solidFill>
-                <a:srgbClr val="0f496f"/>
-              </a:solidFill>
-              <a:latin typeface="Century Gothic"/>
-            </a:endParaRPr>
           </a:p>
         </p:txBody>
       </p:sp>
     </p:spTree>
   </p:cSld>
-  <mc:AlternateContent>
-    <mc:Choice Requires="p14">
-      <p:transition spd="slow" p14:dur="2000"/>
-    </mc:Choice>
-    <mc:Fallback>
-      <p:transition spd="slow"/>
-    </mc:Fallback>
-  </mc:AlternateContent>
+  <p:clrMapOvr>
+    <a:masterClrMapping/>
+  </p:clrMapOvr>
 </p:sld>
 </file>
 
 <file path=ppt/slides/slide3.xml><?xml version="1.0" encoding="utf-8"?>
-<p:sld xmlns:a="http://schemas.openxmlformats.org/drawingml/2006/main" xmlns:p="http://schemas.openxmlformats.org/presentationml/2006/main" xmlns:r="http://schemas.openxmlformats.org/officeDocument/2006/relationships" xmlns:p14="http://schemas.microsoft.com/office/powerpoint/2010/main" xmlns:p15="http://schemas.microsoft.com/office/powerpoint/2012/main" xmlns:mc="http://schemas.openxmlformats.org/markup-compatibility/2006">
+<p:sld xmlns:a="http://schemas.openxmlformats.org/drawingml/2006/main" xmlns:r="http://schemas.openxmlformats.org/officeDocument/2006/relationships" xmlns:p="http://schemas.openxmlformats.org/presentationml/2006/main">
   <p:cSld>
     <p:spTree>
       <p:nvGrpSpPr>
@@ -4866,6 +5613,7 @@
           <a:bodyPr anchor="ctr">
             <a:noAutofit/>
           </a:bodyPr>
+          <a:lstStyle/>
           <a:p>
             <a:pPr>
               <a:lnSpc>
@@ -4873,17 +5621,17 @@
               </a:lnSpc>
             </a:pPr>
             <a:r>
-              <a:rPr b="0" lang="en-US" sz="3600" spc="-1" strike="noStrike" cap="all">
+              <a:rPr lang="en-US" sz="3600" b="0" strike="noStrike" cap="all" spc="-1">
                 <a:solidFill>
-                  <a:srgbClr val="ffffff"/>
+                  <a:srgbClr val="FFFFFF"/>
                 </a:solidFill>
                 <a:latin typeface="Century Gothic"/>
               </a:rPr>
               <a:t>Register </a:t>
             </a:r>
-            <a:endParaRPr b="0" lang="en-US" sz="3600" spc="-1" strike="noStrike">
-              <a:solidFill>
-                <a:srgbClr val="ffffff"/>
+            <a:endParaRPr lang="en-US" sz="3600" b="0" strike="noStrike" spc="-1">
+              <a:solidFill>
+                <a:srgbClr val="FFFFFF"/>
               </a:solidFill>
               <a:latin typeface="Century Gothic"/>
             </a:endParaRPr>
@@ -4910,36 +5658,43 @@
           </a:ln>
         </p:spPr>
         <p:style>
-          <a:lnRef idx="0"/>
-          <a:fillRef idx="0"/>
-          <a:effectRef idx="0"/>
+          <a:lnRef idx="0">
+            <a:scrgbClr r="0" g="0" b="0"/>
+          </a:lnRef>
+          <a:fillRef idx="0">
+            <a:scrgbClr r="0" g="0" b="0"/>
+          </a:fillRef>
+          <a:effectRef idx="0">
+            <a:scrgbClr r="0" g="0" b="0"/>
+          </a:effectRef>
           <a:fontRef idx="minor"/>
         </p:style>
         <p:txBody>
-          <a:bodyPr lIns="90000" rIns="90000" tIns="45000" bIns="45000">
+          <a:bodyPr lIns="90000" tIns="45000" rIns="90000" bIns="45000">
             <a:spAutoFit/>
           </a:bodyPr>
+          <a:lstStyle/>
           <a:p>
             <a:pPr marL="285840" indent="-285480">
               <a:lnSpc>
                 <a:spcPct val="100000"/>
               </a:lnSpc>
               <a:buClr>
-                <a:srgbClr val="ffffff"/>
+                <a:srgbClr val="FFFFFF"/>
               </a:buClr>
               <a:buFont typeface="Arial"/>
               <a:buChar char="•"/>
             </a:pPr>
             <a:r>
-              <a:rPr b="0" lang="en-US" sz="1800" spc="-1" strike="noStrike">
+              <a:rPr lang="en-US" sz="1800" b="0" strike="noStrike" spc="-1">
                 <a:solidFill>
-                  <a:srgbClr val="ffffff"/>
+                  <a:srgbClr val="FFFFFF"/>
                 </a:solidFill>
                 <a:latin typeface="Century Gothic"/>
               </a:rPr>
               <a:t>Include name, email, password and then retype password for confirmation</a:t>
             </a:r>
-            <a:endParaRPr b="0" lang="en-CA" sz="1800" spc="-1" strike="noStrike">
+            <a:endParaRPr lang="en-CA" sz="1800" b="0" strike="noStrike" spc="-1">
               <a:latin typeface="arial"/>
             </a:endParaRPr>
           </a:p>
@@ -4949,7 +5704,7 @@
                 <a:spcPct val="100000"/>
               </a:lnSpc>
             </a:pPr>
-            <a:endParaRPr b="0" lang="en-CA" sz="1800" spc="-1" strike="noStrike">
+            <a:endParaRPr lang="en-CA" sz="1800" b="0" strike="noStrike" spc="-1">
               <a:latin typeface="arial"/>
             </a:endParaRPr>
           </a:p>
@@ -4959,21 +5714,21 @@
                 <a:spcPct val="100000"/>
               </a:lnSpc>
               <a:buClr>
-                <a:srgbClr val="ffffff"/>
+                <a:srgbClr val="FFFFFF"/>
               </a:buClr>
               <a:buFont typeface="Arial"/>
               <a:buChar char="•"/>
             </a:pPr>
             <a:r>
-              <a:rPr b="0" lang="en-US" sz="1800" spc="-1" strike="noStrike">
+              <a:rPr lang="en-US" sz="1800" b="0" strike="noStrike" spc="-1">
                 <a:solidFill>
-                  <a:srgbClr val="ffffff"/>
+                  <a:srgbClr val="FFFFFF"/>
                 </a:solidFill>
                 <a:latin typeface="Century Gothic"/>
               </a:rPr>
               <a:t>Password should be at least 7 characters and contain a special character(@#%&amp;+=)</a:t>
             </a:r>
-            <a:endParaRPr b="0" lang="en-CA" sz="1800" spc="-1" strike="noStrike">
+            <a:endParaRPr lang="en-CA" sz="1800" b="0" strike="noStrike" spc="-1">
               <a:latin typeface="arial"/>
             </a:endParaRPr>
           </a:p>
@@ -4981,12 +5736,12 @@
       </p:sp>
       <p:pic>
         <p:nvPicPr>
-          <p:cNvPr id="105" name="Content Placeholder 6" descr=""/>
+          <p:cNvPr id="105" name="Content Placeholder 6"/>
           <p:cNvPicPr/>
           <p:nvPr/>
         </p:nvPicPr>
         <p:blipFill>
-          <a:blip r:embed="rId1"/>
+          <a:blip r:embed="rId2"/>
           <a:stretch/>
         </p:blipFill>
         <p:spPr>
@@ -5004,19 +5759,14 @@
       </p:pic>
     </p:spTree>
   </p:cSld>
-  <mc:AlternateContent>
-    <mc:Choice Requires="p14">
-      <p:transition spd="slow" p14:dur="2000"/>
-    </mc:Choice>
-    <mc:Fallback>
-      <p:transition spd="slow"/>
-    </mc:Fallback>
-  </mc:AlternateContent>
+  <p:clrMapOvr>
+    <a:masterClrMapping/>
+  </p:clrMapOvr>
 </p:sld>
 </file>
 
 <file path=ppt/slides/slide4.xml><?xml version="1.0" encoding="utf-8"?>
-<p:sld xmlns:a="http://schemas.openxmlformats.org/drawingml/2006/main" xmlns:p="http://schemas.openxmlformats.org/presentationml/2006/main" xmlns:r="http://schemas.openxmlformats.org/officeDocument/2006/relationships" xmlns:p14="http://schemas.microsoft.com/office/powerpoint/2010/main" xmlns:p15="http://schemas.microsoft.com/office/powerpoint/2012/main" xmlns:mc="http://schemas.openxmlformats.org/markup-compatibility/2006">
+<p:sld xmlns:a="http://schemas.openxmlformats.org/drawingml/2006/main" xmlns:r="http://schemas.openxmlformats.org/officeDocument/2006/relationships" xmlns:p="http://schemas.openxmlformats.org/presentationml/2006/main">
   <p:cSld>
     <p:spTree>
       <p:nvGrpSpPr>
@@ -5055,6 +5805,7 @@
           <a:bodyPr anchor="ctr">
             <a:noAutofit/>
           </a:bodyPr>
+          <a:lstStyle/>
           <a:p>
             <a:pPr>
               <a:lnSpc>
@@ -5062,17 +5813,17 @@
               </a:lnSpc>
             </a:pPr>
             <a:r>
-              <a:rPr b="0" lang="en-US" sz="3600" spc="-1" strike="noStrike" cap="all">
+              <a:rPr lang="en-US" sz="3600" b="0" strike="noStrike" cap="all" spc="-1">
                 <a:solidFill>
-                  <a:srgbClr val="ffffff"/>
+                  <a:srgbClr val="FFFFFF"/>
                 </a:solidFill>
                 <a:latin typeface="Century Gothic"/>
               </a:rPr>
               <a:t>Login</a:t>
             </a:r>
-            <a:endParaRPr b="0" lang="en-US" sz="3600" spc="-1" strike="noStrike">
-              <a:solidFill>
-                <a:srgbClr val="ffffff"/>
+            <a:endParaRPr lang="en-US" sz="3600" b="0" strike="noStrike" spc="-1">
+              <a:solidFill>
+                <a:srgbClr val="FFFFFF"/>
               </a:solidFill>
               <a:latin typeface="Century Gothic"/>
             </a:endParaRPr>
@@ -5099,36 +5850,43 @@
           </a:ln>
         </p:spPr>
         <p:style>
-          <a:lnRef idx="0"/>
-          <a:fillRef idx="0"/>
-          <a:effectRef idx="0"/>
+          <a:lnRef idx="0">
+            <a:scrgbClr r="0" g="0" b="0"/>
+          </a:lnRef>
+          <a:fillRef idx="0">
+            <a:scrgbClr r="0" g="0" b="0"/>
+          </a:fillRef>
+          <a:effectRef idx="0">
+            <a:scrgbClr r="0" g="0" b="0"/>
+          </a:effectRef>
           <a:fontRef idx="minor"/>
         </p:style>
         <p:txBody>
-          <a:bodyPr lIns="90000" rIns="90000" tIns="45000" bIns="45000">
+          <a:bodyPr lIns="90000" tIns="45000" rIns="90000" bIns="45000">
             <a:spAutoFit/>
           </a:bodyPr>
+          <a:lstStyle/>
           <a:p>
             <a:pPr marL="285840" indent="-285480">
               <a:lnSpc>
                 <a:spcPct val="100000"/>
               </a:lnSpc>
               <a:buClr>
-                <a:srgbClr val="ffffff"/>
+                <a:srgbClr val="FFFFFF"/>
               </a:buClr>
               <a:buFont typeface="Arial"/>
               <a:buChar char="•"/>
             </a:pPr>
             <a:r>
-              <a:rPr b="0" lang="en-US" sz="1800" spc="-1" strike="noStrike">
+              <a:rPr lang="en-US" sz="1800" b="0" strike="noStrike" spc="-1">
                 <a:solidFill>
-                  <a:srgbClr val="ffffff"/>
+                  <a:srgbClr val="FFFFFF"/>
                 </a:solidFill>
                 <a:latin typeface="Century Gothic"/>
               </a:rPr>
               <a:t>Email and password are then stored in sharedpreferences so that user does not have to remember login information</a:t>
             </a:r>
-            <a:endParaRPr b="0" lang="en-CA" sz="1800" spc="-1" strike="noStrike">
+            <a:endParaRPr lang="en-CA" sz="1800" b="0" strike="noStrike" spc="-1">
               <a:latin typeface="arial"/>
             </a:endParaRPr>
           </a:p>
@@ -5136,12 +5894,12 @@
       </p:sp>
       <p:pic>
         <p:nvPicPr>
-          <p:cNvPr id="108" name="Content Placeholder 7" descr=""/>
+          <p:cNvPr id="108" name="Content Placeholder 7"/>
           <p:cNvPicPr/>
           <p:nvPr/>
         </p:nvPicPr>
         <p:blipFill>
-          <a:blip r:embed="rId1"/>
+          <a:blip r:embed="rId2"/>
           <a:stretch/>
         </p:blipFill>
         <p:spPr>
@@ -5159,19 +5917,14 @@
       </p:pic>
     </p:spTree>
   </p:cSld>
-  <mc:AlternateContent>
-    <mc:Choice Requires="p14">
-      <p:transition spd="slow" p14:dur="2000"/>
-    </mc:Choice>
-    <mc:Fallback>
-      <p:transition spd="slow"/>
-    </mc:Fallback>
-  </mc:AlternateContent>
+  <p:clrMapOvr>
+    <a:masterClrMapping/>
+  </p:clrMapOvr>
 </p:sld>
 </file>
 
 <file path=ppt/slides/slide5.xml><?xml version="1.0" encoding="utf-8"?>
-<p:sld xmlns:a="http://schemas.openxmlformats.org/drawingml/2006/main" xmlns:p="http://schemas.openxmlformats.org/presentationml/2006/main" xmlns:r="http://schemas.openxmlformats.org/officeDocument/2006/relationships" xmlns:p14="http://schemas.microsoft.com/office/powerpoint/2010/main" xmlns:p15="http://schemas.microsoft.com/office/powerpoint/2012/main" xmlns:mc="http://schemas.openxmlformats.org/markup-compatibility/2006">
+<p:sld xmlns:a="http://schemas.openxmlformats.org/drawingml/2006/main" xmlns:r="http://schemas.openxmlformats.org/officeDocument/2006/relationships" xmlns:p="http://schemas.openxmlformats.org/presentationml/2006/main">
   <p:cSld>
     <p:spTree>
       <p:nvGrpSpPr>
@@ -5210,6 +5963,7 @@
           <a:bodyPr anchor="ctr">
             <a:noAutofit/>
           </a:bodyPr>
+          <a:lstStyle/>
           <a:p>
             <a:pPr>
               <a:lnSpc>
@@ -5217,17 +5971,17 @@
               </a:lnSpc>
             </a:pPr>
             <a:r>
-              <a:rPr b="0" lang="en-US" sz="3600" spc="-1" strike="noStrike" cap="all">
+              <a:rPr lang="en-US" sz="3600" b="0" strike="noStrike" cap="all" spc="-1">
                 <a:solidFill>
-                  <a:srgbClr val="ffffff"/>
+                  <a:srgbClr val="FFFFFF"/>
                 </a:solidFill>
                 <a:latin typeface="Century Gothic"/>
               </a:rPr>
               <a:t>FORGET PASSWORD</a:t>
             </a:r>
-            <a:endParaRPr b="0" lang="en-US" sz="3600" spc="-1" strike="noStrike">
-              <a:solidFill>
-                <a:srgbClr val="ffffff"/>
+            <a:endParaRPr lang="en-US" sz="3600" b="0" strike="noStrike" spc="-1">
+              <a:solidFill>
+                <a:srgbClr val="FFFFFF"/>
               </a:solidFill>
               <a:latin typeface="Century Gothic"/>
             </a:endParaRPr>
@@ -5254,15 +6008,22 @@
           </a:ln>
         </p:spPr>
         <p:style>
-          <a:lnRef idx="0"/>
-          <a:fillRef idx="0"/>
-          <a:effectRef idx="0"/>
+          <a:lnRef idx="0">
+            <a:scrgbClr r="0" g="0" b="0"/>
+          </a:lnRef>
+          <a:fillRef idx="0">
+            <a:scrgbClr r="0" g="0" b="0"/>
+          </a:fillRef>
+          <a:effectRef idx="0">
+            <a:scrgbClr r="0" g="0" b="0"/>
+          </a:effectRef>
           <a:fontRef idx="minor"/>
         </p:style>
         <p:txBody>
-          <a:bodyPr lIns="90000" rIns="90000" tIns="45000" bIns="45000">
+          <a:bodyPr lIns="90000" tIns="45000" rIns="90000" bIns="45000">
             <a:spAutoFit/>
           </a:bodyPr>
+          <a:lstStyle/>
           <a:p>
             <a:pPr>
               <a:lnSpc>
@@ -5270,15 +6031,15 @@
               </a:lnSpc>
             </a:pPr>
             <a:r>
-              <a:rPr b="0" lang="en-US" sz="1800" spc="-1" strike="noStrike">
+              <a:rPr lang="en-US" sz="1800" b="0" strike="noStrike" spc="-1">
                 <a:solidFill>
-                  <a:srgbClr val="ffffff"/>
+                  <a:srgbClr val="FFFFFF"/>
                 </a:solidFill>
                 <a:latin typeface="Century Gothic"/>
               </a:rPr>
               <a:t>If user wants to reset their password they include the email they made the account with and then they will be sent a link with instructions to reset their password </a:t>
             </a:r>
-            <a:endParaRPr b="0" lang="en-CA" sz="1800" spc="-1" strike="noStrike">
+            <a:endParaRPr lang="en-CA" sz="1800" b="0" strike="noStrike" spc="-1">
               <a:latin typeface="arial"/>
             </a:endParaRPr>
           </a:p>
@@ -5286,12 +6047,12 @@
       </p:sp>
       <p:pic>
         <p:nvPicPr>
-          <p:cNvPr id="111" name="Content Placeholder 7" descr=""/>
+          <p:cNvPr id="111" name="Content Placeholder 7"/>
           <p:cNvPicPr/>
           <p:nvPr/>
         </p:nvPicPr>
         <p:blipFill>
-          <a:blip r:embed="rId1"/>
+          <a:blip r:embed="rId2"/>
           <a:stretch/>
         </p:blipFill>
         <p:spPr>
@@ -5309,19 +6070,14 @@
       </p:pic>
     </p:spTree>
   </p:cSld>
-  <mc:AlternateContent>
-    <mc:Choice Requires="p14">
-      <p:transition spd="slow" p14:dur="2000"/>
-    </mc:Choice>
-    <mc:Fallback>
-      <p:transition spd="slow"/>
-    </mc:Fallback>
-  </mc:AlternateContent>
+  <p:clrMapOvr>
+    <a:masterClrMapping/>
+  </p:clrMapOvr>
 </p:sld>
 </file>
 
 <file path=ppt/slides/slide6.xml><?xml version="1.0" encoding="utf-8"?>
-<p:sld xmlns:a="http://schemas.openxmlformats.org/drawingml/2006/main" xmlns:p="http://schemas.openxmlformats.org/presentationml/2006/main" xmlns:r="http://schemas.openxmlformats.org/officeDocument/2006/relationships" xmlns:p14="http://schemas.microsoft.com/office/powerpoint/2010/main" xmlns:p15="http://schemas.microsoft.com/office/powerpoint/2012/main" xmlns:mc="http://schemas.openxmlformats.org/markup-compatibility/2006">
+<p:sld xmlns:a="http://schemas.openxmlformats.org/drawingml/2006/main" xmlns:r="http://schemas.openxmlformats.org/officeDocument/2006/relationships" xmlns:p="http://schemas.openxmlformats.org/presentationml/2006/main">
   <p:cSld>
     <p:spTree>
       <p:nvGrpSpPr>
@@ -5360,6 +6116,7 @@
           <a:bodyPr anchor="ctr">
             <a:noAutofit/>
           </a:bodyPr>
+          <a:lstStyle/>
           <a:p>
             <a:pPr>
               <a:lnSpc>
@@ -5367,17 +6124,17 @@
               </a:lnSpc>
             </a:pPr>
             <a:r>
-              <a:rPr b="0" lang="en-US" sz="3600" spc="-1" strike="noStrike" cap="all">
+              <a:rPr lang="en-US" sz="3600" b="0" strike="noStrike" cap="all" spc="-1">
                 <a:solidFill>
-                  <a:srgbClr val="ffffff"/>
+                  <a:srgbClr val="FFFFFF"/>
                 </a:solidFill>
                 <a:latin typeface="Century Gothic"/>
               </a:rPr>
               <a:t>Home</a:t>
             </a:r>
-            <a:endParaRPr b="0" lang="en-US" sz="3600" spc="-1" strike="noStrike">
-              <a:solidFill>
-                <a:srgbClr val="ffffff"/>
+            <a:endParaRPr lang="en-US" sz="3600" b="0" strike="noStrike" spc="-1">
+              <a:solidFill>
+                <a:srgbClr val="FFFFFF"/>
               </a:solidFill>
               <a:latin typeface="Century Gothic"/>
             </a:endParaRPr>
@@ -5386,12 +6143,12 @@
       </p:sp>
       <p:pic>
         <p:nvPicPr>
-          <p:cNvPr id="113" name="Content Placeholder 4" descr=""/>
+          <p:cNvPr id="113" name="Content Placeholder 4"/>
           <p:cNvPicPr/>
           <p:nvPr/>
         </p:nvPicPr>
         <p:blipFill>
-          <a:blip r:embed="rId1"/>
+          <a:blip r:embed="rId2"/>
           <a:stretch/>
         </p:blipFill>
         <p:spPr>
@@ -5427,36 +6184,43 @@
           </a:ln>
         </p:spPr>
         <p:style>
-          <a:lnRef idx="0"/>
-          <a:fillRef idx="0"/>
-          <a:effectRef idx="0"/>
+          <a:lnRef idx="0">
+            <a:scrgbClr r="0" g="0" b="0"/>
+          </a:lnRef>
+          <a:fillRef idx="0">
+            <a:scrgbClr r="0" g="0" b="0"/>
+          </a:fillRef>
+          <a:effectRef idx="0">
+            <a:scrgbClr r="0" g="0" b="0"/>
+          </a:effectRef>
           <a:fontRef idx="minor"/>
         </p:style>
         <p:txBody>
-          <a:bodyPr lIns="90000" rIns="90000" tIns="45000" bIns="45000">
+          <a:bodyPr lIns="90000" tIns="45000" rIns="90000" bIns="45000">
             <a:spAutoFit/>
           </a:bodyPr>
+          <a:lstStyle/>
           <a:p>
             <a:pPr marL="285840" indent="-285480">
               <a:lnSpc>
                 <a:spcPct val="100000"/>
               </a:lnSpc>
               <a:buClr>
-                <a:srgbClr val="ffffff"/>
+                <a:srgbClr val="FFFFFF"/>
               </a:buClr>
               <a:buFont typeface="Arial"/>
               <a:buChar char="•"/>
             </a:pPr>
             <a:r>
-              <a:rPr b="0" lang="en-US" sz="1800" spc="-1" strike="noStrike">
+              <a:rPr lang="en-US" sz="1800" b="0" strike="noStrike" spc="-1">
                 <a:solidFill>
-                  <a:srgbClr val="ffffff"/>
+                  <a:srgbClr val="FFFFFF"/>
                 </a:solidFill>
                 <a:latin typeface="Century Gothic"/>
               </a:rPr>
               <a:t>Home page contains a card view with a recyclerview for scrolling which contains the live data from our sensors</a:t>
             </a:r>
-            <a:endParaRPr b="0" lang="en-CA" sz="1800" spc="-1" strike="noStrike">
+            <a:endParaRPr lang="en-CA" sz="1800" b="0" strike="noStrike" spc="-1">
               <a:latin typeface="arial"/>
             </a:endParaRPr>
           </a:p>
@@ -5466,7 +6230,7 @@
                 <a:spcPct val="100000"/>
               </a:lnSpc>
             </a:pPr>
-            <a:endParaRPr b="0" lang="en-CA" sz="1800" spc="-1" strike="noStrike">
+            <a:endParaRPr lang="en-CA" sz="1800" b="0" strike="noStrike" spc="-1">
               <a:latin typeface="arial"/>
             </a:endParaRPr>
           </a:p>
@@ -5476,21 +6240,21 @@
                 <a:spcPct val="100000"/>
               </a:lnSpc>
               <a:buClr>
-                <a:srgbClr val="ffffff"/>
+                <a:srgbClr val="FFFFFF"/>
               </a:buClr>
               <a:buFont typeface="Arial"/>
               <a:buChar char="•"/>
             </a:pPr>
             <a:r>
-              <a:rPr b="0" lang="en-US" sz="1800" spc="-1" strike="noStrike">
+              <a:rPr lang="en-US" sz="1800" b="0" strike="noStrike" spc="-1">
                 <a:solidFill>
-                  <a:srgbClr val="ffffff"/>
+                  <a:srgbClr val="FFFFFF"/>
                 </a:solidFill>
                 <a:latin typeface="Century Gothic"/>
               </a:rPr>
               <a:t>Data being obtained from openweatherMap for now but later will be obtained from our hardware project sensors in semester 6</a:t>
             </a:r>
-            <a:endParaRPr b="0" lang="en-CA" sz="1800" spc="-1" strike="noStrike">
+            <a:endParaRPr lang="en-CA" sz="1800" b="0" strike="noStrike" spc="-1">
               <a:latin typeface="arial"/>
             </a:endParaRPr>
           </a:p>
@@ -5498,19 +6262,14 @@
       </p:sp>
     </p:spTree>
   </p:cSld>
-  <mc:AlternateContent>
-    <mc:Choice Requires="p14">
-      <p:transition spd="slow" p14:dur="2000"/>
-    </mc:Choice>
-    <mc:Fallback>
-      <p:transition spd="slow"/>
-    </mc:Fallback>
-  </mc:AlternateContent>
+  <p:clrMapOvr>
+    <a:masterClrMapping/>
+  </p:clrMapOvr>
 </p:sld>
 </file>
 
 <file path=ppt/slides/slide7.xml><?xml version="1.0" encoding="utf-8"?>
-<p:sld xmlns:a="http://schemas.openxmlformats.org/drawingml/2006/main" xmlns:p="http://schemas.openxmlformats.org/presentationml/2006/main" xmlns:r="http://schemas.openxmlformats.org/officeDocument/2006/relationships" xmlns:p14="http://schemas.microsoft.com/office/powerpoint/2010/main" xmlns:p15="http://schemas.microsoft.com/office/powerpoint/2012/main" xmlns:mc="http://schemas.openxmlformats.org/markup-compatibility/2006">
+<p:sld xmlns:a="http://schemas.openxmlformats.org/drawingml/2006/main" xmlns:r="http://schemas.openxmlformats.org/officeDocument/2006/relationships" xmlns:p="http://schemas.openxmlformats.org/presentationml/2006/main">
   <p:cSld>
     <p:spTree>
       <p:nvGrpSpPr>
@@ -5549,6 +6308,7 @@
           <a:bodyPr anchor="ctr">
             <a:noAutofit/>
           </a:bodyPr>
+          <a:lstStyle/>
           <a:p>
             <a:pPr>
               <a:lnSpc>
@@ -5556,17 +6316,17 @@
               </a:lnSpc>
             </a:pPr>
             <a:r>
-              <a:rPr b="0" lang="en-US" sz="3600" spc="-1" strike="noStrike" cap="all">
+              <a:rPr lang="en-US" sz="3600" b="0" strike="noStrike" cap="all" spc="-1">
                 <a:solidFill>
-                  <a:srgbClr val="ffffff"/>
+                  <a:srgbClr val="FFFFFF"/>
                 </a:solidFill>
                 <a:latin typeface="Century Gothic"/>
               </a:rPr>
               <a:t>ABOUT US</a:t>
             </a:r>
-            <a:endParaRPr b="0" lang="en-US" sz="3600" spc="-1" strike="noStrike">
-              <a:solidFill>
-                <a:srgbClr val="ffffff"/>
+            <a:endParaRPr lang="en-US" sz="3600" b="0" strike="noStrike" spc="-1">
+              <a:solidFill>
+                <a:srgbClr val="FFFFFF"/>
               </a:solidFill>
               <a:latin typeface="Century Gothic"/>
             </a:endParaRPr>
@@ -5593,36 +6353,43 @@
           </a:ln>
         </p:spPr>
         <p:style>
-          <a:lnRef idx="0"/>
-          <a:fillRef idx="0"/>
-          <a:effectRef idx="0"/>
+          <a:lnRef idx="0">
+            <a:scrgbClr r="0" g="0" b="0"/>
+          </a:lnRef>
+          <a:fillRef idx="0">
+            <a:scrgbClr r="0" g="0" b="0"/>
+          </a:fillRef>
+          <a:effectRef idx="0">
+            <a:scrgbClr r="0" g="0" b="0"/>
+          </a:effectRef>
           <a:fontRef idx="minor"/>
         </p:style>
         <p:txBody>
-          <a:bodyPr lIns="90000" rIns="90000" tIns="45000" bIns="45000">
+          <a:bodyPr lIns="90000" tIns="45000" rIns="90000" bIns="45000">
             <a:spAutoFit/>
           </a:bodyPr>
+          <a:lstStyle/>
           <a:p>
             <a:pPr marL="285840" indent="-285480">
               <a:lnSpc>
                 <a:spcPct val="100000"/>
               </a:lnSpc>
               <a:buClr>
-                <a:srgbClr val="ffffff"/>
+                <a:srgbClr val="FFFFFF"/>
               </a:buClr>
               <a:buFont typeface="Arial"/>
               <a:buChar char="•"/>
             </a:pPr>
             <a:r>
-              <a:rPr b="0" lang="en-US" sz="1800" spc="-1" strike="noStrike">
+              <a:rPr lang="en-US" sz="1800" b="0" strike="noStrike" spc="-1">
                 <a:solidFill>
-                  <a:srgbClr val="ffffff"/>
+                  <a:srgbClr val="FFFFFF"/>
                 </a:solidFill>
                 <a:latin typeface="Century Gothic"/>
               </a:rPr>
               <a:t>The about us page gives insight to what our project is about and how to use our app properly with the hardware</a:t>
             </a:r>
-            <a:endParaRPr b="0" lang="en-CA" sz="1800" spc="-1" strike="noStrike">
+            <a:endParaRPr lang="en-CA" sz="1800" b="0" strike="noStrike" spc="-1">
               <a:latin typeface="arial"/>
             </a:endParaRPr>
           </a:p>
@@ -5630,12 +6397,12 @@
       </p:sp>
       <p:pic>
         <p:nvPicPr>
-          <p:cNvPr id="117" name="Content Placeholder 7" descr=""/>
+          <p:cNvPr id="117" name="Content Placeholder 7"/>
           <p:cNvPicPr/>
           <p:nvPr/>
         </p:nvPicPr>
         <p:blipFill>
-          <a:blip r:embed="rId1"/>
+          <a:blip r:embed="rId2"/>
           <a:stretch/>
         </p:blipFill>
         <p:spPr>
@@ -5653,19 +6420,14 @@
       </p:pic>
     </p:spTree>
   </p:cSld>
-  <mc:AlternateContent>
-    <mc:Choice Requires="p14">
-      <p:transition spd="slow" p14:dur="2000"/>
-    </mc:Choice>
-    <mc:Fallback>
-      <p:transition spd="slow"/>
-    </mc:Fallback>
-  </mc:AlternateContent>
+  <p:clrMapOvr>
+    <a:masterClrMapping/>
+  </p:clrMapOvr>
 </p:sld>
 </file>
 
 <file path=ppt/slides/slide8.xml><?xml version="1.0" encoding="utf-8"?>
-<p:sld xmlns:a="http://schemas.openxmlformats.org/drawingml/2006/main" xmlns:p="http://schemas.openxmlformats.org/presentationml/2006/main" xmlns:r="http://schemas.openxmlformats.org/officeDocument/2006/relationships" xmlns:p14="http://schemas.microsoft.com/office/powerpoint/2010/main" xmlns:p15="http://schemas.microsoft.com/office/powerpoint/2012/main" xmlns:mc="http://schemas.openxmlformats.org/markup-compatibility/2006">
+<p:sld xmlns:a="http://schemas.openxmlformats.org/drawingml/2006/main" xmlns:r="http://schemas.openxmlformats.org/officeDocument/2006/relationships" xmlns:p="http://schemas.openxmlformats.org/presentationml/2006/main">
   <p:cSld>
     <p:spTree>
       <p:nvGrpSpPr>
@@ -5704,6 +6466,7 @@
           <a:bodyPr anchor="ctr">
             <a:noAutofit/>
           </a:bodyPr>
+          <a:lstStyle/>
           <a:p>
             <a:pPr>
               <a:lnSpc>
@@ -5711,17 +6474,17 @@
               </a:lnSpc>
             </a:pPr>
             <a:r>
-              <a:rPr b="0" lang="en-US" sz="3600" spc="-1" strike="noStrike" cap="all">
+              <a:rPr lang="en-US" sz="3600" b="0" strike="noStrike" cap="all" spc="-1">
                 <a:solidFill>
-                  <a:srgbClr val="ffffff"/>
+                  <a:srgbClr val="FFFFFF"/>
                 </a:solidFill>
                 <a:latin typeface="Century Gothic"/>
               </a:rPr>
               <a:t>Settings</a:t>
             </a:r>
-            <a:endParaRPr b="0" lang="en-US" sz="3600" spc="-1" strike="noStrike">
-              <a:solidFill>
-                <a:srgbClr val="ffffff"/>
+            <a:endParaRPr lang="en-US" sz="3600" b="0" strike="noStrike" spc="-1">
+              <a:solidFill>
+                <a:srgbClr val="FFFFFF"/>
               </a:solidFill>
               <a:latin typeface="Century Gothic"/>
             </a:endParaRPr>
@@ -5748,36 +6511,43 @@
           </a:ln>
         </p:spPr>
         <p:style>
-          <a:lnRef idx="0"/>
-          <a:fillRef idx="0"/>
-          <a:effectRef idx="0"/>
+          <a:lnRef idx="0">
+            <a:scrgbClr r="0" g="0" b="0"/>
+          </a:lnRef>
+          <a:fillRef idx="0">
+            <a:scrgbClr r="0" g="0" b="0"/>
+          </a:fillRef>
+          <a:effectRef idx="0">
+            <a:scrgbClr r="0" g="0" b="0"/>
+          </a:effectRef>
           <a:fontRef idx="minor"/>
         </p:style>
         <p:txBody>
-          <a:bodyPr lIns="90000" rIns="90000" tIns="45000" bIns="45000">
+          <a:bodyPr lIns="90000" tIns="45000" rIns="90000" bIns="45000">
             <a:spAutoFit/>
           </a:bodyPr>
+          <a:lstStyle/>
           <a:p>
             <a:pPr marL="285840" indent="-285480">
               <a:lnSpc>
                 <a:spcPct val="100000"/>
               </a:lnSpc>
               <a:buClr>
-                <a:srgbClr val="ffffff"/>
+                <a:srgbClr val="FFFFFF"/>
               </a:buClr>
               <a:buFont typeface="Arial"/>
               <a:buChar char="•"/>
             </a:pPr>
             <a:r>
-              <a:rPr b="0" lang="en-US" sz="1800" spc="-1" strike="noStrike">
+              <a:rPr lang="en-US" sz="1800" b="0" strike="noStrike" spc="-1">
                 <a:solidFill>
-                  <a:srgbClr val="ffffff"/>
+                  <a:srgbClr val="FFFFFF"/>
                 </a:solidFill>
                 <a:latin typeface="Century Gothic"/>
               </a:rPr>
               <a:t>Settings page contains organization, and version information</a:t>
             </a:r>
-            <a:endParaRPr b="0" lang="en-CA" sz="1800" spc="-1" strike="noStrike">
+            <a:endParaRPr lang="en-CA" sz="1800" b="0" strike="noStrike" spc="-1">
               <a:latin typeface="arial"/>
             </a:endParaRPr>
           </a:p>
@@ -5787,21 +6557,21 @@
                 <a:spcPct val="100000"/>
               </a:lnSpc>
               <a:buClr>
-                <a:srgbClr val="ffffff"/>
+                <a:srgbClr val="FFFFFF"/>
               </a:buClr>
               <a:buFont typeface="Arial"/>
               <a:buChar char="•"/>
             </a:pPr>
             <a:r>
-              <a:rPr b="0" lang="en-US" sz="1800" spc="-1" strike="noStrike">
+              <a:rPr lang="en-US" sz="1800" b="0" strike="noStrike" spc="-1">
                 <a:solidFill>
-                  <a:srgbClr val="ffffff"/>
+                  <a:srgbClr val="FFFFFF"/>
                 </a:solidFill>
                 <a:latin typeface="Century Gothic"/>
               </a:rPr>
               <a:t>You can also check for the latest update, adjust brightness settings (after you give permission to do so on device) and enable night mode</a:t>
             </a:r>
-            <a:endParaRPr b="0" lang="en-CA" sz="1800" spc="-1" strike="noStrike">
+            <a:endParaRPr lang="en-CA" sz="1800" b="0" strike="noStrike" spc="-1">
               <a:latin typeface="arial"/>
             </a:endParaRPr>
           </a:p>
@@ -5809,12 +6579,12 @@
       </p:sp>
       <p:pic>
         <p:nvPicPr>
-          <p:cNvPr id="120" name="Content Placeholder 7" descr=""/>
+          <p:cNvPr id="120" name="Content Placeholder 7"/>
           <p:cNvPicPr/>
           <p:nvPr/>
         </p:nvPicPr>
         <p:blipFill>
-          <a:blip r:embed="rId1"/>
+          <a:blip r:embed="rId2"/>
           <a:stretch/>
         </p:blipFill>
         <p:spPr>
@@ -5832,19 +6602,14 @@
       </p:pic>
     </p:spTree>
   </p:cSld>
-  <mc:AlternateContent>
-    <mc:Choice Requires="p14">
-      <p:transition spd="slow" p14:dur="2000"/>
-    </mc:Choice>
-    <mc:Fallback>
-      <p:transition spd="slow"/>
-    </mc:Fallback>
-  </mc:AlternateContent>
+  <p:clrMapOvr>
+    <a:masterClrMapping/>
+  </p:clrMapOvr>
 </p:sld>
 </file>
 
 <file path=ppt/slides/slide9.xml><?xml version="1.0" encoding="utf-8"?>
-<p:sld xmlns:a="http://schemas.openxmlformats.org/drawingml/2006/main" xmlns:p="http://schemas.openxmlformats.org/presentationml/2006/main" xmlns:r="http://schemas.openxmlformats.org/officeDocument/2006/relationships" xmlns:p14="http://schemas.microsoft.com/office/powerpoint/2010/main" xmlns:p15="http://schemas.microsoft.com/office/powerpoint/2012/main" xmlns:mc="http://schemas.openxmlformats.org/markup-compatibility/2006">
+<p:sld xmlns:a="http://schemas.openxmlformats.org/drawingml/2006/main" xmlns:r="http://schemas.openxmlformats.org/officeDocument/2006/relationships" xmlns:p="http://schemas.openxmlformats.org/presentationml/2006/main">
   <p:cSld>
     <p:spTree>
       <p:nvGrpSpPr>
@@ -5880,9 +6645,10 @@
           </a:ln>
         </p:spPr>
         <p:txBody>
-          <a:bodyPr lIns="0" rIns="0" tIns="0" bIns="0" anchor="ctr">
+          <a:bodyPr lIns="0" tIns="0" rIns="0" bIns="0" anchor="ctr">
             <a:noAutofit/>
           </a:bodyPr>
+          <a:lstStyle/>
           <a:p>
             <a:pPr>
               <a:lnSpc>
@@ -5890,17 +6656,17 @@
               </a:lnSpc>
             </a:pPr>
             <a:r>
-              <a:rPr b="0" lang="en-US" sz="3600" spc="-1" strike="noStrike" cap="all">
+              <a:rPr lang="en-US" sz="3600" b="0" strike="noStrike" cap="all" spc="-1">
                 <a:solidFill>
-                  <a:srgbClr val="ffffff"/>
+                  <a:srgbClr val="FFFFFF"/>
                 </a:solidFill>
                 <a:latin typeface="Century Gothic"/>
               </a:rPr>
               <a:t>GITHUB</a:t>
             </a:r>
-            <a:endParaRPr b="0" lang="en-US" sz="3600" spc="-1" strike="noStrike">
-              <a:solidFill>
-                <a:srgbClr val="ffffff"/>
+            <a:endParaRPr lang="en-US" sz="3600" b="0" strike="noStrike" spc="-1">
+              <a:solidFill>
+                <a:srgbClr val="FFFFFF"/>
               </a:solidFill>
               <a:latin typeface="Century Gothic"/>
             </a:endParaRPr>
@@ -5909,12 +6675,12 @@
       </p:sp>
       <p:pic>
         <p:nvPicPr>
-          <p:cNvPr id="122" name="" descr=""/>
+          <p:cNvPr id="122" name="Picture 121"/>
           <p:cNvPicPr/>
           <p:nvPr/>
         </p:nvPicPr>
         <p:blipFill>
-          <a:blip r:embed="rId1"/>
+          <a:blip r:embed="rId2"/>
           <a:stretch/>
         </p:blipFill>
         <p:spPr>
@@ -5932,14 +6698,9 @@
       </p:pic>
     </p:spTree>
   </p:cSld>
-  <mc:AlternateContent>
-    <mc:Choice Requires="p14">
-      <p:transition spd="slow" p14:dur="2000"/>
-    </mc:Choice>
-    <mc:Fallback>
-      <p:transition spd="slow"/>
-    </mc:Fallback>
-  </mc:AlternateContent>
+  <p:clrMapOvr>
+    <a:masterClrMapping/>
+  </p:clrMapOvr>
 </p:sld>
 </file>
 
@@ -5957,31 +6718,31 @@
         <a:srgbClr val="146194"/>
       </a:dk2>
       <a:lt2>
-        <a:srgbClr val="76dbf4"/>
+        <a:srgbClr val="76DBF4"/>
       </a:lt2>
       <a:accent1>
-        <a:srgbClr val="052f61"/>
+        <a:srgbClr val="052F61"/>
       </a:accent1>
       <a:accent2>
-        <a:srgbClr val="a50e82"/>
+        <a:srgbClr val="A50E82"/>
       </a:accent2>
       <a:accent3>
-        <a:srgbClr val="14967c"/>
+        <a:srgbClr val="14967C"/>
       </a:accent3>
       <a:accent4>
-        <a:srgbClr val="6a9e1f"/>
+        <a:srgbClr val="6A9E1F"/>
       </a:accent4>
       <a:accent5>
-        <a:srgbClr val="e87d37"/>
+        <a:srgbClr val="E87D37"/>
       </a:accent5>
       <a:accent6>
-        <a:srgbClr val="c62324"/>
+        <a:srgbClr val="C62324"/>
       </a:accent6>
       <a:hlink>
-        <a:srgbClr val="0d2e46"/>
+        <a:srgbClr val="0D2E46"/>
       </a:hlink>
       <a:folHlink>
-        <a:srgbClr val="356a95"/>
+        <a:srgbClr val="356A95"/>
       </a:folHlink>
     </a:clrScheme>
     <a:fontScheme name="Office">
@@ -6166,6 +6927,8 @@
       </a:bgFillStyleLst>
     </a:fmtScheme>
   </a:themeElements>
+  <a:objectDefaults/>
+  <a:extraClrSchemeLst/>
 </a:theme>
 </file>
 
@@ -6183,31 +6946,31 @@
         <a:srgbClr val="146194"/>
       </a:dk2>
       <a:lt2>
-        <a:srgbClr val="76dbf4"/>
+        <a:srgbClr val="76DBF4"/>
       </a:lt2>
       <a:accent1>
-        <a:srgbClr val="052f61"/>
+        <a:srgbClr val="052F61"/>
       </a:accent1>
       <a:accent2>
-        <a:srgbClr val="a50e82"/>
+        <a:srgbClr val="A50E82"/>
       </a:accent2>
       <a:accent3>
-        <a:srgbClr val="14967c"/>
+        <a:srgbClr val="14967C"/>
       </a:accent3>
       <a:accent4>
-        <a:srgbClr val="6a9e1f"/>
+        <a:srgbClr val="6A9E1F"/>
       </a:accent4>
       <a:accent5>
-        <a:srgbClr val="e87d37"/>
+        <a:srgbClr val="E87D37"/>
       </a:accent5>
       <a:accent6>
-        <a:srgbClr val="c62324"/>
+        <a:srgbClr val="C62324"/>
       </a:accent6>
       <a:hlink>
-        <a:srgbClr val="0d2e46"/>
+        <a:srgbClr val="0D2E46"/>
       </a:hlink>
       <a:folHlink>
-        <a:srgbClr val="356a95"/>
+        <a:srgbClr val="356A95"/>
       </a:folHlink>
     </a:clrScheme>
     <a:fontScheme name="Office">
@@ -6392,5 +7155,7 @@
       </a:bgFillStyleLst>
     </a:fmtScheme>
   </a:themeElements>
+  <a:objectDefaults/>
+  <a:extraClrSchemeLst/>
 </a:theme>
 </file>
</xml_diff>